<commit_message>
Minor fixes in presentation, updated IntroductionPage, and stubbed TableOfContents...
</commit_message>
<xml_diff>
--- a/DiplomaSeminar/Presentation/Nomad.pptx
+++ b/DiplomaSeminar/Presentation/Nomad.pptx
@@ -5640,21 +5640,21 @@
     </dgm:pt>
   </dgm:ptLst>
   <dgm:cxnLst>
-    <dgm:cxn modelId="{6BFA967B-4BBF-4167-923A-D5E6E6695EA2}" type="presOf" srcId="{FACA9974-F514-42AE-B8C4-D648DEC6D854}" destId="{799DD9C6-3C9B-4CC8-A91D-15D8A3834572}" srcOrd="0" destOrd="0" presId="urn:microsoft.com/office/officeart/2008/layout/CircleAccentTimeline"/>
-    <dgm:cxn modelId="{3F81BD68-C9C0-40B1-A985-F501D7CBA430}" type="presOf" srcId="{11A3F655-3EF9-4F03-9C4B-85C780F54EE3}" destId="{D05FFCA1-2E7C-4D1F-9FED-8EFF20B9CE35}" srcOrd="0" destOrd="0" presId="urn:microsoft.com/office/officeart/2008/layout/CircleAccentTimeline"/>
-    <dgm:cxn modelId="{57B3A68F-9BF2-41D1-8BC2-E04C0E8BBE5C}" type="presOf" srcId="{6109EB1C-E30D-4B0A-BE86-82D7060D372C}" destId="{3A11F2A9-2B64-4117-9555-87A75585009C}" srcOrd="0" destOrd="0" presId="urn:microsoft.com/office/officeart/2008/layout/CircleAccentTimeline"/>
-    <dgm:cxn modelId="{FB78107B-A789-4BEC-8D2B-BEEE02EBA233}" srcId="{66C8A9D5-A511-4691-8834-0E2A2F03E233}" destId="{841FBED4-6A22-4BB5-AA77-42AA593E8EA3}" srcOrd="2" destOrd="0" parTransId="{D0BB4DC8-5230-43D3-98F7-EC4B3D4A0F30}" sibTransId="{9473F862-9139-4F65-A233-01025AD62FA8}"/>
-    <dgm:cxn modelId="{9B3C7349-20EA-44C1-8614-B535FC455E7B}" type="presOf" srcId="{53BD8052-45D3-4243-A64E-C9F2DA9F4DA5}" destId="{9B18F506-9523-4911-BBD0-FF59C79FC6D5}" srcOrd="0" destOrd="0" presId="urn:microsoft.com/office/officeart/2008/layout/CircleAccentTimeline"/>
-    <dgm:cxn modelId="{9F63BF0E-5EFF-43BC-A6D6-A5AB733D2E99}" srcId="{66C8A9D5-A511-4691-8834-0E2A2F03E233}" destId="{87150A97-6DBF-45F9-8F77-AFAB8ABCA0E4}" srcOrd="0" destOrd="0" parTransId="{A4245465-50D4-4D83-A828-18266A1B3724}" sibTransId="{BF1F5063-6CD7-46B4-8A0B-419536BD6C56}"/>
-    <dgm:cxn modelId="{0795A59F-2143-4796-916F-C9C660C9776B}" srcId="{53BD8052-45D3-4243-A64E-C9F2DA9F4DA5}" destId="{6109EB1C-E30D-4B0A-BE86-82D7060D372C}" srcOrd="0" destOrd="0" parTransId="{BB3383F3-FA45-4C92-AD3A-3B7C011949A0}" sibTransId="{AFBDBADC-7713-49CE-A306-94E47A259065}"/>
-    <dgm:cxn modelId="{1F66E49E-51D7-40DC-9107-12C97B93F9BC}" srcId="{66C8A9D5-A511-4691-8834-0E2A2F03E233}" destId="{53BD8052-45D3-4243-A64E-C9F2DA9F4DA5}" srcOrd="1" destOrd="0" parTransId="{F9C8ABFC-023D-4669-9911-DC459FA07062}" sibTransId="{A28ECB6E-B24D-4C18-B2DE-DDC66A8EE8BE}"/>
     <dgm:cxn modelId="{FD372381-0452-4061-B78A-3E46733B4624}" type="presOf" srcId="{87150A97-6DBF-45F9-8F77-AFAB8ABCA0E4}" destId="{C5BB215C-79FA-45E5-8DA9-95955DDE3269}" srcOrd="0" destOrd="0" presId="urn:microsoft.com/office/officeart/2008/layout/CircleAccentTimeline"/>
     <dgm:cxn modelId="{C1CAB55E-2FBA-4A16-BDFA-F1BF5510C383}" srcId="{66C8A9D5-A511-4691-8834-0E2A2F03E233}" destId="{11A3F655-3EF9-4F03-9C4B-85C780F54EE3}" srcOrd="3" destOrd="0" parTransId="{4373D15D-1F56-4851-8705-B23E32F7527E}" sibTransId="{C0DC02E4-659E-46F7-9349-D9B138383A57}"/>
+    <dgm:cxn modelId="{CA644598-5240-42E9-9916-B0B0AC78B3FE}" srcId="{66C8A9D5-A511-4691-8834-0E2A2F03E233}" destId="{FACA9974-F514-42AE-B8C4-D648DEC6D854}" srcOrd="5" destOrd="0" parTransId="{F1D54409-BC28-4A8F-9CE6-A1B9C802CFDB}" sibTransId="{B1E0A530-BF8B-4254-96EB-14FFFD712D65}"/>
+    <dgm:cxn modelId="{57B3A68F-9BF2-41D1-8BC2-E04C0E8BBE5C}" type="presOf" srcId="{6109EB1C-E30D-4B0A-BE86-82D7060D372C}" destId="{3A11F2A9-2B64-4117-9555-87A75585009C}" srcOrd="0" destOrd="0" presId="urn:microsoft.com/office/officeart/2008/layout/CircleAccentTimeline"/>
+    <dgm:cxn modelId="{0795A59F-2143-4796-916F-C9C660C9776B}" srcId="{53BD8052-45D3-4243-A64E-C9F2DA9F4DA5}" destId="{6109EB1C-E30D-4B0A-BE86-82D7060D372C}" srcOrd="0" destOrd="0" parTransId="{BB3383F3-FA45-4C92-AD3A-3B7C011949A0}" sibTransId="{AFBDBADC-7713-49CE-A306-94E47A259065}"/>
+    <dgm:cxn modelId="{BB545400-67E8-4D09-B358-38D55D57438D}" type="presOf" srcId="{841FBED4-6A22-4BB5-AA77-42AA593E8EA3}" destId="{351E05D6-ACB0-4E7C-B5F7-0608CB17B533}" srcOrd="0" destOrd="0" presId="urn:microsoft.com/office/officeart/2008/layout/CircleAccentTimeline"/>
     <dgm:cxn modelId="{D34B5E38-3309-4934-A102-80A260F01001}" type="presOf" srcId="{66C8A9D5-A511-4691-8834-0E2A2F03E233}" destId="{ABF5C3B9-0F97-4C04-94B5-5B40073841AD}" srcOrd="0" destOrd="0" presId="urn:microsoft.com/office/officeart/2008/layout/CircleAccentTimeline"/>
-    <dgm:cxn modelId="{CA644598-5240-42E9-9916-B0B0AC78B3FE}" srcId="{66C8A9D5-A511-4691-8834-0E2A2F03E233}" destId="{FACA9974-F514-42AE-B8C4-D648DEC6D854}" srcOrd="5" destOrd="0" parTransId="{F1D54409-BC28-4A8F-9CE6-A1B9C802CFDB}" sibTransId="{B1E0A530-BF8B-4254-96EB-14FFFD712D65}"/>
+    <dgm:cxn modelId="{FB78107B-A789-4BEC-8D2B-BEEE02EBA233}" srcId="{66C8A9D5-A511-4691-8834-0E2A2F03E233}" destId="{841FBED4-6A22-4BB5-AA77-42AA593E8EA3}" srcOrd="2" destOrd="0" parTransId="{D0BB4DC8-5230-43D3-98F7-EC4B3D4A0F30}" sibTransId="{9473F862-9139-4F65-A233-01025AD62FA8}"/>
+    <dgm:cxn modelId="{6BFA967B-4BBF-4167-923A-D5E6E6695EA2}" type="presOf" srcId="{FACA9974-F514-42AE-B8C4-D648DEC6D854}" destId="{799DD9C6-3C9B-4CC8-A91D-15D8A3834572}" srcOrd="0" destOrd="0" presId="urn:microsoft.com/office/officeart/2008/layout/CircleAccentTimeline"/>
     <dgm:cxn modelId="{3840BCA4-4165-4C8A-BA10-77504A20A6DB}" type="presOf" srcId="{2A8C94CB-EF5E-4BCF-A160-6E35A562C5CB}" destId="{27CA7B10-1396-42CC-8C5D-2BFA71B13E84}" srcOrd="0" destOrd="0" presId="urn:microsoft.com/office/officeart/2008/layout/CircleAccentTimeline"/>
     <dgm:cxn modelId="{F9A6AC05-71AC-4F1D-82DC-E720F4226329}" srcId="{66C8A9D5-A511-4691-8834-0E2A2F03E233}" destId="{2A8C94CB-EF5E-4BCF-A160-6E35A562C5CB}" srcOrd="4" destOrd="0" parTransId="{17E28C37-737C-4BC3-9C89-373622AABEF5}" sibTransId="{25EB9398-F697-4215-B829-EE621DE2D087}"/>
-    <dgm:cxn modelId="{BB545400-67E8-4D09-B358-38D55D57438D}" type="presOf" srcId="{841FBED4-6A22-4BB5-AA77-42AA593E8EA3}" destId="{351E05D6-ACB0-4E7C-B5F7-0608CB17B533}" srcOrd="0" destOrd="0" presId="urn:microsoft.com/office/officeart/2008/layout/CircleAccentTimeline"/>
+    <dgm:cxn modelId="{9B3C7349-20EA-44C1-8614-B535FC455E7B}" type="presOf" srcId="{53BD8052-45D3-4243-A64E-C9F2DA9F4DA5}" destId="{9B18F506-9523-4911-BBD0-FF59C79FC6D5}" srcOrd="0" destOrd="0" presId="urn:microsoft.com/office/officeart/2008/layout/CircleAccentTimeline"/>
+    <dgm:cxn modelId="{3F81BD68-C9C0-40B1-A985-F501D7CBA430}" type="presOf" srcId="{11A3F655-3EF9-4F03-9C4B-85C780F54EE3}" destId="{D05FFCA1-2E7C-4D1F-9FED-8EFF20B9CE35}" srcOrd="0" destOrd="0" presId="urn:microsoft.com/office/officeart/2008/layout/CircleAccentTimeline"/>
+    <dgm:cxn modelId="{9F63BF0E-5EFF-43BC-A6D6-A5AB733D2E99}" srcId="{66C8A9D5-A511-4691-8834-0E2A2F03E233}" destId="{87150A97-6DBF-45F9-8F77-AFAB8ABCA0E4}" srcOrd="0" destOrd="0" parTransId="{A4245465-50D4-4D83-A828-18266A1B3724}" sibTransId="{BF1F5063-6CD7-46B4-8A0B-419536BD6C56}"/>
+    <dgm:cxn modelId="{1F66E49E-51D7-40DC-9107-12C97B93F9BC}" srcId="{66C8A9D5-A511-4691-8834-0E2A2F03E233}" destId="{53BD8052-45D3-4243-A64E-C9F2DA9F4DA5}" srcOrd="1" destOrd="0" parTransId="{F9C8ABFC-023D-4669-9911-DC459FA07062}" sibTransId="{A28ECB6E-B24D-4C18-B2DE-DDC66A8EE8BE}"/>
     <dgm:cxn modelId="{464E3C5E-2C12-4B50-B55F-1A7CCED451A8}" type="presParOf" srcId="{ABF5C3B9-0F97-4C04-94B5-5B40073841AD}" destId="{04C55A90-DA85-47F5-9FF4-DA76DBF918FA}" srcOrd="0" destOrd="0" presId="urn:microsoft.com/office/officeart/2008/layout/CircleAccentTimeline"/>
     <dgm:cxn modelId="{30B19B94-BC86-4D10-9C7F-57AF639578E1}" type="presParOf" srcId="{04C55A90-DA85-47F5-9FF4-DA76DBF918FA}" destId="{557D0E74-E10B-46FA-BCE3-41310438E755}" srcOrd="0" destOrd="0" presId="urn:microsoft.com/office/officeart/2008/layout/CircleAccentTimeline"/>
     <dgm:cxn modelId="{8CC52639-754C-409F-A869-75E83A776904}" type="presParOf" srcId="{04C55A90-DA85-47F5-9FF4-DA76DBF918FA}" destId="{C5BB215C-79FA-45E5-8DA9-95955DDE3269}" srcOrd="1" destOrd="0" presId="urn:microsoft.com/office/officeart/2008/layout/CircleAccentTimeline"/>
@@ -6179,25 +6179,25 @@
     </dgm:pt>
   </dgm:ptLst>
   <dgm:cxnLst>
-    <dgm:cxn modelId="{356FE5AE-5C69-421C-8BC3-0DB9E2A2BB27}" type="presOf" srcId="{CC5DFCFB-6EFC-4800-A880-633249796CC0}" destId="{B3D1CD2F-F198-456A-BAF9-A9BEA987C018}" srcOrd="0" destOrd="0" presId="urn:microsoft.com/office/officeart/2005/8/layout/vList2"/>
-    <dgm:cxn modelId="{4D2C5C87-CA0D-4DA8-92DD-BEBC7444E7F6}" type="presOf" srcId="{12CAD89E-A720-465B-A4EE-C88904DA23DD}" destId="{7B46D0AC-A2A5-47EC-AC59-991C8FDA1110}" srcOrd="0" destOrd="0" presId="urn:microsoft.com/office/officeart/2005/8/layout/vList2"/>
-    <dgm:cxn modelId="{4E9A4DC5-3A52-4540-B5CF-0709741EEDFC}" srcId="{12CAD89E-A720-465B-A4EE-C88904DA23DD}" destId="{CC5DFCFB-6EFC-4800-A880-633249796CC0}" srcOrd="1" destOrd="0" parTransId="{3E1C7FA4-5562-4DCB-B2F4-620E99E73126}" sibTransId="{B92A9F52-F08F-40C6-AD75-C57BC56742C3}"/>
-    <dgm:cxn modelId="{A7F2E07E-6F89-4128-9185-4D3040DFE2C5}" srcId="{3EF89E1A-B411-4AFF-9D91-FA157E1C7815}" destId="{1D142F1A-3FF0-4F61-B569-7419C09F41E7}" srcOrd="1" destOrd="0" parTransId="{CAA36D09-A3A0-42F6-914D-B896373C6616}" sibTransId="{17031079-E47F-4424-8A07-717427EF43C5}"/>
-    <dgm:cxn modelId="{2EA6F918-583F-474D-958F-AB88AFBFC45B}" type="presOf" srcId="{B00FCBDC-63DD-4770-9FB8-48D97E57B25C}" destId="{B00828FB-558C-4ED4-9E84-ECBD6CD10E43}" srcOrd="0" destOrd="0" presId="urn:microsoft.com/office/officeart/2005/8/layout/vList2"/>
-    <dgm:cxn modelId="{21021F79-3A12-43BF-A122-A2846A85E85F}" type="presOf" srcId="{69BBD355-D2A4-4764-B695-F34638BF0EDF}" destId="{B7446641-A5CE-4714-AD45-58BF2E2FBE5C}" srcOrd="0" destOrd="0" presId="urn:microsoft.com/office/officeart/2005/8/layout/vList2"/>
-    <dgm:cxn modelId="{143A6066-900F-4F1C-A20C-ADCE9B9ACDAA}" type="presOf" srcId="{FDC404B8-AB8E-4125-9016-788DC17C2A5C}" destId="{34C9512A-FF83-4398-BCEE-7BDF825FADE0}" srcOrd="0" destOrd="2" presId="urn:microsoft.com/office/officeart/2005/8/layout/vList2"/>
     <dgm:cxn modelId="{4B94122C-360F-4CDE-8D4B-BEE66AF562F4}" srcId="{12CAD89E-A720-465B-A4EE-C88904DA23DD}" destId="{3EF89E1A-B411-4AFF-9D91-FA157E1C7815}" srcOrd="0" destOrd="0" parTransId="{950948B6-AEF8-4712-BBD0-F9C843B1A506}" sibTransId="{8A6B1163-040F-4349-B542-ACF978828118}"/>
-    <dgm:cxn modelId="{834A5A50-EE95-4245-8E2D-F150C948D1A2}" srcId="{B00FCBDC-63DD-4770-9FB8-48D97E57B25C}" destId="{C6809CCA-C451-4815-8E07-D679FE24445B}" srcOrd="1" destOrd="0" parTransId="{C46284F4-BA44-4D43-9AF1-4DB72E80808F}" sibTransId="{BEE53E42-F6E5-4F5D-865A-2B883BBF7AD6}"/>
-    <dgm:cxn modelId="{9B750AB7-F621-4720-8971-BF7123FCE9E5}" type="presOf" srcId="{C6809CCA-C451-4815-8E07-D679FE24445B}" destId="{EB0C61C8-6918-4C05-8D7A-2A6F434DFEAA}" srcOrd="0" destOrd="1" presId="urn:microsoft.com/office/officeart/2005/8/layout/vList2"/>
-    <dgm:cxn modelId="{28DCBD58-218E-4D13-A010-9384D856E55F}" type="presOf" srcId="{1D142F1A-3FF0-4F61-B569-7419C09F41E7}" destId="{34C9512A-FF83-4398-BCEE-7BDF825FADE0}" srcOrd="0" destOrd="1" presId="urn:microsoft.com/office/officeart/2005/8/layout/vList2"/>
-    <dgm:cxn modelId="{5871D5BC-A405-4401-8B94-1D5D45AA0DD9}" srcId="{3EF89E1A-B411-4AFF-9D91-FA157E1C7815}" destId="{FDC404B8-AB8E-4125-9016-788DC17C2A5C}" srcOrd="2" destOrd="0" parTransId="{DD6B06DC-AA33-442A-A369-4659B85344DE}" sibTransId="{EC999164-6384-4026-B593-7F5A70248221}"/>
-    <dgm:cxn modelId="{7A5659F0-0B36-4902-9D2B-A9D097FBC353}" srcId="{CC5DFCFB-6EFC-4800-A880-633249796CC0}" destId="{69BBD355-D2A4-4764-B695-F34638BF0EDF}" srcOrd="0" destOrd="0" parTransId="{DE359CF0-7FC0-4641-BE39-EEC6296E90E0}" sibTransId="{AF082E64-AD00-4B55-BB41-678F5A16B770}"/>
     <dgm:cxn modelId="{36281F24-868D-411B-97DD-FAA30DA8A0CD}" type="presOf" srcId="{C672440E-ACFB-4BBC-8FB7-D59CABD9119B}" destId="{EB0C61C8-6918-4C05-8D7A-2A6F434DFEAA}" srcOrd="0" destOrd="0" presId="urn:microsoft.com/office/officeart/2005/8/layout/vList2"/>
     <dgm:cxn modelId="{9BA41DD7-760F-470B-A99B-FE3DCE0836CC}" srcId="{12CAD89E-A720-465B-A4EE-C88904DA23DD}" destId="{B00FCBDC-63DD-4770-9FB8-48D97E57B25C}" srcOrd="2" destOrd="0" parTransId="{BC30E3A6-45AF-4446-B5FE-977055730964}" sibTransId="{7FF92533-FFE4-4E47-AC23-2010E6D17715}"/>
+    <dgm:cxn modelId="{834A5A50-EE95-4245-8E2D-F150C948D1A2}" srcId="{B00FCBDC-63DD-4770-9FB8-48D97E57B25C}" destId="{C6809CCA-C451-4815-8E07-D679FE24445B}" srcOrd="1" destOrd="0" parTransId="{C46284F4-BA44-4D43-9AF1-4DB72E80808F}" sibTransId="{BEE53E42-F6E5-4F5D-865A-2B883BBF7AD6}"/>
+    <dgm:cxn modelId="{28DCBD58-218E-4D13-A010-9384D856E55F}" type="presOf" srcId="{1D142F1A-3FF0-4F61-B569-7419C09F41E7}" destId="{34C9512A-FF83-4398-BCEE-7BDF825FADE0}" srcOrd="0" destOrd="1" presId="urn:microsoft.com/office/officeart/2005/8/layout/vList2"/>
+    <dgm:cxn modelId="{607EFAB0-03F8-4C49-B266-B67BE7920A81}" type="presOf" srcId="{3EF89E1A-B411-4AFF-9D91-FA157E1C7815}" destId="{1F987061-CA91-49E2-AE9D-50D1B048501B}" srcOrd="0" destOrd="0" presId="urn:microsoft.com/office/officeart/2005/8/layout/vList2"/>
+    <dgm:cxn modelId="{21021F79-3A12-43BF-A122-A2846A85E85F}" type="presOf" srcId="{69BBD355-D2A4-4764-B695-F34638BF0EDF}" destId="{B7446641-A5CE-4714-AD45-58BF2E2FBE5C}" srcOrd="0" destOrd="0" presId="urn:microsoft.com/office/officeart/2005/8/layout/vList2"/>
+    <dgm:cxn modelId="{22D9C0F1-7F9A-48F3-9FBA-3B1D3FC38805}" srcId="{3EF89E1A-B411-4AFF-9D91-FA157E1C7815}" destId="{D07F5768-424A-491F-9206-FCE271B486B4}" srcOrd="0" destOrd="0" parTransId="{0612E8AE-1645-4225-B6B4-82C7CF584574}" sibTransId="{B8660CAE-1801-4285-B301-29E6DF700597}"/>
+    <dgm:cxn modelId="{143A6066-900F-4F1C-A20C-ADCE9B9ACDAA}" type="presOf" srcId="{FDC404B8-AB8E-4125-9016-788DC17C2A5C}" destId="{34C9512A-FF83-4398-BCEE-7BDF825FADE0}" srcOrd="0" destOrd="2" presId="urn:microsoft.com/office/officeart/2005/8/layout/vList2"/>
+    <dgm:cxn modelId="{5871D5BC-A405-4401-8B94-1D5D45AA0DD9}" srcId="{3EF89E1A-B411-4AFF-9D91-FA157E1C7815}" destId="{FDC404B8-AB8E-4125-9016-788DC17C2A5C}" srcOrd="2" destOrd="0" parTransId="{DD6B06DC-AA33-442A-A369-4659B85344DE}" sibTransId="{EC999164-6384-4026-B593-7F5A70248221}"/>
+    <dgm:cxn modelId="{9BABAE71-808E-42CA-8E90-CD06D0AFD54E}" srcId="{B00FCBDC-63DD-4770-9FB8-48D97E57B25C}" destId="{C672440E-ACFB-4BBC-8FB7-D59CABD9119B}" srcOrd="0" destOrd="0" parTransId="{6223E22C-8184-40BE-ABEF-8E8E28A59D38}" sibTransId="{DF21DC3A-9A2A-4F09-B6CF-C89A741D2A07}"/>
+    <dgm:cxn modelId="{4D2C5C87-CA0D-4DA8-92DD-BEBC7444E7F6}" type="presOf" srcId="{12CAD89E-A720-465B-A4EE-C88904DA23DD}" destId="{7B46D0AC-A2A5-47EC-AC59-991C8FDA1110}" srcOrd="0" destOrd="0" presId="urn:microsoft.com/office/officeart/2005/8/layout/vList2"/>
     <dgm:cxn modelId="{1A0523CB-E03C-4E60-834B-32CA20B463A7}" type="presOf" srcId="{D07F5768-424A-491F-9206-FCE271B486B4}" destId="{34C9512A-FF83-4398-BCEE-7BDF825FADE0}" srcOrd="0" destOrd="0" presId="urn:microsoft.com/office/officeart/2005/8/layout/vList2"/>
-    <dgm:cxn modelId="{22D9C0F1-7F9A-48F3-9FBA-3B1D3FC38805}" srcId="{3EF89E1A-B411-4AFF-9D91-FA157E1C7815}" destId="{D07F5768-424A-491F-9206-FCE271B486B4}" srcOrd="0" destOrd="0" parTransId="{0612E8AE-1645-4225-B6B4-82C7CF584574}" sibTransId="{B8660CAE-1801-4285-B301-29E6DF700597}"/>
-    <dgm:cxn modelId="{9BABAE71-808E-42CA-8E90-CD06D0AFD54E}" srcId="{B00FCBDC-63DD-4770-9FB8-48D97E57B25C}" destId="{C672440E-ACFB-4BBC-8FB7-D59CABD9119B}" srcOrd="0" destOrd="0" parTransId="{6223E22C-8184-40BE-ABEF-8E8E28A59D38}" sibTransId="{DF21DC3A-9A2A-4F09-B6CF-C89A741D2A07}"/>
-    <dgm:cxn modelId="{607EFAB0-03F8-4C49-B266-B67BE7920A81}" type="presOf" srcId="{3EF89E1A-B411-4AFF-9D91-FA157E1C7815}" destId="{1F987061-CA91-49E2-AE9D-50D1B048501B}" srcOrd="0" destOrd="0" presId="urn:microsoft.com/office/officeart/2005/8/layout/vList2"/>
+    <dgm:cxn modelId="{7A5659F0-0B36-4902-9D2B-A9D097FBC353}" srcId="{CC5DFCFB-6EFC-4800-A880-633249796CC0}" destId="{69BBD355-D2A4-4764-B695-F34638BF0EDF}" srcOrd="0" destOrd="0" parTransId="{DE359CF0-7FC0-4641-BE39-EEC6296E90E0}" sibTransId="{AF082E64-AD00-4B55-BB41-678F5A16B770}"/>
+    <dgm:cxn modelId="{4E9A4DC5-3A52-4540-B5CF-0709741EEDFC}" srcId="{12CAD89E-A720-465B-A4EE-C88904DA23DD}" destId="{CC5DFCFB-6EFC-4800-A880-633249796CC0}" srcOrd="1" destOrd="0" parTransId="{3E1C7FA4-5562-4DCB-B2F4-620E99E73126}" sibTransId="{B92A9F52-F08F-40C6-AD75-C57BC56742C3}"/>
+    <dgm:cxn modelId="{9B750AB7-F621-4720-8971-BF7123FCE9E5}" type="presOf" srcId="{C6809CCA-C451-4815-8E07-D679FE24445B}" destId="{EB0C61C8-6918-4C05-8D7A-2A6F434DFEAA}" srcOrd="0" destOrd="1" presId="urn:microsoft.com/office/officeart/2005/8/layout/vList2"/>
+    <dgm:cxn modelId="{2EA6F918-583F-474D-958F-AB88AFBFC45B}" type="presOf" srcId="{B00FCBDC-63DD-4770-9FB8-48D97E57B25C}" destId="{B00828FB-558C-4ED4-9E84-ECBD6CD10E43}" srcOrd="0" destOrd="0" presId="urn:microsoft.com/office/officeart/2005/8/layout/vList2"/>
+    <dgm:cxn modelId="{356FE5AE-5C69-421C-8BC3-0DB9E2A2BB27}" type="presOf" srcId="{CC5DFCFB-6EFC-4800-A880-633249796CC0}" destId="{B3D1CD2F-F198-456A-BAF9-A9BEA987C018}" srcOrd="0" destOrd="0" presId="urn:microsoft.com/office/officeart/2005/8/layout/vList2"/>
+    <dgm:cxn modelId="{A7F2E07E-6F89-4128-9185-4D3040DFE2C5}" srcId="{3EF89E1A-B411-4AFF-9D91-FA157E1C7815}" destId="{1D142F1A-3FF0-4F61-B569-7419C09F41E7}" srcOrd="1" destOrd="0" parTransId="{CAA36D09-A3A0-42F6-914D-B896373C6616}" sibTransId="{17031079-E47F-4424-8A07-717427EF43C5}"/>
     <dgm:cxn modelId="{BD0364C7-5D6F-46CB-A9B8-187B6C0959A8}" type="presParOf" srcId="{7B46D0AC-A2A5-47EC-AC59-991C8FDA1110}" destId="{1F987061-CA91-49E2-AE9D-50D1B048501B}" srcOrd="0" destOrd="0" presId="urn:microsoft.com/office/officeart/2005/8/layout/vList2"/>
     <dgm:cxn modelId="{244040CD-4E22-461E-A0F4-6B073140FCFC}" type="presParOf" srcId="{7B46D0AC-A2A5-47EC-AC59-991C8FDA1110}" destId="{34C9512A-FF83-4398-BCEE-7BDF825FADE0}" srcOrd="1" destOrd="0" presId="urn:microsoft.com/office/officeart/2005/8/layout/vList2"/>
     <dgm:cxn modelId="{79EEABB1-8E15-42D7-AB7C-59A7C6F9AE5E}" type="presParOf" srcId="{7B46D0AC-A2A5-47EC-AC59-991C8FDA1110}" destId="{B3D1CD2F-F198-456A-BAF9-A9BEA987C018}" srcOrd="2" destOrd="0" presId="urn:microsoft.com/office/officeart/2005/8/layout/vList2"/>
@@ -6463,17 +6463,17 @@
     </dgm:pt>
   </dgm:ptLst>
   <dgm:cxnLst>
+    <dgm:cxn modelId="{0F9FF740-9351-4D82-8B18-C2F4F9FE055A}" type="presOf" srcId="{08B21EBA-9582-4EB7-A54F-66511B4402F7}" destId="{2BAC675F-F5D9-41FA-97DA-4A6C1F1DDB34}" srcOrd="0" destOrd="0" presId="urn:microsoft.com/office/officeart/2005/8/layout/vList2"/>
+    <dgm:cxn modelId="{6079409C-C30C-4ADF-9C45-E4F40E8C8512}" type="presOf" srcId="{42A7EF98-7B46-415B-A6D2-B7E19C3B87B3}" destId="{3FAFC355-C1D8-4E11-AE32-0A9655505E0B}" srcOrd="0" destOrd="3" presId="urn:microsoft.com/office/officeart/2005/8/layout/vList2"/>
+    <dgm:cxn modelId="{0A0B1222-F44B-4B01-A08E-9E0B92F6CAD7}" type="presOf" srcId="{3FF7BF16-8A20-4896-808C-FAD50CC7E6DD}" destId="{3FAFC355-C1D8-4E11-AE32-0A9655505E0B}" srcOrd="0" destOrd="2" presId="urn:microsoft.com/office/officeart/2005/8/layout/vList2"/>
+    <dgm:cxn modelId="{C9F99BC6-3363-4847-94BB-5FEA8D1159EA}" type="presOf" srcId="{1E35F55F-251C-4CB9-80E5-CDBF067C262A}" destId="{3FAFC355-C1D8-4E11-AE32-0A9655505E0B}" srcOrd="0" destOrd="1" presId="urn:microsoft.com/office/officeart/2005/8/layout/vList2"/>
+    <dgm:cxn modelId="{5F76BE54-3111-4155-B49D-BBF5802B06BB}" srcId="{08B21EBA-9582-4EB7-A54F-66511B4402F7}" destId="{68E1967E-B292-4B63-B349-45C03035DA57}" srcOrd="0" destOrd="0" parTransId="{C3B269A1-FCCA-4861-B5A1-0CA9A5B6EE24}" sibTransId="{5F0B78E4-2F20-4761-B970-B9200CB976CB}"/>
+    <dgm:cxn modelId="{704A8574-B25A-42C3-A013-6FC7DC7A66DF}" srcId="{68E1967E-B292-4B63-B349-45C03035DA57}" destId="{258CA71F-9876-4EBD-A09F-7D1D88A066F3}" srcOrd="0" destOrd="0" parTransId="{638E1EFF-85B4-4297-8148-CC035FBA8C92}" sibTransId="{447E7A05-B562-4D58-AA14-FFA66826AE88}"/>
+    <dgm:cxn modelId="{B71AD2AA-905A-4A6C-BC1D-722A685A8F8F}" srcId="{68E1967E-B292-4B63-B349-45C03035DA57}" destId="{3FF7BF16-8A20-4896-808C-FAD50CC7E6DD}" srcOrd="2" destOrd="0" parTransId="{C4CAB25A-F644-45A2-BB36-8BC3D46EC2C8}" sibTransId="{859D35BC-DBA1-4653-BF79-8529C718B033}"/>
     <dgm:cxn modelId="{8A689BD1-587B-48EE-96AB-123CF90D4CD0}" type="presOf" srcId="{68E1967E-B292-4B63-B349-45C03035DA57}" destId="{A1F140A3-CE6E-40DA-AC47-F2E5A121838C}" srcOrd="0" destOrd="0" presId="urn:microsoft.com/office/officeart/2005/8/layout/vList2"/>
+    <dgm:cxn modelId="{9416E6AA-1F28-4D14-A311-A45A334F648C}" type="presOf" srcId="{258CA71F-9876-4EBD-A09F-7D1D88A066F3}" destId="{3FAFC355-C1D8-4E11-AE32-0A9655505E0B}" srcOrd="0" destOrd="0" presId="urn:microsoft.com/office/officeart/2005/8/layout/vList2"/>
+    <dgm:cxn modelId="{E72D7AB8-C1CF-4EB3-858B-F320F422CA31}" srcId="{68E1967E-B292-4B63-B349-45C03035DA57}" destId="{1E35F55F-251C-4CB9-80E5-CDBF067C262A}" srcOrd="1" destOrd="0" parTransId="{42B38224-B172-4782-AD6A-C4ADBF24C7F7}" sibTransId="{6D1BFAA6-7689-4869-9FD7-11038354DDB8}"/>
     <dgm:cxn modelId="{957560B4-9897-4E6A-A859-55F12192A4EF}" srcId="{68E1967E-B292-4B63-B349-45C03035DA57}" destId="{42A7EF98-7B46-415B-A6D2-B7E19C3B87B3}" srcOrd="3" destOrd="0" parTransId="{05F112BD-52C3-4384-89C0-96E68332BF98}" sibTransId="{D4BD0C6C-A7BB-49D6-B9AA-599BCF6FE1B2}"/>
-    <dgm:cxn modelId="{5F76BE54-3111-4155-B49D-BBF5802B06BB}" srcId="{08B21EBA-9582-4EB7-A54F-66511B4402F7}" destId="{68E1967E-B292-4B63-B349-45C03035DA57}" srcOrd="0" destOrd="0" parTransId="{C3B269A1-FCCA-4861-B5A1-0CA9A5B6EE24}" sibTransId="{5F0B78E4-2F20-4761-B970-B9200CB976CB}"/>
-    <dgm:cxn modelId="{6079409C-C30C-4ADF-9C45-E4F40E8C8512}" type="presOf" srcId="{42A7EF98-7B46-415B-A6D2-B7E19C3B87B3}" destId="{3FAFC355-C1D8-4E11-AE32-0A9655505E0B}" srcOrd="0" destOrd="3" presId="urn:microsoft.com/office/officeart/2005/8/layout/vList2"/>
-    <dgm:cxn modelId="{C9F99BC6-3363-4847-94BB-5FEA8D1159EA}" type="presOf" srcId="{1E35F55F-251C-4CB9-80E5-CDBF067C262A}" destId="{3FAFC355-C1D8-4E11-AE32-0A9655505E0B}" srcOrd="0" destOrd="1" presId="urn:microsoft.com/office/officeart/2005/8/layout/vList2"/>
-    <dgm:cxn modelId="{E72D7AB8-C1CF-4EB3-858B-F320F422CA31}" srcId="{68E1967E-B292-4B63-B349-45C03035DA57}" destId="{1E35F55F-251C-4CB9-80E5-CDBF067C262A}" srcOrd="1" destOrd="0" parTransId="{42B38224-B172-4782-AD6A-C4ADBF24C7F7}" sibTransId="{6D1BFAA6-7689-4869-9FD7-11038354DDB8}"/>
-    <dgm:cxn modelId="{9416E6AA-1F28-4D14-A311-A45A334F648C}" type="presOf" srcId="{258CA71F-9876-4EBD-A09F-7D1D88A066F3}" destId="{3FAFC355-C1D8-4E11-AE32-0A9655505E0B}" srcOrd="0" destOrd="0" presId="urn:microsoft.com/office/officeart/2005/8/layout/vList2"/>
-    <dgm:cxn modelId="{B71AD2AA-905A-4A6C-BC1D-722A685A8F8F}" srcId="{68E1967E-B292-4B63-B349-45C03035DA57}" destId="{3FF7BF16-8A20-4896-808C-FAD50CC7E6DD}" srcOrd="2" destOrd="0" parTransId="{C4CAB25A-F644-45A2-BB36-8BC3D46EC2C8}" sibTransId="{859D35BC-DBA1-4653-BF79-8529C718B033}"/>
-    <dgm:cxn modelId="{704A8574-B25A-42C3-A013-6FC7DC7A66DF}" srcId="{68E1967E-B292-4B63-B349-45C03035DA57}" destId="{258CA71F-9876-4EBD-A09F-7D1D88A066F3}" srcOrd="0" destOrd="0" parTransId="{638E1EFF-85B4-4297-8148-CC035FBA8C92}" sibTransId="{447E7A05-B562-4D58-AA14-FFA66826AE88}"/>
-    <dgm:cxn modelId="{0F9FF740-9351-4D82-8B18-C2F4F9FE055A}" type="presOf" srcId="{08B21EBA-9582-4EB7-A54F-66511B4402F7}" destId="{2BAC675F-F5D9-41FA-97DA-4A6C1F1DDB34}" srcOrd="0" destOrd="0" presId="urn:microsoft.com/office/officeart/2005/8/layout/vList2"/>
-    <dgm:cxn modelId="{0A0B1222-F44B-4B01-A08E-9E0B92F6CAD7}" type="presOf" srcId="{3FF7BF16-8A20-4896-808C-FAD50CC7E6DD}" destId="{3FAFC355-C1D8-4E11-AE32-0A9655505E0B}" srcOrd="0" destOrd="2" presId="urn:microsoft.com/office/officeart/2005/8/layout/vList2"/>
     <dgm:cxn modelId="{790A41D0-0105-49E2-A285-C9D3EFCB2EEA}" type="presParOf" srcId="{2BAC675F-F5D9-41FA-97DA-4A6C1F1DDB34}" destId="{A1F140A3-CE6E-40DA-AC47-F2E5A121838C}" srcOrd="0" destOrd="0" presId="urn:microsoft.com/office/officeart/2005/8/layout/vList2"/>
     <dgm:cxn modelId="{030FDE26-977E-46DE-B1CD-C871EA03CE4E}" type="presParOf" srcId="{2BAC675F-F5D9-41FA-97DA-4A6C1F1DDB34}" destId="{3FAFC355-C1D8-4E11-AE32-0A9655505E0B}" srcOrd="1" destOrd="0" presId="urn:microsoft.com/office/officeart/2005/8/layout/vList2"/>
   </dgm:cxnLst>
@@ -7181,21 +7181,21 @@
     <dgm:cxn modelId="{FD6A2937-A19A-4F68-9332-E468EFEC8268}" type="presOf" srcId="{DCBEC0E3-5624-4D92-9946-307953A8B724}" destId="{D9F020ED-8CCE-4536-9677-B07EAC740620}" srcOrd="0" destOrd="0" presId="urn:microsoft.com/office/officeart/2005/8/layout/arrow3"/>
     <dgm:cxn modelId="{98855D94-DBEC-4DCC-AA47-69EC92F5C4FE}" srcId="{E29F1F7F-8CCA-44EE-9444-53753B44571C}" destId="{6838DD9F-FBF2-4042-8AD3-7A0D79928F55}" srcOrd="1" destOrd="0" parTransId="{0BC9FB1F-7E80-455D-9054-C949CA81B3F4}" sibTransId="{72BA8FBE-8FDD-4E5F-9C7D-ACF3D8FEAA6A}"/>
     <dgm:cxn modelId="{35A8BEB9-487D-49C5-8AAB-0208D31CB9E8}" type="presOf" srcId="{8766DFF0-6124-4F86-8E78-80B42FDA83E9}" destId="{70651148-8E8A-4C6B-91D8-97E934B89DEE}" srcOrd="0" destOrd="3" presId="urn:microsoft.com/office/officeart/2005/8/layout/arrow3"/>
+    <dgm:cxn modelId="{5D5E66F6-3F7B-4CE6-8704-771FFFCF06A4}" type="presOf" srcId="{6511B3B1-9A0E-4A47-917B-0E1278C205F8}" destId="{279DAB11-C63E-437D-AA56-C040123F1BDE}" srcOrd="0" destOrd="2" presId="urn:microsoft.com/office/officeart/2005/8/layout/arrow3"/>
     <dgm:cxn modelId="{1B4ED9E3-581A-4ED9-BBE1-1B920E9B131D}" srcId="{FCE8F31F-7A44-4AD4-A412-6F222ABF72C9}" destId="{5F37F3A2-1B2E-499B-98DF-CD112C7A6FF5}" srcOrd="0" destOrd="0" parTransId="{FE5BA868-3458-4F6C-8B51-778D3F9D69DD}" sibTransId="{CDF8ACA7-1E9E-4B4C-8D8B-F3597C514080}"/>
-    <dgm:cxn modelId="{5D5E66F6-3F7B-4CE6-8704-771FFFCF06A4}" type="presOf" srcId="{6511B3B1-9A0E-4A47-917B-0E1278C205F8}" destId="{279DAB11-C63E-437D-AA56-C040123F1BDE}" srcOrd="0" destOrd="2" presId="urn:microsoft.com/office/officeart/2005/8/layout/arrow3"/>
     <dgm:cxn modelId="{2ABD61B6-276B-48DC-8600-D229371B75B8}" type="presOf" srcId="{6838DD9F-FBF2-4042-8AD3-7A0D79928F55}" destId="{70651148-8E8A-4C6B-91D8-97E934B89DEE}" srcOrd="0" destOrd="4" presId="urn:microsoft.com/office/officeart/2005/8/layout/arrow3"/>
     <dgm:cxn modelId="{BAB1DD7E-F7E8-4A81-8A28-E86330B34CDC}" type="presOf" srcId="{2852C72E-728B-481E-B0F9-3AFF29731DFB}" destId="{279DAB11-C63E-437D-AA56-C040123F1BDE}" srcOrd="0" destOrd="6" presId="urn:microsoft.com/office/officeart/2005/8/layout/arrow3"/>
     <dgm:cxn modelId="{41658FD2-1F35-486B-9A35-E804FD485AD2}" type="presOf" srcId="{C2F0927A-8D32-47D6-BDA2-D52756317565}" destId="{279DAB11-C63E-437D-AA56-C040123F1BDE}" srcOrd="0" destOrd="1" presId="urn:microsoft.com/office/officeart/2005/8/layout/arrow3"/>
     <dgm:cxn modelId="{A1783A2D-09BC-4AB6-B141-3A05D027AEF6}" srcId="{72E21ABC-5CD2-479F-AC64-5AB40DE881D6}" destId="{C2F0927A-8D32-47D6-BDA2-D52756317565}" srcOrd="0" destOrd="0" parTransId="{700C93D1-4CD6-4ABE-AE0D-0D9F00F6BB16}" sibTransId="{C14FDFD0-F631-41BF-8298-3756F5936830}"/>
     <dgm:cxn modelId="{0C7B7981-DD97-4AF8-BC51-0AA1369CB8F4}" srcId="{DCBEC0E3-5624-4D92-9946-307953A8B724}" destId="{FCE8F31F-7A44-4AD4-A412-6F222ABF72C9}" srcOrd="0" destOrd="0" parTransId="{5B788506-5039-465C-A3F3-FF0171BFB2D0}" sibTransId="{9E27E849-840A-4DD2-876F-8565C43A9852}"/>
+    <dgm:cxn modelId="{33D34674-3E0F-4BBA-93D1-97E1CAF2A064}" type="presOf" srcId="{E29F1F7F-8CCA-44EE-9444-53753B44571C}" destId="{70651148-8E8A-4C6B-91D8-97E934B89DEE}" srcOrd="0" destOrd="2" presId="urn:microsoft.com/office/officeart/2005/8/layout/arrow3"/>
     <dgm:cxn modelId="{86F5A944-21B9-44DB-B120-97D14348D8A2}" type="presOf" srcId="{72E21ABC-5CD2-479F-AC64-5AB40DE881D6}" destId="{279DAB11-C63E-437D-AA56-C040123F1BDE}" srcOrd="0" destOrd="0" presId="urn:microsoft.com/office/officeart/2005/8/layout/arrow3"/>
-    <dgm:cxn modelId="{33D34674-3E0F-4BBA-93D1-97E1CAF2A064}" type="presOf" srcId="{E29F1F7F-8CCA-44EE-9444-53753B44571C}" destId="{70651148-8E8A-4C6B-91D8-97E934B89DEE}" srcOrd="0" destOrd="2" presId="urn:microsoft.com/office/officeart/2005/8/layout/arrow3"/>
     <dgm:cxn modelId="{B7AD979B-A77A-4BDF-A9A3-6FBF68863E73}" srcId="{72E21ABC-5CD2-479F-AC64-5AB40DE881D6}" destId="{6511B3B1-9A0E-4A47-917B-0E1278C205F8}" srcOrd="1" destOrd="0" parTransId="{23F22305-F37C-49C4-9167-79B2B1F33B2B}" sibTransId="{E09AD098-AD84-4F9B-8A86-1C44217EBCB5}"/>
     <dgm:cxn modelId="{DFEF0154-ADDB-44E9-A96D-FBCF09B023ED}" type="presOf" srcId="{B6CF040B-974D-4F47-B9E9-E262EF377DEF}" destId="{70651148-8E8A-4C6B-91D8-97E934B89DEE}" srcOrd="0" destOrd="5" presId="urn:microsoft.com/office/officeart/2005/8/layout/arrow3"/>
     <dgm:cxn modelId="{0371ECA1-4587-48BA-BEE7-06923D8CD017}" srcId="{6511B3B1-9A0E-4A47-917B-0E1278C205F8}" destId="{56435254-7FE0-4E05-B009-0468415BAD76}" srcOrd="1" destOrd="0" parTransId="{8283FE55-3F21-46A8-9EF5-FF3E142F1C6C}" sibTransId="{29927EBC-1C3F-422A-8FCD-F237CD47DF49}"/>
     <dgm:cxn modelId="{4A14D443-9304-4B66-A9F0-9C7C8D275331}" type="presOf" srcId="{56435254-7FE0-4E05-B009-0468415BAD76}" destId="{279DAB11-C63E-437D-AA56-C040123F1BDE}" srcOrd="0" destOrd="4" presId="urn:microsoft.com/office/officeart/2005/8/layout/arrow3"/>
+    <dgm:cxn modelId="{D4EC535C-E229-4BB7-A339-EFF4B640BBFA}" srcId="{E29F1F7F-8CCA-44EE-9444-53753B44571C}" destId="{B6CF040B-974D-4F47-B9E9-E262EF377DEF}" srcOrd="2" destOrd="0" parTransId="{23A06C04-2903-4817-8BDE-09EC338E4206}" sibTransId="{619A3B8C-AA82-40C7-AC4B-E1A634046367}"/>
     <dgm:cxn modelId="{7AECBFE9-7937-4DBA-88B0-71F8CAE1F2F3}" srcId="{6511B3B1-9A0E-4A47-917B-0E1278C205F8}" destId="{596BB62F-E9A5-465E-AB23-01E0F470A1FE}" srcOrd="2" destOrd="0" parTransId="{C73FA817-76AA-4550-A2EC-FF1D3825E374}" sibTransId="{911693D3-853E-48A5-9F8B-925DA8D8C6D2}"/>
-    <dgm:cxn modelId="{D4EC535C-E229-4BB7-A339-EFF4B640BBFA}" srcId="{E29F1F7F-8CCA-44EE-9444-53753B44571C}" destId="{B6CF040B-974D-4F47-B9E9-E262EF377DEF}" srcOrd="2" destOrd="0" parTransId="{23A06C04-2903-4817-8BDE-09EC338E4206}" sibTransId="{619A3B8C-AA82-40C7-AC4B-E1A634046367}"/>
     <dgm:cxn modelId="{5BD74351-34F3-496C-8300-18B7499F5478}" srcId="{6511B3B1-9A0E-4A47-917B-0E1278C205F8}" destId="{2852C72E-728B-481E-B0F9-3AFF29731DFB}" srcOrd="3" destOrd="0" parTransId="{4A303FE4-9D79-41E4-8D4E-1D2FA62E48A7}" sibTransId="{84F45173-D211-469E-B94D-EC5A22F78264}"/>
     <dgm:cxn modelId="{AFA2B31D-39DF-414E-A314-B8A7CCA1E5FE}" type="presOf" srcId="{2B5362D5-4BF1-42F0-B76D-3442FE932D2B}" destId="{279DAB11-C63E-437D-AA56-C040123F1BDE}" srcOrd="0" destOrd="3" presId="urn:microsoft.com/office/officeart/2005/8/layout/arrow3"/>
     <dgm:cxn modelId="{7C880AA4-B3DF-4618-B37F-2E37AB0F657A}" type="presOf" srcId="{5F37F3A2-1B2E-499B-98DF-CD112C7A6FF5}" destId="{70651148-8E8A-4C6B-91D8-97E934B89DEE}" srcOrd="0" destOrd="1" presId="urn:microsoft.com/office/officeart/2005/8/layout/arrow3"/>
@@ -7639,21 +7639,21 @@
     </dgm:pt>
   </dgm:ptLst>
   <dgm:cxnLst>
+    <dgm:cxn modelId="{0E9D5F94-CD00-4E71-A7D8-0CDC16F090B3}" type="presOf" srcId="{554E2AA3-9A75-41A8-8E47-45418A5F6A56}" destId="{EBD6F82F-5102-4FC5-AF12-F88CE6F7D1E8}" srcOrd="0" destOrd="0" presId="urn:microsoft.com/office/officeart/2005/8/layout/radial1"/>
+    <dgm:cxn modelId="{914ACC06-A38D-4923-B6F4-8E6DD611B9ED}" srcId="{7E302CE3-B060-407E-8C39-C8238EC2547D}" destId="{67603B1A-EFD3-4B56-AC75-714C8E17E78A}" srcOrd="1" destOrd="0" parTransId="{554E2AA3-9A75-41A8-8E47-45418A5F6A56}" sibTransId="{C113A282-14C5-4DF4-9877-715EC42C5441}"/>
+    <dgm:cxn modelId="{2F6CC88C-DD87-4922-A04F-E326714A52D8}" type="presOf" srcId="{CD370D6E-219F-4F53-92EF-B995E5946E68}" destId="{B16F53F6-AB78-48D6-867B-1816F27A02EE}" srcOrd="0" destOrd="0" presId="urn:microsoft.com/office/officeart/2005/8/layout/radial1"/>
+    <dgm:cxn modelId="{E94E168C-379F-4620-BAB8-C3DF84B1713D}" srcId="{59A76545-7AF9-4705-8EF5-54F017DF64F2}" destId="{7E302CE3-B060-407E-8C39-C8238EC2547D}" srcOrd="0" destOrd="0" parTransId="{E2A3EB40-03E2-4EF6-9A3B-F097433D0A66}" sibTransId="{4E63247C-3677-418D-AB73-19669AE64896}"/>
+    <dgm:cxn modelId="{4BDC5B3F-21E8-4C0E-BAEA-80165D26730E}" type="presOf" srcId="{59A76545-7AF9-4705-8EF5-54F017DF64F2}" destId="{B2EED6AF-788B-4688-A99A-0C6E5AFDF7A8}" srcOrd="0" destOrd="0" presId="urn:microsoft.com/office/officeart/2005/8/layout/radial1"/>
+    <dgm:cxn modelId="{988B8C56-0B12-48C5-B572-97B67F58DE10}" type="presOf" srcId="{2E3619F0-B6CB-4BC1-81F0-A00B66929C53}" destId="{84F2078E-00F4-4629-A957-C1FDDA1D500B}" srcOrd="1" destOrd="0" presId="urn:microsoft.com/office/officeart/2005/8/layout/radial1"/>
+    <dgm:cxn modelId="{468AE3D6-2560-4EC8-8AFE-7E6965ED524E}" type="presOf" srcId="{215BC256-440F-4A5D-BC43-D016B35E5874}" destId="{85649CC4-960B-4B77-A6B2-FCC6734CC397}" srcOrd="0" destOrd="0" presId="urn:microsoft.com/office/officeart/2005/8/layout/radial1"/>
+    <dgm:cxn modelId="{77489661-759C-4919-A04E-056C95C71214}" srcId="{7E302CE3-B060-407E-8C39-C8238EC2547D}" destId="{123F2D13-1E40-4C69-8DB0-C896DC317B6D}" srcOrd="2" destOrd="0" parTransId="{CD370D6E-219F-4F53-92EF-B995E5946E68}" sibTransId="{615F443B-2683-4216-B1C8-3B5C4763FCE7}"/>
+    <dgm:cxn modelId="{EF2CE522-9982-4B5B-88DD-3501CB7DC215}" type="presOf" srcId="{2E3619F0-B6CB-4BC1-81F0-A00B66929C53}" destId="{2EE2C337-2AB3-4E32-9DE0-BF6CA5ED66D8}" srcOrd="0" destOrd="0" presId="urn:microsoft.com/office/officeart/2005/8/layout/radial1"/>
+    <dgm:cxn modelId="{64505682-E2FA-4536-8741-3AB17753F493}" srcId="{7E302CE3-B060-407E-8C39-C8238EC2547D}" destId="{215BC256-440F-4A5D-BC43-D016B35E5874}" srcOrd="0" destOrd="0" parTransId="{2E3619F0-B6CB-4BC1-81F0-A00B66929C53}" sibTransId="{CC773FC3-A595-4499-A51C-7DAF0A40ABFE}"/>
     <dgm:cxn modelId="{655EBBA2-6401-4AAE-A668-D5672C262CEF}" type="presOf" srcId="{7E302CE3-B060-407E-8C39-C8238EC2547D}" destId="{7BC2E876-2247-419D-A5F0-4D061FAF11D6}" srcOrd="0" destOrd="0" presId="urn:microsoft.com/office/officeart/2005/8/layout/radial1"/>
-    <dgm:cxn modelId="{0E9D5F94-CD00-4E71-A7D8-0CDC16F090B3}" type="presOf" srcId="{554E2AA3-9A75-41A8-8E47-45418A5F6A56}" destId="{EBD6F82F-5102-4FC5-AF12-F88CE6F7D1E8}" srcOrd="0" destOrd="0" presId="urn:microsoft.com/office/officeart/2005/8/layout/radial1"/>
-    <dgm:cxn modelId="{988B8C56-0B12-48C5-B572-97B67F58DE10}" type="presOf" srcId="{2E3619F0-B6CB-4BC1-81F0-A00B66929C53}" destId="{84F2078E-00F4-4629-A957-C1FDDA1D500B}" srcOrd="1" destOrd="0" presId="urn:microsoft.com/office/officeart/2005/8/layout/radial1"/>
-    <dgm:cxn modelId="{E94E168C-379F-4620-BAB8-C3DF84B1713D}" srcId="{59A76545-7AF9-4705-8EF5-54F017DF64F2}" destId="{7E302CE3-B060-407E-8C39-C8238EC2547D}" srcOrd="0" destOrd="0" parTransId="{E2A3EB40-03E2-4EF6-9A3B-F097433D0A66}" sibTransId="{4E63247C-3677-418D-AB73-19669AE64896}"/>
+    <dgm:cxn modelId="{06FC20F7-CE52-416B-9A1C-70D9BDFFD69A}" type="presOf" srcId="{67603B1A-EFD3-4B56-AC75-714C8E17E78A}" destId="{5587CFFF-A9F9-4B92-93E9-8D3BAE5F08F0}" srcOrd="0" destOrd="0" presId="urn:microsoft.com/office/officeart/2005/8/layout/radial1"/>
+    <dgm:cxn modelId="{2FCBD7F2-E5BC-442C-969E-B1CB58528614}" type="presOf" srcId="{CD370D6E-219F-4F53-92EF-B995E5946E68}" destId="{29C41D5E-99DA-4A7D-8A8D-B960ACA24BA3}" srcOrd="1" destOrd="0" presId="urn:microsoft.com/office/officeart/2005/8/layout/radial1"/>
     <dgm:cxn modelId="{81C6ABF6-A577-4496-BC96-23F7CFC16779}" type="presOf" srcId="{123F2D13-1E40-4C69-8DB0-C896DC317B6D}" destId="{01FD3103-B73F-4337-BCCB-E198DF1AC2D0}" srcOrd="0" destOrd="0" presId="urn:microsoft.com/office/officeart/2005/8/layout/radial1"/>
-    <dgm:cxn modelId="{468AE3D6-2560-4EC8-8AFE-7E6965ED524E}" type="presOf" srcId="{215BC256-440F-4A5D-BC43-D016B35E5874}" destId="{85649CC4-960B-4B77-A6B2-FCC6734CC397}" srcOrd="0" destOrd="0" presId="urn:microsoft.com/office/officeart/2005/8/layout/radial1"/>
-    <dgm:cxn modelId="{2F6CC88C-DD87-4922-A04F-E326714A52D8}" type="presOf" srcId="{CD370D6E-219F-4F53-92EF-B995E5946E68}" destId="{B16F53F6-AB78-48D6-867B-1816F27A02EE}" srcOrd="0" destOrd="0" presId="urn:microsoft.com/office/officeart/2005/8/layout/radial1"/>
     <dgm:cxn modelId="{702A93DD-3B4C-4A6F-8EC6-3CAA22943125}" type="presOf" srcId="{554E2AA3-9A75-41A8-8E47-45418A5F6A56}" destId="{6DDD7D4D-DA7A-4A77-B298-BEE740CAFFE0}" srcOrd="1" destOrd="0" presId="urn:microsoft.com/office/officeart/2005/8/layout/radial1"/>
-    <dgm:cxn modelId="{914ACC06-A38D-4923-B6F4-8E6DD611B9ED}" srcId="{7E302CE3-B060-407E-8C39-C8238EC2547D}" destId="{67603B1A-EFD3-4B56-AC75-714C8E17E78A}" srcOrd="1" destOrd="0" parTransId="{554E2AA3-9A75-41A8-8E47-45418A5F6A56}" sibTransId="{C113A282-14C5-4DF4-9877-715EC42C5441}"/>
-    <dgm:cxn modelId="{06FC20F7-CE52-416B-9A1C-70D9BDFFD69A}" type="presOf" srcId="{67603B1A-EFD3-4B56-AC75-714C8E17E78A}" destId="{5587CFFF-A9F9-4B92-93E9-8D3BAE5F08F0}" srcOrd="0" destOrd="0" presId="urn:microsoft.com/office/officeart/2005/8/layout/radial1"/>
-    <dgm:cxn modelId="{4BDC5B3F-21E8-4C0E-BAEA-80165D26730E}" type="presOf" srcId="{59A76545-7AF9-4705-8EF5-54F017DF64F2}" destId="{B2EED6AF-788B-4688-A99A-0C6E5AFDF7A8}" srcOrd="0" destOrd="0" presId="urn:microsoft.com/office/officeart/2005/8/layout/radial1"/>
-    <dgm:cxn modelId="{EF2CE522-9982-4B5B-88DD-3501CB7DC215}" type="presOf" srcId="{2E3619F0-B6CB-4BC1-81F0-A00B66929C53}" destId="{2EE2C337-2AB3-4E32-9DE0-BF6CA5ED66D8}" srcOrd="0" destOrd="0" presId="urn:microsoft.com/office/officeart/2005/8/layout/radial1"/>
-    <dgm:cxn modelId="{2FCBD7F2-E5BC-442C-969E-B1CB58528614}" type="presOf" srcId="{CD370D6E-219F-4F53-92EF-B995E5946E68}" destId="{29C41D5E-99DA-4A7D-8A8D-B960ACA24BA3}" srcOrd="1" destOrd="0" presId="urn:microsoft.com/office/officeart/2005/8/layout/radial1"/>
-    <dgm:cxn modelId="{77489661-759C-4919-A04E-056C95C71214}" srcId="{7E302CE3-B060-407E-8C39-C8238EC2547D}" destId="{123F2D13-1E40-4C69-8DB0-C896DC317B6D}" srcOrd="2" destOrd="0" parTransId="{CD370D6E-219F-4F53-92EF-B995E5946E68}" sibTransId="{615F443B-2683-4216-B1C8-3B5C4763FCE7}"/>
-    <dgm:cxn modelId="{64505682-E2FA-4536-8741-3AB17753F493}" srcId="{7E302CE3-B060-407E-8C39-C8238EC2547D}" destId="{215BC256-440F-4A5D-BC43-D016B35E5874}" srcOrd="0" destOrd="0" parTransId="{2E3619F0-B6CB-4BC1-81F0-A00B66929C53}" sibTransId="{CC773FC3-A595-4499-A51C-7DAF0A40ABFE}"/>
     <dgm:cxn modelId="{14F59998-3485-4710-A012-329CA2FC970E}" type="presParOf" srcId="{B2EED6AF-788B-4688-A99A-0C6E5AFDF7A8}" destId="{7BC2E876-2247-419D-A5F0-4D061FAF11D6}" srcOrd="0" destOrd="0" presId="urn:microsoft.com/office/officeart/2005/8/layout/radial1"/>
     <dgm:cxn modelId="{1671ADD4-E73B-4355-B286-4506ADFD1390}" type="presParOf" srcId="{B2EED6AF-788B-4688-A99A-0C6E5AFDF7A8}" destId="{2EE2C337-2AB3-4E32-9DE0-BF6CA5ED66D8}" srcOrd="1" destOrd="0" presId="urn:microsoft.com/office/officeart/2005/8/layout/radial1"/>
     <dgm:cxn modelId="{C6B5F63A-61A4-4633-A854-C7672F8B35F9}" type="presParOf" srcId="{2EE2C337-2AB3-4E32-9DE0-BF6CA5ED66D8}" destId="{84F2078E-00F4-4629-A957-C1FDDA1D500B}" srcOrd="0" destOrd="0" presId="urn:microsoft.com/office/officeart/2005/8/layout/radial1"/>
@@ -9425,227 +9425,6 @@
       <dsp:cNvGrpSpPr/>
     </dsp:nvGrpSpPr>
     <dsp:grpSpPr/>
-    <dsp:sp modelId="{A1F140A3-CE6E-40DA-AC47-F2E5A121838C}">
-      <dsp:nvSpPr>
-        <dsp:cNvPr id="0" name=""/>
-        <dsp:cNvSpPr/>
-      </dsp:nvSpPr>
-      <dsp:spPr>
-        <a:xfrm>
-          <a:off x="0" y="37795"/>
-          <a:ext cx="7920880" cy="569128"/>
-        </a:xfrm>
-        <a:prstGeom prst="roundRect">
-          <a:avLst/>
-        </a:prstGeom>
-        <a:gradFill rotWithShape="0">
-          <a:gsLst>
-            <a:gs pos="0">
-              <a:schemeClr val="accent1">
-                <a:hueOff val="0"/>
-                <a:satOff val="0"/>
-                <a:lumOff val="0"/>
-                <a:alphaOff val="0"/>
-                <a:tint val="0"/>
-              </a:schemeClr>
-            </a:gs>
-            <a:gs pos="44000">
-              <a:schemeClr val="accent1">
-                <a:hueOff val="0"/>
-                <a:satOff val="0"/>
-                <a:lumOff val="0"/>
-                <a:alphaOff val="0"/>
-                <a:tint val="60000"/>
-                <a:satMod val="120000"/>
-              </a:schemeClr>
-            </a:gs>
-            <a:gs pos="100000">
-              <a:schemeClr val="accent1">
-                <a:hueOff val="0"/>
-                <a:satOff val="0"/>
-                <a:lumOff val="0"/>
-                <a:alphaOff val="0"/>
-                <a:tint val="90000"/>
-                <a:alpha val="100000"/>
-                <a:lumMod val="90000"/>
-              </a:schemeClr>
-            </a:gs>
-          </a:gsLst>
-          <a:lin ang="5400000" scaled="0"/>
-        </a:gradFill>
-        <a:ln>
-          <a:noFill/>
-        </a:ln>
-        <a:effectLst/>
-        <a:scene3d>
-          <a:camera prst="orthographicFront"/>
-          <a:lightRig rig="flat" dir="t"/>
-        </a:scene3d>
-        <a:sp3d prstMaterial="dkEdge">
-          <a:bevelT w="8200" h="38100"/>
-        </a:sp3d>
-      </dsp:spPr>
-      <dsp:style>
-        <a:lnRef idx="0">
-          <a:scrgbClr r="0" g="0" b="0"/>
-        </a:lnRef>
-        <a:fillRef idx="2">
-          <a:scrgbClr r="0" g="0" b="0"/>
-        </a:fillRef>
-        <a:effectRef idx="1">
-          <a:scrgbClr r="0" g="0" b="0"/>
-        </a:effectRef>
-        <a:fontRef idx="minor">
-          <a:schemeClr val="dk1"/>
-        </a:fontRef>
-      </dsp:style>
-      <dsp:txBody>
-        <a:bodyPr spcFirstLastPara="0" vert="horz" wrap="square" lIns="87630" tIns="87630" rIns="87630" bIns="87630" numCol="1" spcCol="1270" anchor="ctr" anchorCtr="0">
-          <a:noAutofit/>
-        </a:bodyPr>
-        <a:lstStyle/>
-        <a:p>
-          <a:pPr lvl="0" algn="l" defTabSz="1022350">
-            <a:lnSpc>
-              <a:spcPct val="90000"/>
-            </a:lnSpc>
-            <a:spcBef>
-              <a:spcPct val="0"/>
-            </a:spcBef>
-            <a:spcAft>
-              <a:spcPct val="35000"/>
-            </a:spcAft>
-          </a:pPr>
-          <a:r>
-            <a:rPr lang="pl-PL" sz="2300" kern="1200" dirty="0" smtClean="0"/>
-            <a:t>Cechy frameworku:</a:t>
-          </a:r>
-          <a:endParaRPr lang="en-US" sz="2300" kern="1200" dirty="0"/>
-        </a:p>
-      </dsp:txBody>
-      <dsp:txXfrm>
-        <a:off x="27783" y="65578"/>
-        <a:ext cx="7865314" cy="513562"/>
-      </dsp:txXfrm>
-    </dsp:sp>
-    <dsp:sp modelId="{3FAFC355-C1D8-4E11-AE32-0A9655505E0B}">
-      <dsp:nvSpPr>
-        <dsp:cNvPr id="0" name=""/>
-        <dsp:cNvSpPr/>
-      </dsp:nvSpPr>
-      <dsp:spPr>
-        <a:xfrm>
-          <a:off x="0" y="606924"/>
-          <a:ext cx="7920880" cy="2235600"/>
-        </a:xfrm>
-        <a:prstGeom prst="rect">
-          <a:avLst/>
-        </a:prstGeom>
-        <a:noFill/>
-        <a:ln>
-          <a:noFill/>
-        </a:ln>
-        <a:effectLst/>
-      </dsp:spPr>
-      <dsp:style>
-        <a:lnRef idx="0">
-          <a:scrgbClr r="0" g="0" b="0"/>
-        </a:lnRef>
-        <a:fillRef idx="0">
-          <a:scrgbClr r="0" g="0" b="0"/>
-        </a:fillRef>
-        <a:effectRef idx="0">
-          <a:scrgbClr r="0" g="0" b="0"/>
-        </a:effectRef>
-        <a:fontRef idx="minor"/>
-      </dsp:style>
-      <dsp:txBody>
-        <a:bodyPr spcFirstLastPara="0" vert="horz" wrap="square" lIns="251488" tIns="29210" rIns="163576" bIns="29210" numCol="1" spcCol="1270" anchor="t" anchorCtr="0">
-          <a:noAutofit/>
-        </a:bodyPr>
-        <a:lstStyle/>
-        <a:p>
-          <a:pPr marL="171450" lvl="1" indent="-171450" algn="l" defTabSz="800100">
-            <a:lnSpc>
-              <a:spcPct val="90000"/>
-            </a:lnSpc>
-            <a:spcBef>
-              <a:spcPct val="0"/>
-            </a:spcBef>
-            <a:spcAft>
-              <a:spcPct val="20000"/>
-            </a:spcAft>
-            <a:buChar char="••"/>
-          </a:pPr>
-          <a:r>
-            <a:rPr lang="pl-PL" sz="1800" kern="1200" dirty="0" smtClean="0"/>
-            <a:t>Możliwość załadowania modułu podczas pracy aplikacji hosta</a:t>
-          </a:r>
-          <a:endParaRPr lang="en-US" sz="1800" kern="1200" dirty="0"/>
-        </a:p>
-        <a:p>
-          <a:pPr marL="171450" lvl="1" indent="-171450" algn="l" defTabSz="800100">
-            <a:lnSpc>
-              <a:spcPct val="90000"/>
-            </a:lnSpc>
-            <a:spcBef>
-              <a:spcPct val="0"/>
-            </a:spcBef>
-            <a:spcAft>
-              <a:spcPct val="20000"/>
-            </a:spcAft>
-            <a:buChar char="••"/>
-          </a:pPr>
-          <a:r>
-            <a:rPr lang="pl-PL" sz="1800" kern="1200" dirty="0" smtClean="0"/>
-            <a:t>Możliwość wyładowania modułów</a:t>
-          </a:r>
-          <a:endParaRPr lang="en-US" sz="1800" kern="1200" dirty="0"/>
-        </a:p>
-        <a:p>
-          <a:pPr marL="171450" lvl="1" indent="-171450" algn="l" defTabSz="800100">
-            <a:lnSpc>
-              <a:spcPct val="90000"/>
-            </a:lnSpc>
-            <a:spcBef>
-              <a:spcPct val="0"/>
-            </a:spcBef>
-            <a:spcAft>
-              <a:spcPct val="20000"/>
-            </a:spcAft>
-            <a:buChar char="••"/>
-          </a:pPr>
-          <a:r>
-            <a:rPr lang="pl-PL" sz="1800" kern="1200" dirty="0" smtClean="0"/>
-            <a:t>Możliwość uaktualnienia modułów i automatycznego restartu </a:t>
-          </a:r>
-          <a:endParaRPr lang="en-US" sz="1800" kern="1200" dirty="0"/>
-        </a:p>
-        <a:p>
-          <a:pPr marL="171450" lvl="1" indent="-171450" algn="l" defTabSz="800100">
-            <a:lnSpc>
-              <a:spcPct val="90000"/>
-            </a:lnSpc>
-            <a:spcBef>
-              <a:spcPct val="0"/>
-            </a:spcBef>
-            <a:spcAft>
-              <a:spcPct val="20000"/>
-            </a:spcAft>
-            <a:buChar char="••"/>
-          </a:pPr>
-          <a:r>
-            <a:rPr lang="pl-PL" sz="1800" kern="1200" dirty="0" smtClean="0"/>
-            <a:t>Komunikację modułów między sobą</a:t>
-          </a:r>
-          <a:endParaRPr lang="en-US" sz="1800" kern="1200" dirty="0"/>
-        </a:p>
-      </dsp:txBody>
-      <dsp:txXfrm>
-        <a:off x="0" y="606924"/>
-        <a:ext cx="7920880" cy="2235600"/>
-      </dsp:txXfrm>
-    </dsp:sp>
   </dsp:spTree>
 </dsp:drawing>
 </file>
@@ -9658,485 +9437,6 @@
       <dsp:cNvGrpSpPr/>
     </dsp:nvGrpSpPr>
     <dsp:grpSpPr/>
-    <dsp:sp modelId="{AFF105BE-DDA7-4EF4-904A-DC7A00694505}">
-      <dsp:nvSpPr>
-        <dsp:cNvPr id="0" name=""/>
-        <dsp:cNvSpPr/>
-      </dsp:nvSpPr>
-      <dsp:spPr>
-        <a:xfrm rot="21300000">
-          <a:off x="25254" y="1619917"/>
-          <a:ext cx="8179091" cy="936629"/>
-        </a:xfrm>
-        <a:prstGeom prst="mathMinus">
-          <a:avLst/>
-        </a:prstGeom>
-        <a:solidFill>
-          <a:schemeClr val="accent2">
-            <a:tint val="40000"/>
-            <a:hueOff val="0"/>
-            <a:satOff val="0"/>
-            <a:lumOff val="0"/>
-            <a:alphaOff val="0"/>
-          </a:schemeClr>
-        </a:solidFill>
-        <a:ln w="25400" cap="flat" cmpd="sng" algn="ctr">
-          <a:solidFill>
-            <a:schemeClr val="lt1">
-              <a:hueOff val="0"/>
-              <a:satOff val="0"/>
-              <a:lumOff val="0"/>
-              <a:alphaOff val="0"/>
-            </a:schemeClr>
-          </a:solidFill>
-          <a:prstDash val="solid"/>
-        </a:ln>
-        <a:effectLst/>
-      </dsp:spPr>
-      <dsp:style>
-        <a:lnRef idx="3">
-          <a:scrgbClr r="0" g="0" b="0"/>
-        </a:lnRef>
-        <a:fillRef idx="1">
-          <a:scrgbClr r="0" g="0" b="0"/>
-        </a:fillRef>
-        <a:effectRef idx="1">
-          <a:scrgbClr r="0" g="0" b="0"/>
-        </a:effectRef>
-        <a:fontRef idx="minor"/>
-      </dsp:style>
-    </dsp:sp>
-    <dsp:sp modelId="{101E96D3-015B-4EF7-8EA2-53264B737EF2}">
-      <dsp:nvSpPr>
-        <dsp:cNvPr id="0" name=""/>
-        <dsp:cNvSpPr/>
-      </dsp:nvSpPr>
-      <dsp:spPr>
-        <a:xfrm>
-          <a:off x="987552" y="208823"/>
-          <a:ext cx="2468880" cy="1670585"/>
-        </a:xfrm>
-        <a:prstGeom prst="downArrow">
-          <a:avLst/>
-        </a:prstGeom>
-        <a:solidFill>
-          <a:schemeClr val="accent2">
-            <a:hueOff val="0"/>
-            <a:satOff val="0"/>
-            <a:lumOff val="0"/>
-            <a:alphaOff val="0"/>
-          </a:schemeClr>
-        </a:solidFill>
-        <a:ln w="25400" cap="flat" cmpd="sng" algn="ctr">
-          <a:solidFill>
-            <a:schemeClr val="lt1">
-              <a:hueOff val="0"/>
-              <a:satOff val="0"/>
-              <a:lumOff val="0"/>
-              <a:alphaOff val="0"/>
-            </a:schemeClr>
-          </a:solidFill>
-          <a:prstDash val="solid"/>
-        </a:ln>
-        <a:effectLst/>
-      </dsp:spPr>
-      <dsp:style>
-        <a:lnRef idx="3">
-          <a:scrgbClr r="0" g="0" b="0"/>
-        </a:lnRef>
-        <a:fillRef idx="1">
-          <a:scrgbClr r="0" g="0" b="0"/>
-        </a:fillRef>
-        <a:effectRef idx="1">
-          <a:scrgbClr r="0" g="0" b="0"/>
-        </a:effectRef>
-        <a:fontRef idx="minor">
-          <a:schemeClr val="lt1"/>
-        </a:fontRef>
-      </dsp:style>
-    </dsp:sp>
-    <dsp:sp modelId="{70651148-8E8A-4C6B-91D8-97E934B89DEE}">
-      <dsp:nvSpPr>
-        <dsp:cNvPr id="0" name=""/>
-        <dsp:cNvSpPr/>
-      </dsp:nvSpPr>
-      <dsp:spPr>
-        <a:xfrm>
-          <a:off x="4361687" y="0"/>
-          <a:ext cx="2633472" cy="1754114"/>
-        </a:xfrm>
-        <a:prstGeom prst="rect">
-          <a:avLst/>
-        </a:prstGeom>
-        <a:noFill/>
-        <a:ln>
-          <a:noFill/>
-        </a:ln>
-        <a:effectLst/>
-      </dsp:spPr>
-      <dsp:style>
-        <a:lnRef idx="0">
-          <a:scrgbClr r="0" g="0" b="0"/>
-        </a:lnRef>
-        <a:fillRef idx="0">
-          <a:scrgbClr r="0" g="0" b="0"/>
-        </a:fillRef>
-        <a:effectRef idx="0">
-          <a:scrgbClr r="0" g="0" b="0"/>
-        </a:effectRef>
-        <a:fontRef idx="minor"/>
-      </dsp:style>
-      <dsp:txBody>
-        <a:bodyPr spcFirstLastPara="0" vert="horz" wrap="square" lIns="99568" tIns="99568" rIns="99568" bIns="99568" numCol="1" spcCol="1270" anchor="ctr" anchorCtr="0">
-          <a:noAutofit/>
-        </a:bodyPr>
-        <a:lstStyle/>
-        <a:p>
-          <a:pPr lvl="0" algn="l" defTabSz="622300">
-            <a:lnSpc>
-              <a:spcPct val="90000"/>
-            </a:lnSpc>
-            <a:spcBef>
-              <a:spcPct val="0"/>
-            </a:spcBef>
-            <a:spcAft>
-              <a:spcPct val="35000"/>
-            </a:spcAft>
-          </a:pPr>
-          <a:r>
-            <a:rPr lang="pl-PL" sz="1400" kern="1200" smtClean="0"/>
-            <a:t>Kernel AppDomain</a:t>
-          </a:r>
-          <a:endParaRPr lang="en-US" sz="1400" kern="1200" dirty="0"/>
-        </a:p>
-        <a:p>
-          <a:pPr marL="57150" lvl="1" indent="-57150" algn="l" defTabSz="488950">
-            <a:lnSpc>
-              <a:spcPct val="90000"/>
-            </a:lnSpc>
-            <a:spcBef>
-              <a:spcPct val="0"/>
-            </a:spcBef>
-            <a:spcAft>
-              <a:spcPct val="15000"/>
-            </a:spcAft>
-            <a:buChar char="••"/>
-          </a:pPr>
-          <a:r>
-            <a:rPr lang="pl-PL" sz="1100" kern="1200" smtClean="0"/>
-            <a:t>Domena aplikacji dla mechanizmów wewnętrznych frameworka </a:t>
-          </a:r>
-          <a:r>
-            <a:rPr lang="pl-PL" sz="1100" i="1" kern="1200" smtClean="0"/>
-            <a:t>Nomad</a:t>
-          </a:r>
-          <a:endParaRPr lang="en-US" sz="1100" i="1" kern="1200" dirty="0"/>
-        </a:p>
-        <a:p>
-          <a:pPr marL="57150" lvl="1" indent="-57150" algn="l" defTabSz="488950">
-            <a:lnSpc>
-              <a:spcPct val="90000"/>
-            </a:lnSpc>
-            <a:spcBef>
-              <a:spcPct val="0"/>
-            </a:spcBef>
-            <a:spcAft>
-              <a:spcPct val="15000"/>
-            </a:spcAft>
-            <a:buChar char="••"/>
-          </a:pPr>
-          <a:r>
-            <a:rPr lang="pl-PL" sz="1100" kern="1200" smtClean="0"/>
-            <a:t>Główne elementy:</a:t>
-          </a:r>
-          <a:endParaRPr lang="en-US" sz="1100" kern="1200" dirty="0"/>
-        </a:p>
-        <a:p>
-          <a:pPr marL="114300" lvl="2" indent="-57150" algn="l" defTabSz="488950">
-            <a:lnSpc>
-              <a:spcPct val="90000"/>
-            </a:lnSpc>
-            <a:spcBef>
-              <a:spcPct val="0"/>
-            </a:spcBef>
-            <a:spcAft>
-              <a:spcPct val="15000"/>
-            </a:spcAft>
-            <a:buChar char="••"/>
-          </a:pPr>
-          <a:r>
-            <a:rPr lang="pl-PL" sz="1100" kern="1200" smtClean="0"/>
-            <a:t>Nomad.Updater</a:t>
-          </a:r>
-          <a:endParaRPr lang="en-US" sz="1100" kern="1200" dirty="0"/>
-        </a:p>
-        <a:p>
-          <a:pPr marL="114300" lvl="2" indent="-57150" algn="l" defTabSz="488950">
-            <a:lnSpc>
-              <a:spcPct val="90000"/>
-            </a:lnSpc>
-            <a:spcBef>
-              <a:spcPct val="0"/>
-            </a:spcBef>
-            <a:spcAft>
-              <a:spcPct val="15000"/>
-            </a:spcAft>
-            <a:buChar char="••"/>
-          </a:pPr>
-          <a:r>
-            <a:rPr lang="pl-PL" sz="1100" kern="1200" smtClean="0"/>
-            <a:t>Nomad.Configuration</a:t>
-          </a:r>
-          <a:endParaRPr lang="en-US" sz="1100" kern="1200" dirty="0"/>
-        </a:p>
-        <a:p>
-          <a:pPr marL="114300" lvl="2" indent="-57150" algn="l" defTabSz="488950">
-            <a:lnSpc>
-              <a:spcPct val="90000"/>
-            </a:lnSpc>
-            <a:spcBef>
-              <a:spcPct val="0"/>
-            </a:spcBef>
-            <a:spcAft>
-              <a:spcPct val="15000"/>
-            </a:spcAft>
-            <a:buChar char="••"/>
-          </a:pPr>
-          <a:r>
-            <a:rPr lang="pl-PL" sz="1100" kern="1200" smtClean="0"/>
-            <a:t>Nomad.Filter</a:t>
-          </a:r>
-          <a:endParaRPr lang="en-US" sz="1100" kern="1200" dirty="0"/>
-        </a:p>
-      </dsp:txBody>
-      <dsp:txXfrm>
-        <a:off x="4361687" y="0"/>
-        <a:ext cx="2633472" cy="1754114"/>
-      </dsp:txXfrm>
-    </dsp:sp>
-    <dsp:sp modelId="{D5D142C7-7FA4-4B42-BA29-86564CE4BEDB}">
-      <dsp:nvSpPr>
-        <dsp:cNvPr id="0" name=""/>
-        <dsp:cNvSpPr/>
-      </dsp:nvSpPr>
-      <dsp:spPr>
-        <a:xfrm>
-          <a:off x="4773168" y="2297055"/>
-          <a:ext cx="2468880" cy="1670585"/>
-        </a:xfrm>
-        <a:prstGeom prst="upArrow">
-          <a:avLst/>
-        </a:prstGeom>
-        <a:solidFill>
-          <a:schemeClr val="accent2">
-            <a:hueOff val="-4710551"/>
-            <a:satOff val="-6290"/>
-            <a:lumOff val="3726"/>
-            <a:alphaOff val="0"/>
-          </a:schemeClr>
-        </a:solidFill>
-        <a:ln w="25400" cap="flat" cmpd="sng" algn="ctr">
-          <a:solidFill>
-            <a:schemeClr val="lt1">
-              <a:hueOff val="0"/>
-              <a:satOff val="0"/>
-              <a:lumOff val="0"/>
-              <a:alphaOff val="0"/>
-            </a:schemeClr>
-          </a:solidFill>
-          <a:prstDash val="solid"/>
-        </a:ln>
-        <a:effectLst/>
-      </dsp:spPr>
-      <dsp:style>
-        <a:lnRef idx="3">
-          <a:scrgbClr r="0" g="0" b="0"/>
-        </a:lnRef>
-        <a:fillRef idx="1">
-          <a:scrgbClr r="0" g="0" b="0"/>
-        </a:fillRef>
-        <a:effectRef idx="1">
-          <a:scrgbClr r="0" g="0" b="0"/>
-        </a:effectRef>
-        <a:fontRef idx="minor">
-          <a:schemeClr val="lt1"/>
-        </a:fontRef>
-      </dsp:style>
-    </dsp:sp>
-    <dsp:sp modelId="{279DAB11-C63E-437D-AA56-C040123F1BDE}">
-      <dsp:nvSpPr>
-        <dsp:cNvPr id="0" name=""/>
-        <dsp:cNvSpPr/>
-      </dsp:nvSpPr>
-      <dsp:spPr>
-        <a:xfrm>
-          <a:off x="1234440" y="2422349"/>
-          <a:ext cx="2633472" cy="1754114"/>
-        </a:xfrm>
-        <a:prstGeom prst="rect">
-          <a:avLst/>
-        </a:prstGeom>
-        <a:noFill/>
-        <a:ln>
-          <a:noFill/>
-        </a:ln>
-        <a:effectLst/>
-      </dsp:spPr>
-      <dsp:style>
-        <a:lnRef idx="0">
-          <a:scrgbClr r="0" g="0" b="0"/>
-        </a:lnRef>
-        <a:fillRef idx="0">
-          <a:scrgbClr r="0" g="0" b="0"/>
-        </a:fillRef>
-        <a:effectRef idx="0">
-          <a:scrgbClr r="0" g="0" b="0"/>
-        </a:effectRef>
-        <a:fontRef idx="minor"/>
-      </dsp:style>
-      <dsp:txBody>
-        <a:bodyPr spcFirstLastPara="0" vert="horz" wrap="square" lIns="99568" tIns="99568" rIns="99568" bIns="99568" numCol="1" spcCol="1270" anchor="ctr" anchorCtr="0">
-          <a:noAutofit/>
-        </a:bodyPr>
-        <a:lstStyle/>
-        <a:p>
-          <a:pPr lvl="0" algn="l" defTabSz="622300">
-            <a:lnSpc>
-              <a:spcPct val="90000"/>
-            </a:lnSpc>
-            <a:spcBef>
-              <a:spcPct val="0"/>
-            </a:spcBef>
-            <a:spcAft>
-              <a:spcPct val="35000"/>
-            </a:spcAft>
-          </a:pPr>
-          <a:r>
-            <a:rPr lang="pl-PL" sz="1400" kern="1200" smtClean="0"/>
-            <a:t>Modules AppDomain</a:t>
-          </a:r>
-          <a:endParaRPr lang="en-US" sz="1400" kern="1200" dirty="0"/>
-        </a:p>
-        <a:p>
-          <a:pPr marL="57150" lvl="1" indent="-57150" algn="l" defTabSz="488950">
-            <a:lnSpc>
-              <a:spcPct val="90000"/>
-            </a:lnSpc>
-            <a:spcBef>
-              <a:spcPct val="0"/>
-            </a:spcBef>
-            <a:spcAft>
-              <a:spcPct val="15000"/>
-            </a:spcAft>
-            <a:buChar char="••"/>
-          </a:pPr>
-          <a:r>
-            <a:rPr lang="pl-PL" sz="1100" kern="1200" smtClean="0"/>
-            <a:t>Domena aplikacji dla modułów oraz aplikacji hostującej</a:t>
-          </a:r>
-          <a:endParaRPr lang="en-US" sz="1100" kern="1200" dirty="0"/>
-        </a:p>
-        <a:p>
-          <a:pPr marL="57150" lvl="1" indent="-57150" algn="l" defTabSz="488950">
-            <a:lnSpc>
-              <a:spcPct val="90000"/>
-            </a:lnSpc>
-            <a:spcBef>
-              <a:spcPct val="0"/>
-            </a:spcBef>
-            <a:spcAft>
-              <a:spcPct val="15000"/>
-            </a:spcAft>
-            <a:buChar char="••"/>
-          </a:pPr>
-          <a:r>
-            <a:rPr lang="pl-PL" sz="1100" kern="1200" smtClean="0"/>
-            <a:t>Główne elementy:</a:t>
-          </a:r>
-          <a:endParaRPr lang="en-US" sz="1100" kern="1200" dirty="0"/>
-        </a:p>
-        <a:p>
-          <a:pPr marL="114300" lvl="2" indent="-57150" algn="l" defTabSz="488950">
-            <a:lnSpc>
-              <a:spcPct val="90000"/>
-            </a:lnSpc>
-            <a:spcBef>
-              <a:spcPct val="0"/>
-            </a:spcBef>
-            <a:spcAft>
-              <a:spcPct val="15000"/>
-            </a:spcAft>
-            <a:buChar char="••"/>
-          </a:pPr>
-          <a:r>
-            <a:rPr lang="pl-PL" sz="1100" kern="1200" smtClean="0"/>
-            <a:t>Moduły</a:t>
-          </a:r>
-          <a:endParaRPr lang="en-US" sz="1100" kern="1200" dirty="0"/>
-        </a:p>
-        <a:p>
-          <a:pPr marL="114300" lvl="2" indent="-57150" algn="l" defTabSz="488950">
-            <a:lnSpc>
-              <a:spcPct val="90000"/>
-            </a:lnSpc>
-            <a:spcBef>
-              <a:spcPct val="0"/>
-            </a:spcBef>
-            <a:spcAft>
-              <a:spcPct val="15000"/>
-            </a:spcAft>
-            <a:buChar char="••"/>
-          </a:pPr>
-          <a:r>
-            <a:rPr lang="pl-PL" sz="1100" kern="1200" smtClean="0"/>
-            <a:t>Aplikacji hostująca </a:t>
-          </a:r>
-          <a:endParaRPr lang="en-US" sz="1100" kern="1200" dirty="0"/>
-        </a:p>
-        <a:p>
-          <a:pPr marL="114300" lvl="2" indent="-57150" algn="l" defTabSz="488950">
-            <a:lnSpc>
-              <a:spcPct val="90000"/>
-            </a:lnSpc>
-            <a:spcBef>
-              <a:spcPct val="0"/>
-            </a:spcBef>
-            <a:spcAft>
-              <a:spcPct val="15000"/>
-            </a:spcAft>
-            <a:buChar char="••"/>
-          </a:pPr>
-          <a:r>
-            <a:rPr lang="pl-PL" sz="1100" kern="1200" smtClean="0"/>
-            <a:t>Nomad.ModuleLoader</a:t>
-          </a:r>
-          <a:endParaRPr lang="en-US" sz="1100" kern="1200" dirty="0"/>
-        </a:p>
-        <a:p>
-          <a:pPr marL="114300" lvl="2" indent="-57150" algn="l" defTabSz="488950">
-            <a:lnSpc>
-              <a:spcPct val="90000"/>
-            </a:lnSpc>
-            <a:spcBef>
-              <a:spcPct val="0"/>
-            </a:spcBef>
-            <a:spcAft>
-              <a:spcPct val="15000"/>
-            </a:spcAft>
-            <a:buChar char="••"/>
-          </a:pPr>
-          <a:r>
-            <a:rPr lang="pl-PL" sz="1100" kern="1200" smtClean="0"/>
-            <a:t>Nomad.Communication</a:t>
-          </a:r>
-          <a:endParaRPr lang="en-US" sz="1100" kern="1200" dirty="0"/>
-        </a:p>
-      </dsp:txBody>
-      <dsp:txXfrm>
-        <a:off x="1234440" y="2422349"/>
-        <a:ext cx="2633472" cy="1754114"/>
-      </dsp:txXfrm>
-    </dsp:sp>
   </dsp:spTree>
 </dsp:drawing>
 </file>
@@ -10149,584 +9449,6 @@
       <dsp:cNvGrpSpPr/>
     </dsp:nvGrpSpPr>
     <dsp:grpSpPr/>
-    <dsp:sp modelId="{7BC2E876-2247-419D-A5F0-4D061FAF11D6}">
-      <dsp:nvSpPr>
-        <dsp:cNvPr id="0" name=""/>
-        <dsp:cNvSpPr/>
-      </dsp:nvSpPr>
-      <dsp:spPr>
-        <a:xfrm>
-          <a:off x="3151842" y="1440546"/>
-          <a:ext cx="1925915" cy="1925915"/>
-        </a:xfrm>
-        <a:prstGeom prst="ellipse">
-          <a:avLst/>
-        </a:prstGeom>
-        <a:solidFill>
-          <a:schemeClr val="accent1"/>
-        </a:solidFill>
-        <a:ln w="15875" cap="flat" cmpd="sng" algn="ctr">
-          <a:solidFill>
-            <a:schemeClr val="accent1">
-              <a:shade val="50000"/>
-              <a:shade val="75000"/>
-              <a:lumMod val="80000"/>
-            </a:schemeClr>
-          </a:solidFill>
-          <a:prstDash val="solid"/>
-        </a:ln>
-        <a:effectLst/>
-      </dsp:spPr>
-      <dsp:style>
-        <a:lnRef idx="2">
-          <a:schemeClr val="accent1">
-            <a:shade val="50000"/>
-          </a:schemeClr>
-        </a:lnRef>
-        <a:fillRef idx="1">
-          <a:schemeClr val="accent1"/>
-        </a:fillRef>
-        <a:effectRef idx="0">
-          <a:schemeClr val="accent1"/>
-        </a:effectRef>
-        <a:fontRef idx="minor">
-          <a:schemeClr val="lt1"/>
-        </a:fontRef>
-      </dsp:style>
-      <dsp:txBody>
-        <a:bodyPr spcFirstLastPara="0" vert="horz" wrap="square" lIns="6985" tIns="6985" rIns="6985" bIns="6985" numCol="1" spcCol="1270" anchor="ctr" anchorCtr="0">
-          <a:noAutofit/>
-        </a:bodyPr>
-        <a:lstStyle/>
-        <a:p>
-          <a:pPr lvl="0" algn="ctr" defTabSz="488950">
-            <a:lnSpc>
-              <a:spcPct val="90000"/>
-            </a:lnSpc>
-            <a:spcBef>
-              <a:spcPct val="0"/>
-            </a:spcBef>
-            <a:spcAft>
-              <a:spcPct val="35000"/>
-            </a:spcAft>
-          </a:pPr>
-          <a:r>
-            <a:rPr lang="pl-PL" sz="1100" kern="1200" dirty="0" err="1" smtClean="0"/>
-            <a:t>Nomad.ServiceLocator</a:t>
-          </a:r>
-          <a:r>
-            <a:rPr lang="pl-PL" sz="1100" kern="1200" dirty="0" smtClean="0"/>
-            <a:t> </a:t>
-          </a:r>
-          <a:r>
-            <a:rPr lang="pl-PL" sz="1100" i="1" kern="1200" dirty="0" smtClean="0"/>
-            <a:t>(</a:t>
-          </a:r>
-          <a:r>
-            <a:rPr lang="pl-PL" sz="1100" i="1" kern="1200" dirty="0" err="1" smtClean="0"/>
-            <a:t>framework</a:t>
-          </a:r>
-          <a:r>
-            <a:rPr lang="pl-PL" sz="1100" i="1" kern="1200" dirty="0" smtClean="0"/>
-            <a:t> element)</a:t>
-          </a:r>
-          <a:endParaRPr lang="en-US" sz="1100" i="1" kern="1200" dirty="0"/>
-        </a:p>
-      </dsp:txBody>
-      <dsp:txXfrm>
-        <a:off x="3433886" y="1722590"/>
-        <a:ext cx="1361827" cy="1361827"/>
-      </dsp:txXfrm>
-    </dsp:sp>
-    <dsp:sp modelId="{2EE2C337-2AB3-4E32-9DE0-BF6CA5ED66D8}">
-      <dsp:nvSpPr>
-        <dsp:cNvPr id="0" name=""/>
-        <dsp:cNvSpPr/>
-      </dsp:nvSpPr>
-      <dsp:spPr>
-        <a:xfrm rot="16200000">
-          <a:off x="4073896" y="1384956"/>
-          <a:ext cx="81807" cy="29373"/>
-        </a:xfrm>
-        <a:custGeom>
-          <a:avLst/>
-          <a:gdLst/>
-          <a:ahLst/>
-          <a:cxnLst/>
-          <a:rect l="0" t="0" r="0" b="0"/>
-          <a:pathLst>
-            <a:path>
-              <a:moveTo>
-                <a:pt x="0" y="14686"/>
-              </a:moveTo>
-              <a:lnTo>
-                <a:pt x="81807" y="14686"/>
-              </a:lnTo>
-            </a:path>
-          </a:pathLst>
-        </a:custGeom>
-        <a:noFill/>
-        <a:ln w="15875" cap="flat" cmpd="sng" algn="ctr">
-          <a:solidFill>
-            <a:schemeClr val="accent2">
-              <a:hueOff val="0"/>
-              <a:satOff val="0"/>
-              <a:lumOff val="0"/>
-              <a:alphaOff val="0"/>
-            </a:schemeClr>
-          </a:solidFill>
-          <a:prstDash val="solid"/>
-        </a:ln>
-        <a:effectLst/>
-      </dsp:spPr>
-      <dsp:style>
-        <a:lnRef idx="2">
-          <a:scrgbClr r="0" g="0" b="0"/>
-        </a:lnRef>
-        <a:fillRef idx="0">
-          <a:scrgbClr r="0" g="0" b="0"/>
-        </a:fillRef>
-        <a:effectRef idx="0">
-          <a:scrgbClr r="0" g="0" b="0"/>
-        </a:effectRef>
-        <a:fontRef idx="minor"/>
-      </dsp:style>
-      <dsp:txBody>
-        <a:bodyPr spcFirstLastPara="0" vert="horz" wrap="square" lIns="12700" tIns="0" rIns="12700" bIns="0" numCol="1" spcCol="1270" anchor="ctr" anchorCtr="0">
-          <a:noAutofit/>
-        </a:bodyPr>
-        <a:lstStyle/>
-        <a:p>
-          <a:pPr lvl="0" algn="ctr" defTabSz="222250">
-            <a:lnSpc>
-              <a:spcPct val="90000"/>
-            </a:lnSpc>
-            <a:spcBef>
-              <a:spcPct val="0"/>
-            </a:spcBef>
-            <a:spcAft>
-              <a:spcPct val="35000"/>
-            </a:spcAft>
-          </a:pPr>
-          <a:endParaRPr lang="en-US" sz="500" kern="1200"/>
-        </a:p>
-      </dsp:txBody>
-      <dsp:txXfrm>
-        <a:off x="4112754" y="1397597"/>
-        <a:ext cx="4090" cy="4090"/>
-      </dsp:txXfrm>
-    </dsp:sp>
-    <dsp:sp modelId="{85649CC4-960B-4B77-A6B2-FCC6734CC397}">
-      <dsp:nvSpPr>
-        <dsp:cNvPr id="0" name=""/>
-        <dsp:cNvSpPr/>
-      </dsp:nvSpPr>
-      <dsp:spPr>
-        <a:xfrm>
-          <a:off x="3443332" y="15804"/>
-          <a:ext cx="1342934" cy="1342934"/>
-        </a:xfrm>
-        <a:prstGeom prst="ellipse">
-          <a:avLst/>
-        </a:prstGeom>
-        <a:solidFill>
-          <a:schemeClr val="accent5"/>
-        </a:solidFill>
-        <a:ln w="15875" cap="flat" cmpd="sng" algn="ctr">
-          <a:solidFill>
-            <a:schemeClr val="accent5">
-              <a:shade val="50000"/>
-              <a:shade val="75000"/>
-              <a:lumMod val="80000"/>
-            </a:schemeClr>
-          </a:solidFill>
-          <a:prstDash val="solid"/>
-        </a:ln>
-        <a:effectLst/>
-      </dsp:spPr>
-      <dsp:style>
-        <a:lnRef idx="2">
-          <a:schemeClr val="accent5">
-            <a:shade val="50000"/>
-          </a:schemeClr>
-        </a:lnRef>
-        <a:fillRef idx="1">
-          <a:schemeClr val="accent5"/>
-        </a:fillRef>
-        <a:effectRef idx="0">
-          <a:schemeClr val="accent5"/>
-        </a:effectRef>
-        <a:fontRef idx="minor">
-          <a:schemeClr val="lt1"/>
-        </a:fontRef>
-      </dsp:style>
-      <dsp:txBody>
-        <a:bodyPr spcFirstLastPara="0" vert="horz" wrap="square" lIns="6350" tIns="6350" rIns="6350" bIns="6350" numCol="1" spcCol="1270" anchor="ctr" anchorCtr="0">
-          <a:noAutofit/>
-        </a:bodyPr>
-        <a:lstStyle/>
-        <a:p>
-          <a:pPr lvl="0" algn="ctr" defTabSz="444500">
-            <a:lnSpc>
-              <a:spcPct val="90000"/>
-            </a:lnSpc>
-            <a:spcBef>
-              <a:spcPct val="0"/>
-            </a:spcBef>
-            <a:spcAft>
-              <a:spcPct val="35000"/>
-            </a:spcAft>
-          </a:pPr>
-          <a:r>
-            <a:rPr lang="pl-PL" sz="1000" kern="1200" dirty="0" smtClean="0"/>
-            <a:t>Service </a:t>
-          </a:r>
-          <a:r>
-            <a:rPr lang="pl-PL" sz="1000" kern="1200" dirty="0" err="1" smtClean="0"/>
-            <a:t>Provider</a:t>
-          </a:r>
-          <a:r>
-            <a:rPr lang="pl-PL" sz="1000" kern="1200" dirty="0" smtClean="0"/>
-            <a:t> </a:t>
-          </a:r>
-          <a:r>
-            <a:rPr lang="pl-PL" sz="1000" kern="1200" dirty="0" err="1" smtClean="0"/>
-            <a:t>Implementation</a:t>
-          </a:r>
-          <a:r>
-            <a:rPr lang="pl-PL" sz="1000" kern="1200" dirty="0" smtClean="0"/>
-            <a:t> </a:t>
-          </a:r>
-          <a:r>
-            <a:rPr lang="pl-PL" sz="1000" i="1" kern="1200" dirty="0" err="1" smtClean="0"/>
-            <a:t>class</a:t>
-          </a:r>
-          <a:endParaRPr lang="en-US" sz="1000" i="1" kern="1200" dirty="0"/>
-        </a:p>
-      </dsp:txBody>
-      <dsp:txXfrm>
-        <a:off x="3640000" y="212472"/>
-        <a:ext cx="949598" cy="949598"/>
-      </dsp:txXfrm>
-    </dsp:sp>
-    <dsp:sp modelId="{EBD6F82F-5102-4FC5-AF12-F88CE6F7D1E8}">
-      <dsp:nvSpPr>
-        <dsp:cNvPr id="0" name=""/>
-        <dsp:cNvSpPr/>
-      </dsp:nvSpPr>
-      <dsp:spPr>
-        <a:xfrm rot="1850065">
-          <a:off x="4932712" y="2914786"/>
-          <a:ext cx="126408" cy="29373"/>
-        </a:xfrm>
-        <a:custGeom>
-          <a:avLst/>
-          <a:gdLst/>
-          <a:ahLst/>
-          <a:cxnLst/>
-          <a:rect l="0" t="0" r="0" b="0"/>
-          <a:pathLst>
-            <a:path>
-              <a:moveTo>
-                <a:pt x="0" y="14686"/>
-              </a:moveTo>
-              <a:lnTo>
-                <a:pt x="126408" y="14686"/>
-              </a:lnTo>
-            </a:path>
-          </a:pathLst>
-        </a:custGeom>
-        <a:noFill/>
-        <a:ln w="15875" cap="flat" cmpd="sng" algn="ctr">
-          <a:solidFill>
-            <a:schemeClr val="accent2">
-              <a:hueOff val="0"/>
-              <a:satOff val="0"/>
-              <a:lumOff val="0"/>
-              <a:alphaOff val="0"/>
-            </a:schemeClr>
-          </a:solidFill>
-          <a:prstDash val="solid"/>
-        </a:ln>
-        <a:effectLst/>
-      </dsp:spPr>
-      <dsp:style>
-        <a:lnRef idx="2">
-          <a:scrgbClr r="0" g="0" b="0"/>
-        </a:lnRef>
-        <a:fillRef idx="0">
-          <a:scrgbClr r="0" g="0" b="0"/>
-        </a:fillRef>
-        <a:effectRef idx="0">
-          <a:scrgbClr r="0" g="0" b="0"/>
-        </a:effectRef>
-        <a:fontRef idx="minor"/>
-      </dsp:style>
-      <dsp:txBody>
-        <a:bodyPr spcFirstLastPara="0" vert="horz" wrap="square" lIns="12700" tIns="0" rIns="12700" bIns="0" numCol="1" spcCol="1270" anchor="ctr" anchorCtr="0">
-          <a:noAutofit/>
-        </a:bodyPr>
-        <a:lstStyle/>
-        <a:p>
-          <a:pPr lvl="0" algn="ctr" defTabSz="222250">
-            <a:lnSpc>
-              <a:spcPct val="90000"/>
-            </a:lnSpc>
-            <a:spcBef>
-              <a:spcPct val="0"/>
-            </a:spcBef>
-            <a:spcAft>
-              <a:spcPct val="35000"/>
-            </a:spcAft>
-          </a:pPr>
-          <a:endParaRPr lang="en-US" sz="500" kern="1200"/>
-        </a:p>
-      </dsp:txBody>
-      <dsp:txXfrm>
-        <a:off x="4992756" y="2926312"/>
-        <a:ext cx="6320" cy="6320"/>
-      </dsp:txXfrm>
-    </dsp:sp>
-    <dsp:sp modelId="{5587CFFF-A9F9-4B92-93E9-8D3BAE5F08F0}">
-      <dsp:nvSpPr>
-        <dsp:cNvPr id="0" name=""/>
-        <dsp:cNvSpPr/>
-      </dsp:nvSpPr>
-      <dsp:spPr>
-        <a:xfrm>
-          <a:off x="4955276" y="2634567"/>
-          <a:ext cx="1342934" cy="1342934"/>
-        </a:xfrm>
-        <a:prstGeom prst="ellipse">
-          <a:avLst/>
-        </a:prstGeom>
-        <a:solidFill>
-          <a:schemeClr val="dk1"/>
-        </a:solidFill>
-        <a:ln w="15875" cap="flat" cmpd="sng" algn="ctr">
-          <a:solidFill>
-            <a:schemeClr val="dk1">
-              <a:shade val="50000"/>
-              <a:shade val="75000"/>
-              <a:lumMod val="80000"/>
-            </a:schemeClr>
-          </a:solidFill>
-          <a:prstDash val="solid"/>
-        </a:ln>
-        <a:effectLst/>
-      </dsp:spPr>
-      <dsp:style>
-        <a:lnRef idx="2">
-          <a:schemeClr val="dk1">
-            <a:shade val="50000"/>
-          </a:schemeClr>
-        </a:lnRef>
-        <a:fillRef idx="1">
-          <a:schemeClr val="dk1"/>
-        </a:fillRef>
-        <a:effectRef idx="0">
-          <a:schemeClr val="dk1"/>
-        </a:effectRef>
-        <a:fontRef idx="minor">
-          <a:schemeClr val="lt1"/>
-        </a:fontRef>
-      </dsp:style>
-      <dsp:txBody>
-        <a:bodyPr spcFirstLastPara="0" vert="horz" wrap="square" lIns="6350" tIns="6350" rIns="6350" bIns="6350" numCol="1" spcCol="1270" anchor="ctr" anchorCtr="0">
-          <a:noAutofit/>
-        </a:bodyPr>
-        <a:lstStyle/>
-        <a:p>
-          <a:pPr lvl="0" algn="ctr" defTabSz="444500">
-            <a:lnSpc>
-              <a:spcPct val="90000"/>
-            </a:lnSpc>
-            <a:spcBef>
-              <a:spcPct val="0"/>
-            </a:spcBef>
-            <a:spcAft>
-              <a:spcPct val="35000"/>
-            </a:spcAft>
-          </a:pPr>
-          <a:r>
-            <a:rPr lang="pl-PL" sz="1000" kern="1200" dirty="0" err="1" smtClean="0"/>
-            <a:t>Iservice</a:t>
-          </a:r>
-          <a:r>
-            <a:rPr lang="pl-PL" sz="1000" kern="1200" dirty="0" smtClean="0"/>
-            <a:t> </a:t>
-          </a:r>
-          <a:r>
-            <a:rPr lang="pl-PL" sz="1000" i="1" kern="1200" dirty="0" err="1" smtClean="0"/>
-            <a:t>interface</a:t>
-          </a:r>
-          <a:endParaRPr lang="en-US" sz="1000" i="1" kern="1200" dirty="0"/>
-        </a:p>
-      </dsp:txBody>
-      <dsp:txXfrm>
-        <a:off x="5151944" y="2831235"/>
-        <a:ext cx="949598" cy="949598"/>
-      </dsp:txXfrm>
-    </dsp:sp>
-    <dsp:sp modelId="{B16F53F6-AB78-48D6-867B-1816F27A02EE}">
-      <dsp:nvSpPr>
-        <dsp:cNvPr id="0" name=""/>
-        <dsp:cNvSpPr/>
-      </dsp:nvSpPr>
-      <dsp:spPr>
-        <a:xfrm rot="8949935">
-          <a:off x="3170479" y="2914786"/>
-          <a:ext cx="126408" cy="29373"/>
-        </a:xfrm>
-        <a:custGeom>
-          <a:avLst/>
-          <a:gdLst/>
-          <a:ahLst/>
-          <a:cxnLst/>
-          <a:rect l="0" t="0" r="0" b="0"/>
-          <a:pathLst>
-            <a:path>
-              <a:moveTo>
-                <a:pt x="0" y="14686"/>
-              </a:moveTo>
-              <a:lnTo>
-                <a:pt x="126408" y="14686"/>
-              </a:lnTo>
-            </a:path>
-          </a:pathLst>
-        </a:custGeom>
-        <a:noFill/>
-        <a:ln w="15875" cap="flat" cmpd="sng" algn="ctr">
-          <a:solidFill>
-            <a:schemeClr val="accent2">
-              <a:hueOff val="0"/>
-              <a:satOff val="0"/>
-              <a:lumOff val="0"/>
-              <a:alphaOff val="0"/>
-            </a:schemeClr>
-          </a:solidFill>
-          <a:prstDash val="solid"/>
-        </a:ln>
-        <a:effectLst/>
-      </dsp:spPr>
-      <dsp:style>
-        <a:lnRef idx="2">
-          <a:scrgbClr r="0" g="0" b="0"/>
-        </a:lnRef>
-        <a:fillRef idx="0">
-          <a:scrgbClr r="0" g="0" b="0"/>
-        </a:fillRef>
-        <a:effectRef idx="0">
-          <a:scrgbClr r="0" g="0" b="0"/>
-        </a:effectRef>
-        <a:fontRef idx="minor"/>
-      </dsp:style>
-      <dsp:txBody>
-        <a:bodyPr spcFirstLastPara="0" vert="horz" wrap="square" lIns="12700" tIns="0" rIns="12700" bIns="0" numCol="1" spcCol="1270" anchor="ctr" anchorCtr="0">
-          <a:noAutofit/>
-        </a:bodyPr>
-        <a:lstStyle/>
-        <a:p>
-          <a:pPr lvl="0" algn="ctr" defTabSz="222250">
-            <a:lnSpc>
-              <a:spcPct val="90000"/>
-            </a:lnSpc>
-            <a:spcBef>
-              <a:spcPct val="0"/>
-            </a:spcBef>
-            <a:spcAft>
-              <a:spcPct val="35000"/>
-            </a:spcAft>
-          </a:pPr>
-          <a:endParaRPr lang="en-US" sz="500" kern="1200"/>
-        </a:p>
-      </dsp:txBody>
-      <dsp:txXfrm rot="10800000">
-        <a:off x="3230523" y="2926312"/>
-        <a:ext cx="6320" cy="6320"/>
-      </dsp:txXfrm>
-    </dsp:sp>
-    <dsp:sp modelId="{01FD3103-B73F-4337-BCCB-E198DF1AC2D0}">
-      <dsp:nvSpPr>
-        <dsp:cNvPr id="0" name=""/>
-        <dsp:cNvSpPr/>
-      </dsp:nvSpPr>
-      <dsp:spPr>
-        <a:xfrm>
-          <a:off x="1931389" y="2634567"/>
-          <a:ext cx="1342934" cy="1342934"/>
-        </a:xfrm>
-        <a:prstGeom prst="ellipse">
-          <a:avLst/>
-        </a:prstGeom>
-        <a:solidFill>
-          <a:schemeClr val="accent3"/>
-        </a:solidFill>
-        <a:ln w="15875" cap="flat" cmpd="sng" algn="ctr">
-          <a:solidFill>
-            <a:schemeClr val="accent3">
-              <a:shade val="50000"/>
-              <a:shade val="75000"/>
-              <a:lumMod val="80000"/>
-            </a:schemeClr>
-          </a:solidFill>
-          <a:prstDash val="solid"/>
-        </a:ln>
-        <a:effectLst/>
-      </dsp:spPr>
-      <dsp:style>
-        <a:lnRef idx="2">
-          <a:schemeClr val="accent3">
-            <a:shade val="50000"/>
-          </a:schemeClr>
-        </a:lnRef>
-        <a:fillRef idx="1">
-          <a:schemeClr val="accent3"/>
-        </a:fillRef>
-        <a:effectRef idx="0">
-          <a:schemeClr val="accent3"/>
-        </a:effectRef>
-        <a:fontRef idx="minor">
-          <a:schemeClr val="lt1"/>
-        </a:fontRef>
-      </dsp:style>
-      <dsp:txBody>
-        <a:bodyPr spcFirstLastPara="0" vert="horz" wrap="square" lIns="6350" tIns="6350" rIns="6350" bIns="6350" numCol="1" spcCol="1270" anchor="ctr" anchorCtr="0">
-          <a:noAutofit/>
-        </a:bodyPr>
-        <a:lstStyle/>
-        <a:p>
-          <a:pPr lvl="0" algn="ctr" defTabSz="444500">
-            <a:lnSpc>
-              <a:spcPct val="90000"/>
-            </a:lnSpc>
-            <a:spcBef>
-              <a:spcPct val="0"/>
-            </a:spcBef>
-            <a:spcAft>
-              <a:spcPct val="35000"/>
-            </a:spcAft>
-          </a:pPr>
-          <a:r>
-            <a:rPr lang="pl-PL" sz="1000" kern="1200" dirty="0" err="1" smtClean="0"/>
-            <a:t>Client</a:t>
-          </a:r>
-          <a:r>
-            <a:rPr lang="pl-PL" sz="1000" kern="1200" dirty="0" smtClean="0"/>
-            <a:t> </a:t>
-          </a:r>
-          <a:r>
-            <a:rPr lang="pl-PL" sz="1000" i="1" kern="1200" dirty="0" err="1" smtClean="0"/>
-            <a:t>class</a:t>
-          </a:r>
-          <a:endParaRPr lang="en-US" sz="1000" i="1" kern="1200" dirty="0"/>
-        </a:p>
-      </dsp:txBody>
-      <dsp:txXfrm>
-        <a:off x="2128057" y="2831235"/>
-        <a:ext cx="949598" cy="949598"/>
-      </dsp:txXfrm>
-    </dsp:sp>
   </dsp:spTree>
 </dsp:drawing>
 </file>
@@ -34462,11 +33184,7 @@
           <a:p>
             <a:r>
               <a:rPr lang="pl-PL" dirty="0" smtClean="0"/>
-              <a:t>Harmonogram </a:t>
-            </a:r>
-            <a:r>
-              <a:rPr lang="pl-PL" dirty="0" smtClean="0"/>
-              <a:t>prac</a:t>
+              <a:t>Harmonogram prac</a:t>
             </a:r>
             <a:endParaRPr lang="pl-PL" dirty="0"/>
           </a:p>
@@ -35234,11 +33952,7 @@
           <a:p>
             <a:r>
               <a:rPr lang="pl-PL" dirty="0" smtClean="0"/>
-              <a:t>Inne </a:t>
-            </a:r>
-            <a:r>
-              <a:rPr lang="pl-PL" dirty="0" smtClean="0"/>
-              <a:t>technologie .NET</a:t>
+              <a:t>Inne technologie .NET</a:t>
             </a:r>
             <a:endParaRPr lang="pl-PL" dirty="0"/>
           </a:p>
@@ -35398,8 +34112,9 @@
             </a:pPr>
             <a:r>
               <a:rPr lang="pl-PL" dirty="0" smtClean="0"/>
-              <a:t>Sposób prowadzenia prac nad projektem</a:t>
-            </a:r>
+              <a:t>Technologie</a:t>
+            </a:r>
+            <a:endParaRPr lang="pl-PL" dirty="0" smtClean="0"/>
           </a:p>
           <a:p>
             <a:pPr marL="457200" indent="-457200">
@@ -35407,8 +34122,8 @@
               <a:buAutoNum type="arabicPeriod"/>
             </a:pPr>
             <a:r>
-              <a:rPr lang="pl-PL" dirty="0" smtClean="0"/>
-              <a:t>Technologie</a:t>
+              <a:rPr lang="pl-PL" dirty="0"/>
+              <a:t>Sposób prowadzenia prac nad projektem</a:t>
             </a:r>
           </a:p>
           <a:p>
@@ -35420,6 +34135,7 @@
               <a:rPr lang="pl-PL" dirty="0" smtClean="0"/>
               <a:t>Literatura</a:t>
             </a:r>
+            <a:endParaRPr lang="pl-PL" dirty="0" smtClean="0"/>
           </a:p>
           <a:p>
             <a:pPr marL="457200" indent="-457200">

</xml_diff>

<commit_message>
Proposed printable presentation and introduction page, as well as table of contents
</commit_message>
<xml_diff>
--- a/DiplomaSeminar/Presentation/Nomad.pptx
+++ b/DiplomaSeminar/Presentation/Nomad.pptx
@@ -5640,21 +5640,21 @@
     </dgm:pt>
   </dgm:ptLst>
   <dgm:cxnLst>
+    <dgm:cxn modelId="{6BFA967B-4BBF-4167-923A-D5E6E6695EA2}" type="presOf" srcId="{FACA9974-F514-42AE-B8C4-D648DEC6D854}" destId="{799DD9C6-3C9B-4CC8-A91D-15D8A3834572}" srcOrd="0" destOrd="0" presId="urn:microsoft.com/office/officeart/2008/layout/CircleAccentTimeline"/>
+    <dgm:cxn modelId="{3F81BD68-C9C0-40B1-A985-F501D7CBA430}" type="presOf" srcId="{11A3F655-3EF9-4F03-9C4B-85C780F54EE3}" destId="{D05FFCA1-2E7C-4D1F-9FED-8EFF20B9CE35}" srcOrd="0" destOrd="0" presId="urn:microsoft.com/office/officeart/2008/layout/CircleAccentTimeline"/>
+    <dgm:cxn modelId="{57B3A68F-9BF2-41D1-8BC2-E04C0E8BBE5C}" type="presOf" srcId="{6109EB1C-E30D-4B0A-BE86-82D7060D372C}" destId="{3A11F2A9-2B64-4117-9555-87A75585009C}" srcOrd="0" destOrd="0" presId="urn:microsoft.com/office/officeart/2008/layout/CircleAccentTimeline"/>
+    <dgm:cxn modelId="{FB78107B-A789-4BEC-8D2B-BEEE02EBA233}" srcId="{66C8A9D5-A511-4691-8834-0E2A2F03E233}" destId="{841FBED4-6A22-4BB5-AA77-42AA593E8EA3}" srcOrd="2" destOrd="0" parTransId="{D0BB4DC8-5230-43D3-98F7-EC4B3D4A0F30}" sibTransId="{9473F862-9139-4F65-A233-01025AD62FA8}"/>
+    <dgm:cxn modelId="{9B3C7349-20EA-44C1-8614-B535FC455E7B}" type="presOf" srcId="{53BD8052-45D3-4243-A64E-C9F2DA9F4DA5}" destId="{9B18F506-9523-4911-BBD0-FF59C79FC6D5}" srcOrd="0" destOrd="0" presId="urn:microsoft.com/office/officeart/2008/layout/CircleAccentTimeline"/>
+    <dgm:cxn modelId="{9F63BF0E-5EFF-43BC-A6D6-A5AB733D2E99}" srcId="{66C8A9D5-A511-4691-8834-0E2A2F03E233}" destId="{87150A97-6DBF-45F9-8F77-AFAB8ABCA0E4}" srcOrd="0" destOrd="0" parTransId="{A4245465-50D4-4D83-A828-18266A1B3724}" sibTransId="{BF1F5063-6CD7-46B4-8A0B-419536BD6C56}"/>
+    <dgm:cxn modelId="{0795A59F-2143-4796-916F-C9C660C9776B}" srcId="{53BD8052-45D3-4243-A64E-C9F2DA9F4DA5}" destId="{6109EB1C-E30D-4B0A-BE86-82D7060D372C}" srcOrd="0" destOrd="0" parTransId="{BB3383F3-FA45-4C92-AD3A-3B7C011949A0}" sibTransId="{AFBDBADC-7713-49CE-A306-94E47A259065}"/>
+    <dgm:cxn modelId="{1F66E49E-51D7-40DC-9107-12C97B93F9BC}" srcId="{66C8A9D5-A511-4691-8834-0E2A2F03E233}" destId="{53BD8052-45D3-4243-A64E-C9F2DA9F4DA5}" srcOrd="1" destOrd="0" parTransId="{F9C8ABFC-023D-4669-9911-DC459FA07062}" sibTransId="{A28ECB6E-B24D-4C18-B2DE-DDC66A8EE8BE}"/>
     <dgm:cxn modelId="{FD372381-0452-4061-B78A-3E46733B4624}" type="presOf" srcId="{87150A97-6DBF-45F9-8F77-AFAB8ABCA0E4}" destId="{C5BB215C-79FA-45E5-8DA9-95955DDE3269}" srcOrd="0" destOrd="0" presId="urn:microsoft.com/office/officeart/2008/layout/CircleAccentTimeline"/>
     <dgm:cxn modelId="{C1CAB55E-2FBA-4A16-BDFA-F1BF5510C383}" srcId="{66C8A9D5-A511-4691-8834-0E2A2F03E233}" destId="{11A3F655-3EF9-4F03-9C4B-85C780F54EE3}" srcOrd="3" destOrd="0" parTransId="{4373D15D-1F56-4851-8705-B23E32F7527E}" sibTransId="{C0DC02E4-659E-46F7-9349-D9B138383A57}"/>
+    <dgm:cxn modelId="{D34B5E38-3309-4934-A102-80A260F01001}" type="presOf" srcId="{66C8A9D5-A511-4691-8834-0E2A2F03E233}" destId="{ABF5C3B9-0F97-4C04-94B5-5B40073841AD}" srcOrd="0" destOrd="0" presId="urn:microsoft.com/office/officeart/2008/layout/CircleAccentTimeline"/>
     <dgm:cxn modelId="{CA644598-5240-42E9-9916-B0B0AC78B3FE}" srcId="{66C8A9D5-A511-4691-8834-0E2A2F03E233}" destId="{FACA9974-F514-42AE-B8C4-D648DEC6D854}" srcOrd="5" destOrd="0" parTransId="{F1D54409-BC28-4A8F-9CE6-A1B9C802CFDB}" sibTransId="{B1E0A530-BF8B-4254-96EB-14FFFD712D65}"/>
-    <dgm:cxn modelId="{57B3A68F-9BF2-41D1-8BC2-E04C0E8BBE5C}" type="presOf" srcId="{6109EB1C-E30D-4B0A-BE86-82D7060D372C}" destId="{3A11F2A9-2B64-4117-9555-87A75585009C}" srcOrd="0" destOrd="0" presId="urn:microsoft.com/office/officeart/2008/layout/CircleAccentTimeline"/>
-    <dgm:cxn modelId="{0795A59F-2143-4796-916F-C9C660C9776B}" srcId="{53BD8052-45D3-4243-A64E-C9F2DA9F4DA5}" destId="{6109EB1C-E30D-4B0A-BE86-82D7060D372C}" srcOrd="0" destOrd="0" parTransId="{BB3383F3-FA45-4C92-AD3A-3B7C011949A0}" sibTransId="{AFBDBADC-7713-49CE-A306-94E47A259065}"/>
-    <dgm:cxn modelId="{BB545400-67E8-4D09-B358-38D55D57438D}" type="presOf" srcId="{841FBED4-6A22-4BB5-AA77-42AA593E8EA3}" destId="{351E05D6-ACB0-4E7C-B5F7-0608CB17B533}" srcOrd="0" destOrd="0" presId="urn:microsoft.com/office/officeart/2008/layout/CircleAccentTimeline"/>
-    <dgm:cxn modelId="{D34B5E38-3309-4934-A102-80A260F01001}" type="presOf" srcId="{66C8A9D5-A511-4691-8834-0E2A2F03E233}" destId="{ABF5C3B9-0F97-4C04-94B5-5B40073841AD}" srcOrd="0" destOrd="0" presId="urn:microsoft.com/office/officeart/2008/layout/CircleAccentTimeline"/>
-    <dgm:cxn modelId="{FB78107B-A789-4BEC-8D2B-BEEE02EBA233}" srcId="{66C8A9D5-A511-4691-8834-0E2A2F03E233}" destId="{841FBED4-6A22-4BB5-AA77-42AA593E8EA3}" srcOrd="2" destOrd="0" parTransId="{D0BB4DC8-5230-43D3-98F7-EC4B3D4A0F30}" sibTransId="{9473F862-9139-4F65-A233-01025AD62FA8}"/>
-    <dgm:cxn modelId="{6BFA967B-4BBF-4167-923A-D5E6E6695EA2}" type="presOf" srcId="{FACA9974-F514-42AE-B8C4-D648DEC6D854}" destId="{799DD9C6-3C9B-4CC8-A91D-15D8A3834572}" srcOrd="0" destOrd="0" presId="urn:microsoft.com/office/officeart/2008/layout/CircleAccentTimeline"/>
     <dgm:cxn modelId="{3840BCA4-4165-4C8A-BA10-77504A20A6DB}" type="presOf" srcId="{2A8C94CB-EF5E-4BCF-A160-6E35A562C5CB}" destId="{27CA7B10-1396-42CC-8C5D-2BFA71B13E84}" srcOrd="0" destOrd="0" presId="urn:microsoft.com/office/officeart/2008/layout/CircleAccentTimeline"/>
     <dgm:cxn modelId="{F9A6AC05-71AC-4F1D-82DC-E720F4226329}" srcId="{66C8A9D5-A511-4691-8834-0E2A2F03E233}" destId="{2A8C94CB-EF5E-4BCF-A160-6E35A562C5CB}" srcOrd="4" destOrd="0" parTransId="{17E28C37-737C-4BC3-9C89-373622AABEF5}" sibTransId="{25EB9398-F697-4215-B829-EE621DE2D087}"/>
-    <dgm:cxn modelId="{9B3C7349-20EA-44C1-8614-B535FC455E7B}" type="presOf" srcId="{53BD8052-45D3-4243-A64E-C9F2DA9F4DA5}" destId="{9B18F506-9523-4911-BBD0-FF59C79FC6D5}" srcOrd="0" destOrd="0" presId="urn:microsoft.com/office/officeart/2008/layout/CircleAccentTimeline"/>
-    <dgm:cxn modelId="{3F81BD68-C9C0-40B1-A985-F501D7CBA430}" type="presOf" srcId="{11A3F655-3EF9-4F03-9C4B-85C780F54EE3}" destId="{D05FFCA1-2E7C-4D1F-9FED-8EFF20B9CE35}" srcOrd="0" destOrd="0" presId="urn:microsoft.com/office/officeart/2008/layout/CircleAccentTimeline"/>
-    <dgm:cxn modelId="{9F63BF0E-5EFF-43BC-A6D6-A5AB733D2E99}" srcId="{66C8A9D5-A511-4691-8834-0E2A2F03E233}" destId="{87150A97-6DBF-45F9-8F77-AFAB8ABCA0E4}" srcOrd="0" destOrd="0" parTransId="{A4245465-50D4-4D83-A828-18266A1B3724}" sibTransId="{BF1F5063-6CD7-46B4-8A0B-419536BD6C56}"/>
-    <dgm:cxn modelId="{1F66E49E-51D7-40DC-9107-12C97B93F9BC}" srcId="{66C8A9D5-A511-4691-8834-0E2A2F03E233}" destId="{53BD8052-45D3-4243-A64E-C9F2DA9F4DA5}" srcOrd="1" destOrd="0" parTransId="{F9C8ABFC-023D-4669-9911-DC459FA07062}" sibTransId="{A28ECB6E-B24D-4C18-B2DE-DDC66A8EE8BE}"/>
+    <dgm:cxn modelId="{BB545400-67E8-4D09-B358-38D55D57438D}" type="presOf" srcId="{841FBED4-6A22-4BB5-AA77-42AA593E8EA3}" destId="{351E05D6-ACB0-4E7C-B5F7-0608CB17B533}" srcOrd="0" destOrd="0" presId="urn:microsoft.com/office/officeart/2008/layout/CircleAccentTimeline"/>
     <dgm:cxn modelId="{464E3C5E-2C12-4B50-B55F-1A7CCED451A8}" type="presParOf" srcId="{ABF5C3B9-0F97-4C04-94B5-5B40073841AD}" destId="{04C55A90-DA85-47F5-9FF4-DA76DBF918FA}" srcOrd="0" destOrd="0" presId="urn:microsoft.com/office/officeart/2008/layout/CircleAccentTimeline"/>
     <dgm:cxn modelId="{30B19B94-BC86-4D10-9C7F-57AF639578E1}" type="presParOf" srcId="{04C55A90-DA85-47F5-9FF4-DA76DBF918FA}" destId="{557D0E74-E10B-46FA-BCE3-41310438E755}" srcOrd="0" destOrd="0" presId="urn:microsoft.com/office/officeart/2008/layout/CircleAccentTimeline"/>
     <dgm:cxn modelId="{8CC52639-754C-409F-A869-75E83A776904}" type="presParOf" srcId="{04C55A90-DA85-47F5-9FF4-DA76DBF918FA}" destId="{C5BB215C-79FA-45E5-8DA9-95955DDE3269}" srcOrd="1" destOrd="0" presId="urn:microsoft.com/office/officeart/2008/layout/CircleAccentTimeline"/>
@@ -6188,8 +6188,8 @@
     <dgm:cxn modelId="{21021F79-3A12-43BF-A122-A2846A85E85F}" type="presOf" srcId="{69BBD355-D2A4-4764-B695-F34638BF0EDF}" destId="{B7446641-A5CE-4714-AD45-58BF2E2FBE5C}" srcOrd="0" destOrd="0" presId="urn:microsoft.com/office/officeart/2005/8/layout/vList2"/>
     <dgm:cxn modelId="{22D9C0F1-7F9A-48F3-9FBA-3B1D3FC38805}" srcId="{3EF89E1A-B411-4AFF-9D91-FA157E1C7815}" destId="{D07F5768-424A-491F-9206-FCE271B486B4}" srcOrd="0" destOrd="0" parTransId="{0612E8AE-1645-4225-B6B4-82C7CF584574}" sibTransId="{B8660CAE-1801-4285-B301-29E6DF700597}"/>
     <dgm:cxn modelId="{143A6066-900F-4F1C-A20C-ADCE9B9ACDAA}" type="presOf" srcId="{FDC404B8-AB8E-4125-9016-788DC17C2A5C}" destId="{34C9512A-FF83-4398-BCEE-7BDF825FADE0}" srcOrd="0" destOrd="2" presId="urn:microsoft.com/office/officeart/2005/8/layout/vList2"/>
+    <dgm:cxn modelId="{9BABAE71-808E-42CA-8E90-CD06D0AFD54E}" srcId="{B00FCBDC-63DD-4770-9FB8-48D97E57B25C}" destId="{C672440E-ACFB-4BBC-8FB7-D59CABD9119B}" srcOrd="0" destOrd="0" parTransId="{6223E22C-8184-40BE-ABEF-8E8E28A59D38}" sibTransId="{DF21DC3A-9A2A-4F09-B6CF-C89A741D2A07}"/>
     <dgm:cxn modelId="{5871D5BC-A405-4401-8B94-1D5D45AA0DD9}" srcId="{3EF89E1A-B411-4AFF-9D91-FA157E1C7815}" destId="{FDC404B8-AB8E-4125-9016-788DC17C2A5C}" srcOrd="2" destOrd="0" parTransId="{DD6B06DC-AA33-442A-A369-4659B85344DE}" sibTransId="{EC999164-6384-4026-B593-7F5A70248221}"/>
-    <dgm:cxn modelId="{9BABAE71-808E-42CA-8E90-CD06D0AFD54E}" srcId="{B00FCBDC-63DD-4770-9FB8-48D97E57B25C}" destId="{C672440E-ACFB-4BBC-8FB7-D59CABD9119B}" srcOrd="0" destOrd="0" parTransId="{6223E22C-8184-40BE-ABEF-8E8E28A59D38}" sibTransId="{DF21DC3A-9A2A-4F09-B6CF-C89A741D2A07}"/>
     <dgm:cxn modelId="{4D2C5C87-CA0D-4DA8-92DD-BEBC7444E7F6}" type="presOf" srcId="{12CAD89E-A720-465B-A4EE-C88904DA23DD}" destId="{7B46D0AC-A2A5-47EC-AC59-991C8FDA1110}" srcOrd="0" destOrd="0" presId="urn:microsoft.com/office/officeart/2005/8/layout/vList2"/>
     <dgm:cxn modelId="{1A0523CB-E03C-4E60-834B-32CA20B463A7}" type="presOf" srcId="{D07F5768-424A-491F-9206-FCE271B486B4}" destId="{34C9512A-FF83-4398-BCEE-7BDF825FADE0}" srcOrd="0" destOrd="0" presId="urn:microsoft.com/office/officeart/2005/8/layout/vList2"/>
     <dgm:cxn modelId="{7A5659F0-0B36-4902-9D2B-A9D097FBC353}" srcId="{CC5DFCFB-6EFC-4800-A880-633249796CC0}" destId="{69BBD355-D2A4-4764-B695-F34638BF0EDF}" srcOrd="0" destOrd="0" parTransId="{DE359CF0-7FC0-4641-BE39-EEC6296E90E0}" sibTransId="{AF082E64-AD00-4B55-BB41-678F5A16B770}"/>
@@ -6349,7 +6349,11 @@
         <a:p>
           <a:r>
             <a:rPr lang="pl-PL" dirty="0" smtClean="0"/>
-            <a:t>Komunikację modułów między sobą</a:t>
+            <a:t>Komunikacja </a:t>
+          </a:r>
+          <a:r>
+            <a:rPr lang="pl-PL" dirty="0" smtClean="0"/>
+            <a:t>modułów między sobą</a:t>
           </a:r>
           <a:endParaRPr lang="en-US" dirty="0"/>
         </a:p>
@@ -7188,14 +7192,14 @@
     <dgm:cxn modelId="{41658FD2-1F35-486B-9A35-E804FD485AD2}" type="presOf" srcId="{C2F0927A-8D32-47D6-BDA2-D52756317565}" destId="{279DAB11-C63E-437D-AA56-C040123F1BDE}" srcOrd="0" destOrd="1" presId="urn:microsoft.com/office/officeart/2005/8/layout/arrow3"/>
     <dgm:cxn modelId="{A1783A2D-09BC-4AB6-B141-3A05D027AEF6}" srcId="{72E21ABC-5CD2-479F-AC64-5AB40DE881D6}" destId="{C2F0927A-8D32-47D6-BDA2-D52756317565}" srcOrd="0" destOrd="0" parTransId="{700C93D1-4CD6-4ABE-AE0D-0D9F00F6BB16}" sibTransId="{C14FDFD0-F631-41BF-8298-3756F5936830}"/>
     <dgm:cxn modelId="{0C7B7981-DD97-4AF8-BC51-0AA1369CB8F4}" srcId="{DCBEC0E3-5624-4D92-9946-307953A8B724}" destId="{FCE8F31F-7A44-4AD4-A412-6F222ABF72C9}" srcOrd="0" destOrd="0" parTransId="{5B788506-5039-465C-A3F3-FF0171BFB2D0}" sibTransId="{9E27E849-840A-4DD2-876F-8565C43A9852}"/>
+    <dgm:cxn modelId="{86F5A944-21B9-44DB-B120-97D14348D8A2}" type="presOf" srcId="{72E21ABC-5CD2-479F-AC64-5AB40DE881D6}" destId="{279DAB11-C63E-437D-AA56-C040123F1BDE}" srcOrd="0" destOrd="0" presId="urn:microsoft.com/office/officeart/2005/8/layout/arrow3"/>
     <dgm:cxn modelId="{33D34674-3E0F-4BBA-93D1-97E1CAF2A064}" type="presOf" srcId="{E29F1F7F-8CCA-44EE-9444-53753B44571C}" destId="{70651148-8E8A-4C6B-91D8-97E934B89DEE}" srcOrd="0" destOrd="2" presId="urn:microsoft.com/office/officeart/2005/8/layout/arrow3"/>
-    <dgm:cxn modelId="{86F5A944-21B9-44DB-B120-97D14348D8A2}" type="presOf" srcId="{72E21ABC-5CD2-479F-AC64-5AB40DE881D6}" destId="{279DAB11-C63E-437D-AA56-C040123F1BDE}" srcOrd="0" destOrd="0" presId="urn:microsoft.com/office/officeart/2005/8/layout/arrow3"/>
     <dgm:cxn modelId="{B7AD979B-A77A-4BDF-A9A3-6FBF68863E73}" srcId="{72E21ABC-5CD2-479F-AC64-5AB40DE881D6}" destId="{6511B3B1-9A0E-4A47-917B-0E1278C205F8}" srcOrd="1" destOrd="0" parTransId="{23F22305-F37C-49C4-9167-79B2B1F33B2B}" sibTransId="{E09AD098-AD84-4F9B-8A86-1C44217EBCB5}"/>
     <dgm:cxn modelId="{DFEF0154-ADDB-44E9-A96D-FBCF09B023ED}" type="presOf" srcId="{B6CF040B-974D-4F47-B9E9-E262EF377DEF}" destId="{70651148-8E8A-4C6B-91D8-97E934B89DEE}" srcOrd="0" destOrd="5" presId="urn:microsoft.com/office/officeart/2005/8/layout/arrow3"/>
     <dgm:cxn modelId="{0371ECA1-4587-48BA-BEE7-06923D8CD017}" srcId="{6511B3B1-9A0E-4A47-917B-0E1278C205F8}" destId="{56435254-7FE0-4E05-B009-0468415BAD76}" srcOrd="1" destOrd="0" parTransId="{8283FE55-3F21-46A8-9EF5-FF3E142F1C6C}" sibTransId="{29927EBC-1C3F-422A-8FCD-F237CD47DF49}"/>
     <dgm:cxn modelId="{4A14D443-9304-4B66-A9F0-9C7C8D275331}" type="presOf" srcId="{56435254-7FE0-4E05-B009-0468415BAD76}" destId="{279DAB11-C63E-437D-AA56-C040123F1BDE}" srcOrd="0" destOrd="4" presId="urn:microsoft.com/office/officeart/2005/8/layout/arrow3"/>
+    <dgm:cxn modelId="{7AECBFE9-7937-4DBA-88B0-71F8CAE1F2F3}" srcId="{6511B3B1-9A0E-4A47-917B-0E1278C205F8}" destId="{596BB62F-E9A5-465E-AB23-01E0F470A1FE}" srcOrd="2" destOrd="0" parTransId="{C73FA817-76AA-4550-A2EC-FF1D3825E374}" sibTransId="{911693D3-853E-48A5-9F8B-925DA8D8C6D2}"/>
     <dgm:cxn modelId="{D4EC535C-E229-4BB7-A339-EFF4B640BBFA}" srcId="{E29F1F7F-8CCA-44EE-9444-53753B44571C}" destId="{B6CF040B-974D-4F47-B9E9-E262EF377DEF}" srcOrd="2" destOrd="0" parTransId="{23A06C04-2903-4817-8BDE-09EC338E4206}" sibTransId="{619A3B8C-AA82-40C7-AC4B-E1A634046367}"/>
-    <dgm:cxn modelId="{7AECBFE9-7937-4DBA-88B0-71F8CAE1F2F3}" srcId="{6511B3B1-9A0E-4A47-917B-0E1278C205F8}" destId="{596BB62F-E9A5-465E-AB23-01E0F470A1FE}" srcOrd="2" destOrd="0" parTransId="{C73FA817-76AA-4550-A2EC-FF1D3825E374}" sibTransId="{911693D3-853E-48A5-9F8B-925DA8D8C6D2}"/>
     <dgm:cxn modelId="{5BD74351-34F3-496C-8300-18B7499F5478}" srcId="{6511B3B1-9A0E-4A47-917B-0E1278C205F8}" destId="{2852C72E-728B-481E-B0F9-3AFF29731DFB}" srcOrd="3" destOrd="0" parTransId="{4A303FE4-9D79-41E4-8D4E-1D2FA62E48A7}" sibTransId="{84F45173-D211-469E-B94D-EC5A22F78264}"/>
     <dgm:cxn modelId="{AFA2B31D-39DF-414E-A314-B8A7CCA1E5FE}" type="presOf" srcId="{2B5362D5-4BF1-42F0-B76D-3442FE932D2B}" destId="{279DAB11-C63E-437D-AA56-C040123F1BDE}" srcOrd="0" destOrd="3" presId="urn:microsoft.com/office/officeart/2005/8/layout/arrow3"/>
     <dgm:cxn modelId="{7C880AA4-B3DF-4618-B37F-2E37AB0F657A}" type="presOf" srcId="{5F37F3A2-1B2E-499B-98DF-CD112C7A6FF5}" destId="{70651148-8E8A-4C6B-91D8-97E934B89DEE}" srcOrd="0" destOrd="1" presId="urn:microsoft.com/office/officeart/2005/8/layout/arrow3"/>
@@ -7639,21 +7643,21 @@
     </dgm:pt>
   </dgm:ptLst>
   <dgm:cxnLst>
+    <dgm:cxn modelId="{655EBBA2-6401-4AAE-A668-D5672C262CEF}" type="presOf" srcId="{7E302CE3-B060-407E-8C39-C8238EC2547D}" destId="{7BC2E876-2247-419D-A5F0-4D061FAF11D6}" srcOrd="0" destOrd="0" presId="urn:microsoft.com/office/officeart/2005/8/layout/radial1"/>
     <dgm:cxn modelId="{0E9D5F94-CD00-4E71-A7D8-0CDC16F090B3}" type="presOf" srcId="{554E2AA3-9A75-41A8-8E47-45418A5F6A56}" destId="{EBD6F82F-5102-4FC5-AF12-F88CE6F7D1E8}" srcOrd="0" destOrd="0" presId="urn:microsoft.com/office/officeart/2005/8/layout/radial1"/>
+    <dgm:cxn modelId="{988B8C56-0B12-48C5-B572-97B67F58DE10}" type="presOf" srcId="{2E3619F0-B6CB-4BC1-81F0-A00B66929C53}" destId="{84F2078E-00F4-4629-A957-C1FDDA1D500B}" srcOrd="1" destOrd="0" presId="urn:microsoft.com/office/officeart/2005/8/layout/radial1"/>
+    <dgm:cxn modelId="{E94E168C-379F-4620-BAB8-C3DF84B1713D}" srcId="{59A76545-7AF9-4705-8EF5-54F017DF64F2}" destId="{7E302CE3-B060-407E-8C39-C8238EC2547D}" srcOrd="0" destOrd="0" parTransId="{E2A3EB40-03E2-4EF6-9A3B-F097433D0A66}" sibTransId="{4E63247C-3677-418D-AB73-19669AE64896}"/>
+    <dgm:cxn modelId="{81C6ABF6-A577-4496-BC96-23F7CFC16779}" type="presOf" srcId="{123F2D13-1E40-4C69-8DB0-C896DC317B6D}" destId="{01FD3103-B73F-4337-BCCB-E198DF1AC2D0}" srcOrd="0" destOrd="0" presId="urn:microsoft.com/office/officeart/2005/8/layout/radial1"/>
+    <dgm:cxn modelId="{468AE3D6-2560-4EC8-8AFE-7E6965ED524E}" type="presOf" srcId="{215BC256-440F-4A5D-BC43-D016B35E5874}" destId="{85649CC4-960B-4B77-A6B2-FCC6734CC397}" srcOrd="0" destOrd="0" presId="urn:microsoft.com/office/officeart/2005/8/layout/radial1"/>
+    <dgm:cxn modelId="{2F6CC88C-DD87-4922-A04F-E326714A52D8}" type="presOf" srcId="{CD370D6E-219F-4F53-92EF-B995E5946E68}" destId="{B16F53F6-AB78-48D6-867B-1816F27A02EE}" srcOrd="0" destOrd="0" presId="urn:microsoft.com/office/officeart/2005/8/layout/radial1"/>
+    <dgm:cxn modelId="{702A93DD-3B4C-4A6F-8EC6-3CAA22943125}" type="presOf" srcId="{554E2AA3-9A75-41A8-8E47-45418A5F6A56}" destId="{6DDD7D4D-DA7A-4A77-B298-BEE740CAFFE0}" srcOrd="1" destOrd="0" presId="urn:microsoft.com/office/officeart/2005/8/layout/radial1"/>
     <dgm:cxn modelId="{914ACC06-A38D-4923-B6F4-8E6DD611B9ED}" srcId="{7E302CE3-B060-407E-8C39-C8238EC2547D}" destId="{67603B1A-EFD3-4B56-AC75-714C8E17E78A}" srcOrd="1" destOrd="0" parTransId="{554E2AA3-9A75-41A8-8E47-45418A5F6A56}" sibTransId="{C113A282-14C5-4DF4-9877-715EC42C5441}"/>
-    <dgm:cxn modelId="{2F6CC88C-DD87-4922-A04F-E326714A52D8}" type="presOf" srcId="{CD370D6E-219F-4F53-92EF-B995E5946E68}" destId="{B16F53F6-AB78-48D6-867B-1816F27A02EE}" srcOrd="0" destOrd="0" presId="urn:microsoft.com/office/officeart/2005/8/layout/radial1"/>
-    <dgm:cxn modelId="{E94E168C-379F-4620-BAB8-C3DF84B1713D}" srcId="{59A76545-7AF9-4705-8EF5-54F017DF64F2}" destId="{7E302CE3-B060-407E-8C39-C8238EC2547D}" srcOrd="0" destOrd="0" parTransId="{E2A3EB40-03E2-4EF6-9A3B-F097433D0A66}" sibTransId="{4E63247C-3677-418D-AB73-19669AE64896}"/>
+    <dgm:cxn modelId="{06FC20F7-CE52-416B-9A1C-70D9BDFFD69A}" type="presOf" srcId="{67603B1A-EFD3-4B56-AC75-714C8E17E78A}" destId="{5587CFFF-A9F9-4B92-93E9-8D3BAE5F08F0}" srcOrd="0" destOrd="0" presId="urn:microsoft.com/office/officeart/2005/8/layout/radial1"/>
     <dgm:cxn modelId="{4BDC5B3F-21E8-4C0E-BAEA-80165D26730E}" type="presOf" srcId="{59A76545-7AF9-4705-8EF5-54F017DF64F2}" destId="{B2EED6AF-788B-4688-A99A-0C6E5AFDF7A8}" srcOrd="0" destOrd="0" presId="urn:microsoft.com/office/officeart/2005/8/layout/radial1"/>
-    <dgm:cxn modelId="{988B8C56-0B12-48C5-B572-97B67F58DE10}" type="presOf" srcId="{2E3619F0-B6CB-4BC1-81F0-A00B66929C53}" destId="{84F2078E-00F4-4629-A957-C1FDDA1D500B}" srcOrd="1" destOrd="0" presId="urn:microsoft.com/office/officeart/2005/8/layout/radial1"/>
-    <dgm:cxn modelId="{468AE3D6-2560-4EC8-8AFE-7E6965ED524E}" type="presOf" srcId="{215BC256-440F-4A5D-BC43-D016B35E5874}" destId="{85649CC4-960B-4B77-A6B2-FCC6734CC397}" srcOrd="0" destOrd="0" presId="urn:microsoft.com/office/officeart/2005/8/layout/radial1"/>
+    <dgm:cxn modelId="{EF2CE522-9982-4B5B-88DD-3501CB7DC215}" type="presOf" srcId="{2E3619F0-B6CB-4BC1-81F0-A00B66929C53}" destId="{2EE2C337-2AB3-4E32-9DE0-BF6CA5ED66D8}" srcOrd="0" destOrd="0" presId="urn:microsoft.com/office/officeart/2005/8/layout/radial1"/>
+    <dgm:cxn modelId="{2FCBD7F2-E5BC-442C-969E-B1CB58528614}" type="presOf" srcId="{CD370D6E-219F-4F53-92EF-B995E5946E68}" destId="{29C41D5E-99DA-4A7D-8A8D-B960ACA24BA3}" srcOrd="1" destOrd="0" presId="urn:microsoft.com/office/officeart/2005/8/layout/radial1"/>
     <dgm:cxn modelId="{77489661-759C-4919-A04E-056C95C71214}" srcId="{7E302CE3-B060-407E-8C39-C8238EC2547D}" destId="{123F2D13-1E40-4C69-8DB0-C896DC317B6D}" srcOrd="2" destOrd="0" parTransId="{CD370D6E-219F-4F53-92EF-B995E5946E68}" sibTransId="{615F443B-2683-4216-B1C8-3B5C4763FCE7}"/>
-    <dgm:cxn modelId="{EF2CE522-9982-4B5B-88DD-3501CB7DC215}" type="presOf" srcId="{2E3619F0-B6CB-4BC1-81F0-A00B66929C53}" destId="{2EE2C337-2AB3-4E32-9DE0-BF6CA5ED66D8}" srcOrd="0" destOrd="0" presId="urn:microsoft.com/office/officeart/2005/8/layout/radial1"/>
     <dgm:cxn modelId="{64505682-E2FA-4536-8741-3AB17753F493}" srcId="{7E302CE3-B060-407E-8C39-C8238EC2547D}" destId="{215BC256-440F-4A5D-BC43-D016B35E5874}" srcOrd="0" destOrd="0" parTransId="{2E3619F0-B6CB-4BC1-81F0-A00B66929C53}" sibTransId="{CC773FC3-A595-4499-A51C-7DAF0A40ABFE}"/>
-    <dgm:cxn modelId="{655EBBA2-6401-4AAE-A668-D5672C262CEF}" type="presOf" srcId="{7E302CE3-B060-407E-8C39-C8238EC2547D}" destId="{7BC2E876-2247-419D-A5F0-4D061FAF11D6}" srcOrd="0" destOrd="0" presId="urn:microsoft.com/office/officeart/2005/8/layout/radial1"/>
-    <dgm:cxn modelId="{06FC20F7-CE52-416B-9A1C-70D9BDFFD69A}" type="presOf" srcId="{67603B1A-EFD3-4B56-AC75-714C8E17E78A}" destId="{5587CFFF-A9F9-4B92-93E9-8D3BAE5F08F0}" srcOrd="0" destOrd="0" presId="urn:microsoft.com/office/officeart/2005/8/layout/radial1"/>
-    <dgm:cxn modelId="{2FCBD7F2-E5BC-442C-969E-B1CB58528614}" type="presOf" srcId="{CD370D6E-219F-4F53-92EF-B995E5946E68}" destId="{29C41D5E-99DA-4A7D-8A8D-B960ACA24BA3}" srcOrd="1" destOrd="0" presId="urn:microsoft.com/office/officeart/2005/8/layout/radial1"/>
-    <dgm:cxn modelId="{81C6ABF6-A577-4496-BC96-23F7CFC16779}" type="presOf" srcId="{123F2D13-1E40-4C69-8DB0-C896DC317B6D}" destId="{01FD3103-B73F-4337-BCCB-E198DF1AC2D0}" srcOrd="0" destOrd="0" presId="urn:microsoft.com/office/officeart/2005/8/layout/radial1"/>
-    <dgm:cxn modelId="{702A93DD-3B4C-4A6F-8EC6-3CAA22943125}" type="presOf" srcId="{554E2AA3-9A75-41A8-8E47-45418A5F6A56}" destId="{6DDD7D4D-DA7A-4A77-B298-BEE740CAFFE0}" srcOrd="1" destOrd="0" presId="urn:microsoft.com/office/officeart/2005/8/layout/radial1"/>
     <dgm:cxn modelId="{14F59998-3485-4710-A012-329CA2FC970E}" type="presParOf" srcId="{B2EED6AF-788B-4688-A99A-0C6E5AFDF7A8}" destId="{7BC2E876-2247-419D-A5F0-4D061FAF11D6}" srcOrd="0" destOrd="0" presId="urn:microsoft.com/office/officeart/2005/8/layout/radial1"/>
     <dgm:cxn modelId="{1671ADD4-E73B-4355-B286-4506ADFD1390}" type="presParOf" srcId="{B2EED6AF-788B-4688-A99A-0C6E5AFDF7A8}" destId="{2EE2C337-2AB3-4E32-9DE0-BF6CA5ED66D8}" srcOrd="1" destOrd="0" presId="urn:microsoft.com/office/officeart/2005/8/layout/radial1"/>
     <dgm:cxn modelId="{C6B5F63A-61A4-4633-A854-C7672F8B35F9}" type="presParOf" srcId="{2EE2C337-2AB3-4E32-9DE0-BF6CA5ED66D8}" destId="{84F2078E-00F4-4629-A957-C1FDDA1D500B}" srcOrd="0" destOrd="0" presId="urn:microsoft.com/office/officeart/2005/8/layout/radial1"/>
@@ -9425,6 +9429,231 @@
       <dsp:cNvGrpSpPr/>
     </dsp:nvGrpSpPr>
     <dsp:grpSpPr/>
+    <dsp:sp modelId="{A1F140A3-CE6E-40DA-AC47-F2E5A121838C}">
+      <dsp:nvSpPr>
+        <dsp:cNvPr id="0" name=""/>
+        <dsp:cNvSpPr/>
+      </dsp:nvSpPr>
+      <dsp:spPr>
+        <a:xfrm>
+          <a:off x="0" y="37795"/>
+          <a:ext cx="7920880" cy="569128"/>
+        </a:xfrm>
+        <a:prstGeom prst="roundRect">
+          <a:avLst/>
+        </a:prstGeom>
+        <a:gradFill rotWithShape="0">
+          <a:gsLst>
+            <a:gs pos="0">
+              <a:schemeClr val="accent1">
+                <a:hueOff val="0"/>
+                <a:satOff val="0"/>
+                <a:lumOff val="0"/>
+                <a:alphaOff val="0"/>
+                <a:tint val="0"/>
+              </a:schemeClr>
+            </a:gs>
+            <a:gs pos="44000">
+              <a:schemeClr val="accent1">
+                <a:hueOff val="0"/>
+                <a:satOff val="0"/>
+                <a:lumOff val="0"/>
+                <a:alphaOff val="0"/>
+                <a:tint val="60000"/>
+                <a:satMod val="120000"/>
+              </a:schemeClr>
+            </a:gs>
+            <a:gs pos="100000">
+              <a:schemeClr val="accent1">
+                <a:hueOff val="0"/>
+                <a:satOff val="0"/>
+                <a:lumOff val="0"/>
+                <a:alphaOff val="0"/>
+                <a:tint val="90000"/>
+                <a:alpha val="100000"/>
+                <a:lumMod val="90000"/>
+              </a:schemeClr>
+            </a:gs>
+          </a:gsLst>
+          <a:lin ang="5400000" scaled="0"/>
+        </a:gradFill>
+        <a:ln>
+          <a:noFill/>
+        </a:ln>
+        <a:effectLst/>
+        <a:scene3d>
+          <a:camera prst="orthographicFront"/>
+          <a:lightRig rig="flat" dir="t"/>
+        </a:scene3d>
+        <a:sp3d prstMaterial="dkEdge">
+          <a:bevelT w="8200" h="38100"/>
+        </a:sp3d>
+      </dsp:spPr>
+      <dsp:style>
+        <a:lnRef idx="0">
+          <a:scrgbClr r="0" g="0" b="0"/>
+        </a:lnRef>
+        <a:fillRef idx="2">
+          <a:scrgbClr r="0" g="0" b="0"/>
+        </a:fillRef>
+        <a:effectRef idx="1">
+          <a:scrgbClr r="0" g="0" b="0"/>
+        </a:effectRef>
+        <a:fontRef idx="minor">
+          <a:schemeClr val="dk1"/>
+        </a:fontRef>
+      </dsp:style>
+      <dsp:txBody>
+        <a:bodyPr spcFirstLastPara="0" vert="horz" wrap="square" lIns="87630" tIns="87630" rIns="87630" bIns="87630" numCol="1" spcCol="1270" anchor="ctr" anchorCtr="0">
+          <a:noAutofit/>
+        </a:bodyPr>
+        <a:lstStyle/>
+        <a:p>
+          <a:pPr lvl="0" algn="l" defTabSz="1022350">
+            <a:lnSpc>
+              <a:spcPct val="90000"/>
+            </a:lnSpc>
+            <a:spcBef>
+              <a:spcPct val="0"/>
+            </a:spcBef>
+            <a:spcAft>
+              <a:spcPct val="35000"/>
+            </a:spcAft>
+          </a:pPr>
+          <a:r>
+            <a:rPr lang="pl-PL" sz="2300" kern="1200" dirty="0" smtClean="0"/>
+            <a:t>Cechy frameworku:</a:t>
+          </a:r>
+          <a:endParaRPr lang="en-US" sz="2300" kern="1200" dirty="0"/>
+        </a:p>
+      </dsp:txBody>
+      <dsp:txXfrm>
+        <a:off x="27783" y="65578"/>
+        <a:ext cx="7865314" cy="513562"/>
+      </dsp:txXfrm>
+    </dsp:sp>
+    <dsp:sp modelId="{3FAFC355-C1D8-4E11-AE32-0A9655505E0B}">
+      <dsp:nvSpPr>
+        <dsp:cNvPr id="0" name=""/>
+        <dsp:cNvSpPr/>
+      </dsp:nvSpPr>
+      <dsp:spPr>
+        <a:xfrm>
+          <a:off x="0" y="606924"/>
+          <a:ext cx="7920880" cy="2235600"/>
+        </a:xfrm>
+        <a:prstGeom prst="rect">
+          <a:avLst/>
+        </a:prstGeom>
+        <a:noFill/>
+        <a:ln>
+          <a:noFill/>
+        </a:ln>
+        <a:effectLst/>
+      </dsp:spPr>
+      <dsp:style>
+        <a:lnRef idx="0">
+          <a:scrgbClr r="0" g="0" b="0"/>
+        </a:lnRef>
+        <a:fillRef idx="0">
+          <a:scrgbClr r="0" g="0" b="0"/>
+        </a:fillRef>
+        <a:effectRef idx="0">
+          <a:scrgbClr r="0" g="0" b="0"/>
+        </a:effectRef>
+        <a:fontRef idx="minor"/>
+      </dsp:style>
+      <dsp:txBody>
+        <a:bodyPr spcFirstLastPara="0" vert="horz" wrap="square" lIns="251488" tIns="29210" rIns="163576" bIns="29210" numCol="1" spcCol="1270" anchor="t" anchorCtr="0">
+          <a:noAutofit/>
+        </a:bodyPr>
+        <a:lstStyle/>
+        <a:p>
+          <a:pPr marL="171450" lvl="1" indent="-171450" algn="l" defTabSz="800100">
+            <a:lnSpc>
+              <a:spcPct val="90000"/>
+            </a:lnSpc>
+            <a:spcBef>
+              <a:spcPct val="0"/>
+            </a:spcBef>
+            <a:spcAft>
+              <a:spcPct val="20000"/>
+            </a:spcAft>
+            <a:buChar char="••"/>
+          </a:pPr>
+          <a:r>
+            <a:rPr lang="pl-PL" sz="1800" kern="1200" dirty="0" smtClean="0"/>
+            <a:t>Możliwość załadowania modułu podczas pracy aplikacji hosta</a:t>
+          </a:r>
+          <a:endParaRPr lang="en-US" sz="1800" kern="1200" dirty="0"/>
+        </a:p>
+        <a:p>
+          <a:pPr marL="171450" lvl="1" indent="-171450" algn="l" defTabSz="800100">
+            <a:lnSpc>
+              <a:spcPct val="90000"/>
+            </a:lnSpc>
+            <a:spcBef>
+              <a:spcPct val="0"/>
+            </a:spcBef>
+            <a:spcAft>
+              <a:spcPct val="20000"/>
+            </a:spcAft>
+            <a:buChar char="••"/>
+          </a:pPr>
+          <a:r>
+            <a:rPr lang="pl-PL" sz="1800" kern="1200" dirty="0" smtClean="0"/>
+            <a:t>Możliwość wyładowania modułów</a:t>
+          </a:r>
+          <a:endParaRPr lang="en-US" sz="1800" kern="1200" dirty="0"/>
+        </a:p>
+        <a:p>
+          <a:pPr marL="171450" lvl="1" indent="-171450" algn="l" defTabSz="800100">
+            <a:lnSpc>
+              <a:spcPct val="90000"/>
+            </a:lnSpc>
+            <a:spcBef>
+              <a:spcPct val="0"/>
+            </a:spcBef>
+            <a:spcAft>
+              <a:spcPct val="20000"/>
+            </a:spcAft>
+            <a:buChar char="••"/>
+          </a:pPr>
+          <a:r>
+            <a:rPr lang="pl-PL" sz="1800" kern="1200" dirty="0" smtClean="0"/>
+            <a:t>Możliwość uaktualnienia modułów i automatycznego restartu </a:t>
+          </a:r>
+          <a:endParaRPr lang="en-US" sz="1800" kern="1200" dirty="0"/>
+        </a:p>
+        <a:p>
+          <a:pPr marL="171450" lvl="1" indent="-171450" algn="l" defTabSz="800100">
+            <a:lnSpc>
+              <a:spcPct val="90000"/>
+            </a:lnSpc>
+            <a:spcBef>
+              <a:spcPct val="0"/>
+            </a:spcBef>
+            <a:spcAft>
+              <a:spcPct val="20000"/>
+            </a:spcAft>
+            <a:buChar char="••"/>
+          </a:pPr>
+          <a:r>
+            <a:rPr lang="pl-PL" sz="1800" kern="1200" dirty="0" smtClean="0"/>
+            <a:t>Komunikacja </a:t>
+          </a:r>
+          <a:r>
+            <a:rPr lang="pl-PL" sz="1800" kern="1200" dirty="0" smtClean="0"/>
+            <a:t>modułów między sobą</a:t>
+          </a:r>
+          <a:endParaRPr lang="en-US" sz="1800" kern="1200" dirty="0"/>
+        </a:p>
+      </dsp:txBody>
+      <dsp:txXfrm>
+        <a:off x="0" y="606924"/>
+        <a:ext cx="7920880" cy="2235600"/>
+      </dsp:txXfrm>
+    </dsp:sp>
   </dsp:spTree>
 </dsp:drawing>
 </file>
@@ -9437,6 +9666,485 @@
       <dsp:cNvGrpSpPr/>
     </dsp:nvGrpSpPr>
     <dsp:grpSpPr/>
+    <dsp:sp modelId="{AFF105BE-DDA7-4EF4-904A-DC7A00694505}">
+      <dsp:nvSpPr>
+        <dsp:cNvPr id="0" name=""/>
+        <dsp:cNvSpPr/>
+      </dsp:nvSpPr>
+      <dsp:spPr>
+        <a:xfrm rot="21300000">
+          <a:off x="25254" y="1619917"/>
+          <a:ext cx="8179091" cy="936629"/>
+        </a:xfrm>
+        <a:prstGeom prst="mathMinus">
+          <a:avLst/>
+        </a:prstGeom>
+        <a:solidFill>
+          <a:schemeClr val="accent2">
+            <a:tint val="40000"/>
+            <a:hueOff val="0"/>
+            <a:satOff val="0"/>
+            <a:lumOff val="0"/>
+            <a:alphaOff val="0"/>
+          </a:schemeClr>
+        </a:solidFill>
+        <a:ln w="25400" cap="flat" cmpd="sng" algn="ctr">
+          <a:solidFill>
+            <a:schemeClr val="lt1">
+              <a:hueOff val="0"/>
+              <a:satOff val="0"/>
+              <a:lumOff val="0"/>
+              <a:alphaOff val="0"/>
+            </a:schemeClr>
+          </a:solidFill>
+          <a:prstDash val="solid"/>
+        </a:ln>
+        <a:effectLst/>
+      </dsp:spPr>
+      <dsp:style>
+        <a:lnRef idx="3">
+          <a:scrgbClr r="0" g="0" b="0"/>
+        </a:lnRef>
+        <a:fillRef idx="1">
+          <a:scrgbClr r="0" g="0" b="0"/>
+        </a:fillRef>
+        <a:effectRef idx="1">
+          <a:scrgbClr r="0" g="0" b="0"/>
+        </a:effectRef>
+        <a:fontRef idx="minor"/>
+      </dsp:style>
+    </dsp:sp>
+    <dsp:sp modelId="{101E96D3-015B-4EF7-8EA2-53264B737EF2}">
+      <dsp:nvSpPr>
+        <dsp:cNvPr id="0" name=""/>
+        <dsp:cNvSpPr/>
+      </dsp:nvSpPr>
+      <dsp:spPr>
+        <a:xfrm>
+          <a:off x="987552" y="208823"/>
+          <a:ext cx="2468880" cy="1670585"/>
+        </a:xfrm>
+        <a:prstGeom prst="downArrow">
+          <a:avLst/>
+        </a:prstGeom>
+        <a:solidFill>
+          <a:schemeClr val="accent2">
+            <a:hueOff val="0"/>
+            <a:satOff val="0"/>
+            <a:lumOff val="0"/>
+            <a:alphaOff val="0"/>
+          </a:schemeClr>
+        </a:solidFill>
+        <a:ln w="25400" cap="flat" cmpd="sng" algn="ctr">
+          <a:solidFill>
+            <a:schemeClr val="lt1">
+              <a:hueOff val="0"/>
+              <a:satOff val="0"/>
+              <a:lumOff val="0"/>
+              <a:alphaOff val="0"/>
+            </a:schemeClr>
+          </a:solidFill>
+          <a:prstDash val="solid"/>
+        </a:ln>
+        <a:effectLst/>
+      </dsp:spPr>
+      <dsp:style>
+        <a:lnRef idx="3">
+          <a:scrgbClr r="0" g="0" b="0"/>
+        </a:lnRef>
+        <a:fillRef idx="1">
+          <a:scrgbClr r="0" g="0" b="0"/>
+        </a:fillRef>
+        <a:effectRef idx="1">
+          <a:scrgbClr r="0" g="0" b="0"/>
+        </a:effectRef>
+        <a:fontRef idx="minor">
+          <a:schemeClr val="lt1"/>
+        </a:fontRef>
+      </dsp:style>
+    </dsp:sp>
+    <dsp:sp modelId="{70651148-8E8A-4C6B-91D8-97E934B89DEE}">
+      <dsp:nvSpPr>
+        <dsp:cNvPr id="0" name=""/>
+        <dsp:cNvSpPr/>
+      </dsp:nvSpPr>
+      <dsp:spPr>
+        <a:xfrm>
+          <a:off x="4361687" y="0"/>
+          <a:ext cx="2633472" cy="1754114"/>
+        </a:xfrm>
+        <a:prstGeom prst="rect">
+          <a:avLst/>
+        </a:prstGeom>
+        <a:noFill/>
+        <a:ln>
+          <a:noFill/>
+        </a:ln>
+        <a:effectLst/>
+      </dsp:spPr>
+      <dsp:style>
+        <a:lnRef idx="0">
+          <a:scrgbClr r="0" g="0" b="0"/>
+        </a:lnRef>
+        <a:fillRef idx="0">
+          <a:scrgbClr r="0" g="0" b="0"/>
+        </a:fillRef>
+        <a:effectRef idx="0">
+          <a:scrgbClr r="0" g="0" b="0"/>
+        </a:effectRef>
+        <a:fontRef idx="minor"/>
+      </dsp:style>
+      <dsp:txBody>
+        <a:bodyPr spcFirstLastPara="0" vert="horz" wrap="square" lIns="99568" tIns="99568" rIns="99568" bIns="99568" numCol="1" spcCol="1270" anchor="ctr" anchorCtr="0">
+          <a:noAutofit/>
+        </a:bodyPr>
+        <a:lstStyle/>
+        <a:p>
+          <a:pPr lvl="0" algn="l" defTabSz="622300">
+            <a:lnSpc>
+              <a:spcPct val="90000"/>
+            </a:lnSpc>
+            <a:spcBef>
+              <a:spcPct val="0"/>
+            </a:spcBef>
+            <a:spcAft>
+              <a:spcPct val="35000"/>
+            </a:spcAft>
+          </a:pPr>
+          <a:r>
+            <a:rPr lang="pl-PL" sz="1400" kern="1200" smtClean="0"/>
+            <a:t>Kernel AppDomain</a:t>
+          </a:r>
+          <a:endParaRPr lang="en-US" sz="1400" kern="1200" dirty="0"/>
+        </a:p>
+        <a:p>
+          <a:pPr marL="57150" lvl="1" indent="-57150" algn="l" defTabSz="488950">
+            <a:lnSpc>
+              <a:spcPct val="90000"/>
+            </a:lnSpc>
+            <a:spcBef>
+              <a:spcPct val="0"/>
+            </a:spcBef>
+            <a:spcAft>
+              <a:spcPct val="15000"/>
+            </a:spcAft>
+            <a:buChar char="••"/>
+          </a:pPr>
+          <a:r>
+            <a:rPr lang="pl-PL" sz="1100" kern="1200" smtClean="0"/>
+            <a:t>Domena aplikacji dla mechanizmów wewnętrznych frameworka </a:t>
+          </a:r>
+          <a:r>
+            <a:rPr lang="pl-PL" sz="1100" i="1" kern="1200" smtClean="0"/>
+            <a:t>Nomad</a:t>
+          </a:r>
+          <a:endParaRPr lang="en-US" sz="1100" i="1" kern="1200" dirty="0"/>
+        </a:p>
+        <a:p>
+          <a:pPr marL="57150" lvl="1" indent="-57150" algn="l" defTabSz="488950">
+            <a:lnSpc>
+              <a:spcPct val="90000"/>
+            </a:lnSpc>
+            <a:spcBef>
+              <a:spcPct val="0"/>
+            </a:spcBef>
+            <a:spcAft>
+              <a:spcPct val="15000"/>
+            </a:spcAft>
+            <a:buChar char="••"/>
+          </a:pPr>
+          <a:r>
+            <a:rPr lang="pl-PL" sz="1100" kern="1200" smtClean="0"/>
+            <a:t>Główne elementy:</a:t>
+          </a:r>
+          <a:endParaRPr lang="en-US" sz="1100" kern="1200" dirty="0"/>
+        </a:p>
+        <a:p>
+          <a:pPr marL="114300" lvl="2" indent="-57150" algn="l" defTabSz="488950">
+            <a:lnSpc>
+              <a:spcPct val="90000"/>
+            </a:lnSpc>
+            <a:spcBef>
+              <a:spcPct val="0"/>
+            </a:spcBef>
+            <a:spcAft>
+              <a:spcPct val="15000"/>
+            </a:spcAft>
+            <a:buChar char="••"/>
+          </a:pPr>
+          <a:r>
+            <a:rPr lang="pl-PL" sz="1100" kern="1200" smtClean="0"/>
+            <a:t>Nomad.Updater</a:t>
+          </a:r>
+          <a:endParaRPr lang="en-US" sz="1100" kern="1200" dirty="0"/>
+        </a:p>
+        <a:p>
+          <a:pPr marL="114300" lvl="2" indent="-57150" algn="l" defTabSz="488950">
+            <a:lnSpc>
+              <a:spcPct val="90000"/>
+            </a:lnSpc>
+            <a:spcBef>
+              <a:spcPct val="0"/>
+            </a:spcBef>
+            <a:spcAft>
+              <a:spcPct val="15000"/>
+            </a:spcAft>
+            <a:buChar char="••"/>
+          </a:pPr>
+          <a:r>
+            <a:rPr lang="pl-PL" sz="1100" kern="1200" smtClean="0"/>
+            <a:t>Nomad.Configuration</a:t>
+          </a:r>
+          <a:endParaRPr lang="en-US" sz="1100" kern="1200" dirty="0"/>
+        </a:p>
+        <a:p>
+          <a:pPr marL="114300" lvl="2" indent="-57150" algn="l" defTabSz="488950">
+            <a:lnSpc>
+              <a:spcPct val="90000"/>
+            </a:lnSpc>
+            <a:spcBef>
+              <a:spcPct val="0"/>
+            </a:spcBef>
+            <a:spcAft>
+              <a:spcPct val="15000"/>
+            </a:spcAft>
+            <a:buChar char="••"/>
+          </a:pPr>
+          <a:r>
+            <a:rPr lang="pl-PL" sz="1100" kern="1200" smtClean="0"/>
+            <a:t>Nomad.Filter</a:t>
+          </a:r>
+          <a:endParaRPr lang="en-US" sz="1100" kern="1200" dirty="0"/>
+        </a:p>
+      </dsp:txBody>
+      <dsp:txXfrm>
+        <a:off x="4361687" y="0"/>
+        <a:ext cx="2633472" cy="1754114"/>
+      </dsp:txXfrm>
+    </dsp:sp>
+    <dsp:sp modelId="{D5D142C7-7FA4-4B42-BA29-86564CE4BEDB}">
+      <dsp:nvSpPr>
+        <dsp:cNvPr id="0" name=""/>
+        <dsp:cNvSpPr/>
+      </dsp:nvSpPr>
+      <dsp:spPr>
+        <a:xfrm>
+          <a:off x="4773168" y="2297055"/>
+          <a:ext cx="2468880" cy="1670585"/>
+        </a:xfrm>
+        <a:prstGeom prst="upArrow">
+          <a:avLst/>
+        </a:prstGeom>
+        <a:solidFill>
+          <a:schemeClr val="accent2">
+            <a:hueOff val="-4710551"/>
+            <a:satOff val="-6290"/>
+            <a:lumOff val="3726"/>
+            <a:alphaOff val="0"/>
+          </a:schemeClr>
+        </a:solidFill>
+        <a:ln w="25400" cap="flat" cmpd="sng" algn="ctr">
+          <a:solidFill>
+            <a:schemeClr val="lt1">
+              <a:hueOff val="0"/>
+              <a:satOff val="0"/>
+              <a:lumOff val="0"/>
+              <a:alphaOff val="0"/>
+            </a:schemeClr>
+          </a:solidFill>
+          <a:prstDash val="solid"/>
+        </a:ln>
+        <a:effectLst/>
+      </dsp:spPr>
+      <dsp:style>
+        <a:lnRef idx="3">
+          <a:scrgbClr r="0" g="0" b="0"/>
+        </a:lnRef>
+        <a:fillRef idx="1">
+          <a:scrgbClr r="0" g="0" b="0"/>
+        </a:fillRef>
+        <a:effectRef idx="1">
+          <a:scrgbClr r="0" g="0" b="0"/>
+        </a:effectRef>
+        <a:fontRef idx="minor">
+          <a:schemeClr val="lt1"/>
+        </a:fontRef>
+      </dsp:style>
+    </dsp:sp>
+    <dsp:sp modelId="{279DAB11-C63E-437D-AA56-C040123F1BDE}">
+      <dsp:nvSpPr>
+        <dsp:cNvPr id="0" name=""/>
+        <dsp:cNvSpPr/>
+      </dsp:nvSpPr>
+      <dsp:spPr>
+        <a:xfrm>
+          <a:off x="1234440" y="2422349"/>
+          <a:ext cx="2633472" cy="1754114"/>
+        </a:xfrm>
+        <a:prstGeom prst="rect">
+          <a:avLst/>
+        </a:prstGeom>
+        <a:noFill/>
+        <a:ln>
+          <a:noFill/>
+        </a:ln>
+        <a:effectLst/>
+      </dsp:spPr>
+      <dsp:style>
+        <a:lnRef idx="0">
+          <a:scrgbClr r="0" g="0" b="0"/>
+        </a:lnRef>
+        <a:fillRef idx="0">
+          <a:scrgbClr r="0" g="0" b="0"/>
+        </a:fillRef>
+        <a:effectRef idx="0">
+          <a:scrgbClr r="0" g="0" b="0"/>
+        </a:effectRef>
+        <a:fontRef idx="minor"/>
+      </dsp:style>
+      <dsp:txBody>
+        <a:bodyPr spcFirstLastPara="0" vert="horz" wrap="square" lIns="99568" tIns="99568" rIns="99568" bIns="99568" numCol="1" spcCol="1270" anchor="ctr" anchorCtr="0">
+          <a:noAutofit/>
+        </a:bodyPr>
+        <a:lstStyle/>
+        <a:p>
+          <a:pPr lvl="0" algn="l" defTabSz="622300">
+            <a:lnSpc>
+              <a:spcPct val="90000"/>
+            </a:lnSpc>
+            <a:spcBef>
+              <a:spcPct val="0"/>
+            </a:spcBef>
+            <a:spcAft>
+              <a:spcPct val="35000"/>
+            </a:spcAft>
+          </a:pPr>
+          <a:r>
+            <a:rPr lang="pl-PL" sz="1400" kern="1200" smtClean="0"/>
+            <a:t>Modules AppDomain</a:t>
+          </a:r>
+          <a:endParaRPr lang="en-US" sz="1400" kern="1200" dirty="0"/>
+        </a:p>
+        <a:p>
+          <a:pPr marL="57150" lvl="1" indent="-57150" algn="l" defTabSz="488950">
+            <a:lnSpc>
+              <a:spcPct val="90000"/>
+            </a:lnSpc>
+            <a:spcBef>
+              <a:spcPct val="0"/>
+            </a:spcBef>
+            <a:spcAft>
+              <a:spcPct val="15000"/>
+            </a:spcAft>
+            <a:buChar char="••"/>
+          </a:pPr>
+          <a:r>
+            <a:rPr lang="pl-PL" sz="1100" kern="1200" smtClean="0"/>
+            <a:t>Domena aplikacji dla modułów oraz aplikacji hostującej</a:t>
+          </a:r>
+          <a:endParaRPr lang="en-US" sz="1100" kern="1200" dirty="0"/>
+        </a:p>
+        <a:p>
+          <a:pPr marL="57150" lvl="1" indent="-57150" algn="l" defTabSz="488950">
+            <a:lnSpc>
+              <a:spcPct val="90000"/>
+            </a:lnSpc>
+            <a:spcBef>
+              <a:spcPct val="0"/>
+            </a:spcBef>
+            <a:spcAft>
+              <a:spcPct val="15000"/>
+            </a:spcAft>
+            <a:buChar char="••"/>
+          </a:pPr>
+          <a:r>
+            <a:rPr lang="pl-PL" sz="1100" kern="1200" smtClean="0"/>
+            <a:t>Główne elementy:</a:t>
+          </a:r>
+          <a:endParaRPr lang="en-US" sz="1100" kern="1200" dirty="0"/>
+        </a:p>
+        <a:p>
+          <a:pPr marL="114300" lvl="2" indent="-57150" algn="l" defTabSz="488950">
+            <a:lnSpc>
+              <a:spcPct val="90000"/>
+            </a:lnSpc>
+            <a:spcBef>
+              <a:spcPct val="0"/>
+            </a:spcBef>
+            <a:spcAft>
+              <a:spcPct val="15000"/>
+            </a:spcAft>
+            <a:buChar char="••"/>
+          </a:pPr>
+          <a:r>
+            <a:rPr lang="pl-PL" sz="1100" kern="1200" smtClean="0"/>
+            <a:t>Moduły</a:t>
+          </a:r>
+          <a:endParaRPr lang="en-US" sz="1100" kern="1200" dirty="0"/>
+        </a:p>
+        <a:p>
+          <a:pPr marL="114300" lvl="2" indent="-57150" algn="l" defTabSz="488950">
+            <a:lnSpc>
+              <a:spcPct val="90000"/>
+            </a:lnSpc>
+            <a:spcBef>
+              <a:spcPct val="0"/>
+            </a:spcBef>
+            <a:spcAft>
+              <a:spcPct val="15000"/>
+            </a:spcAft>
+            <a:buChar char="••"/>
+          </a:pPr>
+          <a:r>
+            <a:rPr lang="pl-PL" sz="1100" kern="1200" smtClean="0"/>
+            <a:t>Aplikacji hostująca </a:t>
+          </a:r>
+          <a:endParaRPr lang="en-US" sz="1100" kern="1200" dirty="0"/>
+        </a:p>
+        <a:p>
+          <a:pPr marL="114300" lvl="2" indent="-57150" algn="l" defTabSz="488950">
+            <a:lnSpc>
+              <a:spcPct val="90000"/>
+            </a:lnSpc>
+            <a:spcBef>
+              <a:spcPct val="0"/>
+            </a:spcBef>
+            <a:spcAft>
+              <a:spcPct val="15000"/>
+            </a:spcAft>
+            <a:buChar char="••"/>
+          </a:pPr>
+          <a:r>
+            <a:rPr lang="pl-PL" sz="1100" kern="1200" smtClean="0"/>
+            <a:t>Nomad.ModuleLoader</a:t>
+          </a:r>
+          <a:endParaRPr lang="en-US" sz="1100" kern="1200" dirty="0"/>
+        </a:p>
+        <a:p>
+          <a:pPr marL="114300" lvl="2" indent="-57150" algn="l" defTabSz="488950">
+            <a:lnSpc>
+              <a:spcPct val="90000"/>
+            </a:lnSpc>
+            <a:spcBef>
+              <a:spcPct val="0"/>
+            </a:spcBef>
+            <a:spcAft>
+              <a:spcPct val="15000"/>
+            </a:spcAft>
+            <a:buChar char="••"/>
+          </a:pPr>
+          <a:r>
+            <a:rPr lang="pl-PL" sz="1100" kern="1200" smtClean="0"/>
+            <a:t>Nomad.Communication</a:t>
+          </a:r>
+          <a:endParaRPr lang="en-US" sz="1100" kern="1200" dirty="0"/>
+        </a:p>
+      </dsp:txBody>
+      <dsp:txXfrm>
+        <a:off x="1234440" y="2422349"/>
+        <a:ext cx="2633472" cy="1754114"/>
+      </dsp:txXfrm>
+    </dsp:sp>
   </dsp:spTree>
 </dsp:drawing>
 </file>
@@ -9449,6 +10157,584 @@
       <dsp:cNvGrpSpPr/>
     </dsp:nvGrpSpPr>
     <dsp:grpSpPr/>
+    <dsp:sp modelId="{7BC2E876-2247-419D-A5F0-4D061FAF11D6}">
+      <dsp:nvSpPr>
+        <dsp:cNvPr id="0" name=""/>
+        <dsp:cNvSpPr/>
+      </dsp:nvSpPr>
+      <dsp:spPr>
+        <a:xfrm>
+          <a:off x="3151842" y="1440546"/>
+          <a:ext cx="1925915" cy="1925915"/>
+        </a:xfrm>
+        <a:prstGeom prst="ellipse">
+          <a:avLst/>
+        </a:prstGeom>
+        <a:solidFill>
+          <a:schemeClr val="accent1"/>
+        </a:solidFill>
+        <a:ln w="15875" cap="flat" cmpd="sng" algn="ctr">
+          <a:solidFill>
+            <a:schemeClr val="accent1">
+              <a:shade val="50000"/>
+              <a:shade val="75000"/>
+              <a:lumMod val="80000"/>
+            </a:schemeClr>
+          </a:solidFill>
+          <a:prstDash val="solid"/>
+        </a:ln>
+        <a:effectLst/>
+      </dsp:spPr>
+      <dsp:style>
+        <a:lnRef idx="2">
+          <a:schemeClr val="accent1">
+            <a:shade val="50000"/>
+          </a:schemeClr>
+        </a:lnRef>
+        <a:fillRef idx="1">
+          <a:schemeClr val="accent1"/>
+        </a:fillRef>
+        <a:effectRef idx="0">
+          <a:schemeClr val="accent1"/>
+        </a:effectRef>
+        <a:fontRef idx="minor">
+          <a:schemeClr val="lt1"/>
+        </a:fontRef>
+      </dsp:style>
+      <dsp:txBody>
+        <a:bodyPr spcFirstLastPara="0" vert="horz" wrap="square" lIns="6985" tIns="6985" rIns="6985" bIns="6985" numCol="1" spcCol="1270" anchor="ctr" anchorCtr="0">
+          <a:noAutofit/>
+        </a:bodyPr>
+        <a:lstStyle/>
+        <a:p>
+          <a:pPr lvl="0" algn="ctr" defTabSz="488950">
+            <a:lnSpc>
+              <a:spcPct val="90000"/>
+            </a:lnSpc>
+            <a:spcBef>
+              <a:spcPct val="0"/>
+            </a:spcBef>
+            <a:spcAft>
+              <a:spcPct val="35000"/>
+            </a:spcAft>
+          </a:pPr>
+          <a:r>
+            <a:rPr lang="pl-PL" sz="1100" kern="1200" dirty="0" err="1" smtClean="0"/>
+            <a:t>Nomad.ServiceLocator</a:t>
+          </a:r>
+          <a:r>
+            <a:rPr lang="pl-PL" sz="1100" kern="1200" dirty="0" smtClean="0"/>
+            <a:t> </a:t>
+          </a:r>
+          <a:r>
+            <a:rPr lang="pl-PL" sz="1100" i="1" kern="1200" dirty="0" smtClean="0"/>
+            <a:t>(</a:t>
+          </a:r>
+          <a:r>
+            <a:rPr lang="pl-PL" sz="1100" i="1" kern="1200" dirty="0" err="1" smtClean="0"/>
+            <a:t>framework</a:t>
+          </a:r>
+          <a:r>
+            <a:rPr lang="pl-PL" sz="1100" i="1" kern="1200" dirty="0" smtClean="0"/>
+            <a:t> element)</a:t>
+          </a:r>
+          <a:endParaRPr lang="en-US" sz="1100" i="1" kern="1200" dirty="0"/>
+        </a:p>
+      </dsp:txBody>
+      <dsp:txXfrm>
+        <a:off x="3433886" y="1722590"/>
+        <a:ext cx="1361827" cy="1361827"/>
+      </dsp:txXfrm>
+    </dsp:sp>
+    <dsp:sp modelId="{2EE2C337-2AB3-4E32-9DE0-BF6CA5ED66D8}">
+      <dsp:nvSpPr>
+        <dsp:cNvPr id="0" name=""/>
+        <dsp:cNvSpPr/>
+      </dsp:nvSpPr>
+      <dsp:spPr>
+        <a:xfrm rot="16200000">
+          <a:off x="4073896" y="1384956"/>
+          <a:ext cx="81807" cy="29373"/>
+        </a:xfrm>
+        <a:custGeom>
+          <a:avLst/>
+          <a:gdLst/>
+          <a:ahLst/>
+          <a:cxnLst/>
+          <a:rect l="0" t="0" r="0" b="0"/>
+          <a:pathLst>
+            <a:path>
+              <a:moveTo>
+                <a:pt x="0" y="14686"/>
+              </a:moveTo>
+              <a:lnTo>
+                <a:pt x="81807" y="14686"/>
+              </a:lnTo>
+            </a:path>
+          </a:pathLst>
+        </a:custGeom>
+        <a:noFill/>
+        <a:ln w="15875" cap="flat" cmpd="sng" algn="ctr">
+          <a:solidFill>
+            <a:schemeClr val="accent2">
+              <a:hueOff val="0"/>
+              <a:satOff val="0"/>
+              <a:lumOff val="0"/>
+              <a:alphaOff val="0"/>
+            </a:schemeClr>
+          </a:solidFill>
+          <a:prstDash val="solid"/>
+        </a:ln>
+        <a:effectLst/>
+      </dsp:spPr>
+      <dsp:style>
+        <a:lnRef idx="2">
+          <a:scrgbClr r="0" g="0" b="0"/>
+        </a:lnRef>
+        <a:fillRef idx="0">
+          <a:scrgbClr r="0" g="0" b="0"/>
+        </a:fillRef>
+        <a:effectRef idx="0">
+          <a:scrgbClr r="0" g="0" b="0"/>
+        </a:effectRef>
+        <a:fontRef idx="minor"/>
+      </dsp:style>
+      <dsp:txBody>
+        <a:bodyPr spcFirstLastPara="0" vert="horz" wrap="square" lIns="12700" tIns="0" rIns="12700" bIns="0" numCol="1" spcCol="1270" anchor="ctr" anchorCtr="0">
+          <a:noAutofit/>
+        </a:bodyPr>
+        <a:lstStyle/>
+        <a:p>
+          <a:pPr lvl="0" algn="ctr" defTabSz="222250">
+            <a:lnSpc>
+              <a:spcPct val="90000"/>
+            </a:lnSpc>
+            <a:spcBef>
+              <a:spcPct val="0"/>
+            </a:spcBef>
+            <a:spcAft>
+              <a:spcPct val="35000"/>
+            </a:spcAft>
+          </a:pPr>
+          <a:endParaRPr lang="en-US" sz="500" kern="1200"/>
+        </a:p>
+      </dsp:txBody>
+      <dsp:txXfrm>
+        <a:off x="4112754" y="1397597"/>
+        <a:ext cx="4090" cy="4090"/>
+      </dsp:txXfrm>
+    </dsp:sp>
+    <dsp:sp modelId="{85649CC4-960B-4B77-A6B2-FCC6734CC397}">
+      <dsp:nvSpPr>
+        <dsp:cNvPr id="0" name=""/>
+        <dsp:cNvSpPr/>
+      </dsp:nvSpPr>
+      <dsp:spPr>
+        <a:xfrm>
+          <a:off x="3443332" y="15804"/>
+          <a:ext cx="1342934" cy="1342934"/>
+        </a:xfrm>
+        <a:prstGeom prst="ellipse">
+          <a:avLst/>
+        </a:prstGeom>
+        <a:solidFill>
+          <a:schemeClr val="accent5"/>
+        </a:solidFill>
+        <a:ln w="15875" cap="flat" cmpd="sng" algn="ctr">
+          <a:solidFill>
+            <a:schemeClr val="accent5">
+              <a:shade val="50000"/>
+              <a:shade val="75000"/>
+              <a:lumMod val="80000"/>
+            </a:schemeClr>
+          </a:solidFill>
+          <a:prstDash val="solid"/>
+        </a:ln>
+        <a:effectLst/>
+      </dsp:spPr>
+      <dsp:style>
+        <a:lnRef idx="2">
+          <a:schemeClr val="accent5">
+            <a:shade val="50000"/>
+          </a:schemeClr>
+        </a:lnRef>
+        <a:fillRef idx="1">
+          <a:schemeClr val="accent5"/>
+        </a:fillRef>
+        <a:effectRef idx="0">
+          <a:schemeClr val="accent5"/>
+        </a:effectRef>
+        <a:fontRef idx="minor">
+          <a:schemeClr val="lt1"/>
+        </a:fontRef>
+      </dsp:style>
+      <dsp:txBody>
+        <a:bodyPr spcFirstLastPara="0" vert="horz" wrap="square" lIns="6350" tIns="6350" rIns="6350" bIns="6350" numCol="1" spcCol="1270" anchor="ctr" anchorCtr="0">
+          <a:noAutofit/>
+        </a:bodyPr>
+        <a:lstStyle/>
+        <a:p>
+          <a:pPr lvl="0" algn="ctr" defTabSz="444500">
+            <a:lnSpc>
+              <a:spcPct val="90000"/>
+            </a:lnSpc>
+            <a:spcBef>
+              <a:spcPct val="0"/>
+            </a:spcBef>
+            <a:spcAft>
+              <a:spcPct val="35000"/>
+            </a:spcAft>
+          </a:pPr>
+          <a:r>
+            <a:rPr lang="pl-PL" sz="1000" kern="1200" dirty="0" smtClean="0"/>
+            <a:t>Service </a:t>
+          </a:r>
+          <a:r>
+            <a:rPr lang="pl-PL" sz="1000" kern="1200" dirty="0" err="1" smtClean="0"/>
+            <a:t>Provider</a:t>
+          </a:r>
+          <a:r>
+            <a:rPr lang="pl-PL" sz="1000" kern="1200" dirty="0" smtClean="0"/>
+            <a:t> </a:t>
+          </a:r>
+          <a:r>
+            <a:rPr lang="pl-PL" sz="1000" kern="1200" dirty="0" err="1" smtClean="0"/>
+            <a:t>Implementation</a:t>
+          </a:r>
+          <a:r>
+            <a:rPr lang="pl-PL" sz="1000" kern="1200" dirty="0" smtClean="0"/>
+            <a:t> </a:t>
+          </a:r>
+          <a:r>
+            <a:rPr lang="pl-PL" sz="1000" i="1" kern="1200" dirty="0" err="1" smtClean="0"/>
+            <a:t>class</a:t>
+          </a:r>
+          <a:endParaRPr lang="en-US" sz="1000" i="1" kern="1200" dirty="0"/>
+        </a:p>
+      </dsp:txBody>
+      <dsp:txXfrm>
+        <a:off x="3640000" y="212472"/>
+        <a:ext cx="949598" cy="949598"/>
+      </dsp:txXfrm>
+    </dsp:sp>
+    <dsp:sp modelId="{EBD6F82F-5102-4FC5-AF12-F88CE6F7D1E8}">
+      <dsp:nvSpPr>
+        <dsp:cNvPr id="0" name=""/>
+        <dsp:cNvSpPr/>
+      </dsp:nvSpPr>
+      <dsp:spPr>
+        <a:xfrm rot="1850065">
+          <a:off x="4932712" y="2914786"/>
+          <a:ext cx="126408" cy="29373"/>
+        </a:xfrm>
+        <a:custGeom>
+          <a:avLst/>
+          <a:gdLst/>
+          <a:ahLst/>
+          <a:cxnLst/>
+          <a:rect l="0" t="0" r="0" b="0"/>
+          <a:pathLst>
+            <a:path>
+              <a:moveTo>
+                <a:pt x="0" y="14686"/>
+              </a:moveTo>
+              <a:lnTo>
+                <a:pt x="126408" y="14686"/>
+              </a:lnTo>
+            </a:path>
+          </a:pathLst>
+        </a:custGeom>
+        <a:noFill/>
+        <a:ln w="15875" cap="flat" cmpd="sng" algn="ctr">
+          <a:solidFill>
+            <a:schemeClr val="accent2">
+              <a:hueOff val="0"/>
+              <a:satOff val="0"/>
+              <a:lumOff val="0"/>
+              <a:alphaOff val="0"/>
+            </a:schemeClr>
+          </a:solidFill>
+          <a:prstDash val="solid"/>
+        </a:ln>
+        <a:effectLst/>
+      </dsp:spPr>
+      <dsp:style>
+        <a:lnRef idx="2">
+          <a:scrgbClr r="0" g="0" b="0"/>
+        </a:lnRef>
+        <a:fillRef idx="0">
+          <a:scrgbClr r="0" g="0" b="0"/>
+        </a:fillRef>
+        <a:effectRef idx="0">
+          <a:scrgbClr r="0" g="0" b="0"/>
+        </a:effectRef>
+        <a:fontRef idx="minor"/>
+      </dsp:style>
+      <dsp:txBody>
+        <a:bodyPr spcFirstLastPara="0" vert="horz" wrap="square" lIns="12700" tIns="0" rIns="12700" bIns="0" numCol="1" spcCol="1270" anchor="ctr" anchorCtr="0">
+          <a:noAutofit/>
+        </a:bodyPr>
+        <a:lstStyle/>
+        <a:p>
+          <a:pPr lvl="0" algn="ctr" defTabSz="222250">
+            <a:lnSpc>
+              <a:spcPct val="90000"/>
+            </a:lnSpc>
+            <a:spcBef>
+              <a:spcPct val="0"/>
+            </a:spcBef>
+            <a:spcAft>
+              <a:spcPct val="35000"/>
+            </a:spcAft>
+          </a:pPr>
+          <a:endParaRPr lang="en-US" sz="500" kern="1200"/>
+        </a:p>
+      </dsp:txBody>
+      <dsp:txXfrm>
+        <a:off x="4992756" y="2926312"/>
+        <a:ext cx="6320" cy="6320"/>
+      </dsp:txXfrm>
+    </dsp:sp>
+    <dsp:sp modelId="{5587CFFF-A9F9-4B92-93E9-8D3BAE5F08F0}">
+      <dsp:nvSpPr>
+        <dsp:cNvPr id="0" name=""/>
+        <dsp:cNvSpPr/>
+      </dsp:nvSpPr>
+      <dsp:spPr>
+        <a:xfrm>
+          <a:off x="4955276" y="2634567"/>
+          <a:ext cx="1342934" cy="1342934"/>
+        </a:xfrm>
+        <a:prstGeom prst="ellipse">
+          <a:avLst/>
+        </a:prstGeom>
+        <a:solidFill>
+          <a:schemeClr val="dk1"/>
+        </a:solidFill>
+        <a:ln w="15875" cap="flat" cmpd="sng" algn="ctr">
+          <a:solidFill>
+            <a:schemeClr val="dk1">
+              <a:shade val="50000"/>
+              <a:shade val="75000"/>
+              <a:lumMod val="80000"/>
+            </a:schemeClr>
+          </a:solidFill>
+          <a:prstDash val="solid"/>
+        </a:ln>
+        <a:effectLst/>
+      </dsp:spPr>
+      <dsp:style>
+        <a:lnRef idx="2">
+          <a:schemeClr val="dk1">
+            <a:shade val="50000"/>
+          </a:schemeClr>
+        </a:lnRef>
+        <a:fillRef idx="1">
+          <a:schemeClr val="dk1"/>
+        </a:fillRef>
+        <a:effectRef idx="0">
+          <a:schemeClr val="dk1"/>
+        </a:effectRef>
+        <a:fontRef idx="minor">
+          <a:schemeClr val="lt1"/>
+        </a:fontRef>
+      </dsp:style>
+      <dsp:txBody>
+        <a:bodyPr spcFirstLastPara="0" vert="horz" wrap="square" lIns="6350" tIns="6350" rIns="6350" bIns="6350" numCol="1" spcCol="1270" anchor="ctr" anchorCtr="0">
+          <a:noAutofit/>
+        </a:bodyPr>
+        <a:lstStyle/>
+        <a:p>
+          <a:pPr lvl="0" algn="ctr" defTabSz="444500">
+            <a:lnSpc>
+              <a:spcPct val="90000"/>
+            </a:lnSpc>
+            <a:spcBef>
+              <a:spcPct val="0"/>
+            </a:spcBef>
+            <a:spcAft>
+              <a:spcPct val="35000"/>
+            </a:spcAft>
+          </a:pPr>
+          <a:r>
+            <a:rPr lang="pl-PL" sz="1000" kern="1200" dirty="0" err="1" smtClean="0"/>
+            <a:t>Iservice</a:t>
+          </a:r>
+          <a:r>
+            <a:rPr lang="pl-PL" sz="1000" kern="1200" dirty="0" smtClean="0"/>
+            <a:t> </a:t>
+          </a:r>
+          <a:r>
+            <a:rPr lang="pl-PL" sz="1000" i="1" kern="1200" dirty="0" err="1" smtClean="0"/>
+            <a:t>interface</a:t>
+          </a:r>
+          <a:endParaRPr lang="en-US" sz="1000" i="1" kern="1200" dirty="0"/>
+        </a:p>
+      </dsp:txBody>
+      <dsp:txXfrm>
+        <a:off x="5151944" y="2831235"/>
+        <a:ext cx="949598" cy="949598"/>
+      </dsp:txXfrm>
+    </dsp:sp>
+    <dsp:sp modelId="{B16F53F6-AB78-48D6-867B-1816F27A02EE}">
+      <dsp:nvSpPr>
+        <dsp:cNvPr id="0" name=""/>
+        <dsp:cNvSpPr/>
+      </dsp:nvSpPr>
+      <dsp:spPr>
+        <a:xfrm rot="8949935">
+          <a:off x="3170479" y="2914786"/>
+          <a:ext cx="126408" cy="29373"/>
+        </a:xfrm>
+        <a:custGeom>
+          <a:avLst/>
+          <a:gdLst/>
+          <a:ahLst/>
+          <a:cxnLst/>
+          <a:rect l="0" t="0" r="0" b="0"/>
+          <a:pathLst>
+            <a:path>
+              <a:moveTo>
+                <a:pt x="0" y="14686"/>
+              </a:moveTo>
+              <a:lnTo>
+                <a:pt x="126408" y="14686"/>
+              </a:lnTo>
+            </a:path>
+          </a:pathLst>
+        </a:custGeom>
+        <a:noFill/>
+        <a:ln w="15875" cap="flat" cmpd="sng" algn="ctr">
+          <a:solidFill>
+            <a:schemeClr val="accent2">
+              <a:hueOff val="0"/>
+              <a:satOff val="0"/>
+              <a:lumOff val="0"/>
+              <a:alphaOff val="0"/>
+            </a:schemeClr>
+          </a:solidFill>
+          <a:prstDash val="solid"/>
+        </a:ln>
+        <a:effectLst/>
+      </dsp:spPr>
+      <dsp:style>
+        <a:lnRef idx="2">
+          <a:scrgbClr r="0" g="0" b="0"/>
+        </a:lnRef>
+        <a:fillRef idx="0">
+          <a:scrgbClr r="0" g="0" b="0"/>
+        </a:fillRef>
+        <a:effectRef idx="0">
+          <a:scrgbClr r="0" g="0" b="0"/>
+        </a:effectRef>
+        <a:fontRef idx="minor"/>
+      </dsp:style>
+      <dsp:txBody>
+        <a:bodyPr spcFirstLastPara="0" vert="horz" wrap="square" lIns="12700" tIns="0" rIns="12700" bIns="0" numCol="1" spcCol="1270" anchor="ctr" anchorCtr="0">
+          <a:noAutofit/>
+        </a:bodyPr>
+        <a:lstStyle/>
+        <a:p>
+          <a:pPr lvl="0" algn="ctr" defTabSz="222250">
+            <a:lnSpc>
+              <a:spcPct val="90000"/>
+            </a:lnSpc>
+            <a:spcBef>
+              <a:spcPct val="0"/>
+            </a:spcBef>
+            <a:spcAft>
+              <a:spcPct val="35000"/>
+            </a:spcAft>
+          </a:pPr>
+          <a:endParaRPr lang="en-US" sz="500" kern="1200"/>
+        </a:p>
+      </dsp:txBody>
+      <dsp:txXfrm rot="10800000">
+        <a:off x="3230523" y="2926312"/>
+        <a:ext cx="6320" cy="6320"/>
+      </dsp:txXfrm>
+    </dsp:sp>
+    <dsp:sp modelId="{01FD3103-B73F-4337-BCCB-E198DF1AC2D0}">
+      <dsp:nvSpPr>
+        <dsp:cNvPr id="0" name=""/>
+        <dsp:cNvSpPr/>
+      </dsp:nvSpPr>
+      <dsp:spPr>
+        <a:xfrm>
+          <a:off x="1931389" y="2634567"/>
+          <a:ext cx="1342934" cy="1342934"/>
+        </a:xfrm>
+        <a:prstGeom prst="ellipse">
+          <a:avLst/>
+        </a:prstGeom>
+        <a:solidFill>
+          <a:schemeClr val="accent3"/>
+        </a:solidFill>
+        <a:ln w="15875" cap="flat" cmpd="sng" algn="ctr">
+          <a:solidFill>
+            <a:schemeClr val="accent3">
+              <a:shade val="50000"/>
+              <a:shade val="75000"/>
+              <a:lumMod val="80000"/>
+            </a:schemeClr>
+          </a:solidFill>
+          <a:prstDash val="solid"/>
+        </a:ln>
+        <a:effectLst/>
+      </dsp:spPr>
+      <dsp:style>
+        <a:lnRef idx="2">
+          <a:schemeClr val="accent3">
+            <a:shade val="50000"/>
+          </a:schemeClr>
+        </a:lnRef>
+        <a:fillRef idx="1">
+          <a:schemeClr val="accent3"/>
+        </a:fillRef>
+        <a:effectRef idx="0">
+          <a:schemeClr val="accent3"/>
+        </a:effectRef>
+        <a:fontRef idx="minor">
+          <a:schemeClr val="lt1"/>
+        </a:fontRef>
+      </dsp:style>
+      <dsp:txBody>
+        <a:bodyPr spcFirstLastPara="0" vert="horz" wrap="square" lIns="6350" tIns="6350" rIns="6350" bIns="6350" numCol="1" spcCol="1270" anchor="ctr" anchorCtr="0">
+          <a:noAutofit/>
+        </a:bodyPr>
+        <a:lstStyle/>
+        <a:p>
+          <a:pPr lvl="0" algn="ctr" defTabSz="444500">
+            <a:lnSpc>
+              <a:spcPct val="90000"/>
+            </a:lnSpc>
+            <a:spcBef>
+              <a:spcPct val="0"/>
+            </a:spcBef>
+            <a:spcAft>
+              <a:spcPct val="35000"/>
+            </a:spcAft>
+          </a:pPr>
+          <a:r>
+            <a:rPr lang="pl-PL" sz="1000" kern="1200" dirty="0" err="1" smtClean="0"/>
+            <a:t>Client</a:t>
+          </a:r>
+          <a:r>
+            <a:rPr lang="pl-PL" sz="1000" kern="1200" dirty="0" smtClean="0"/>
+            <a:t> </a:t>
+          </a:r>
+          <a:r>
+            <a:rPr lang="pl-PL" sz="1000" i="1" kern="1200" dirty="0" err="1" smtClean="0"/>
+            <a:t>class</a:t>
+          </a:r>
+          <a:endParaRPr lang="en-US" sz="1000" i="1" kern="1200" dirty="0"/>
+        </a:p>
+      </dsp:txBody>
+      <dsp:txXfrm>
+        <a:off x="2128057" y="2831235"/>
+        <a:ext cx="949598" cy="949598"/>
+      </dsp:txXfrm>
+    </dsp:sp>
   </dsp:spTree>
 </dsp:drawing>
 </file>
@@ -34114,7 +35400,6 @@
               <a:rPr lang="pl-PL" dirty="0" smtClean="0"/>
               <a:t>Technologie</a:t>
             </a:r>
-            <a:endParaRPr lang="pl-PL" dirty="0" smtClean="0"/>
           </a:p>
           <a:p>
             <a:pPr marL="457200" indent="-457200">
@@ -34135,7 +35420,6 @@
               <a:rPr lang="pl-PL" dirty="0" smtClean="0"/>
               <a:t>Literatura</a:t>
             </a:r>
-            <a:endParaRPr lang="pl-PL" dirty="0" smtClean="0"/>
           </a:p>
           <a:p>
             <a:pPr marL="457200" indent="-457200">
@@ -34890,8 +36174,13 @@
             <a:pPr lvl="2"/>
             <a:r>
               <a:rPr lang="pl-PL" dirty="0" smtClean="0"/>
-              <a:t>zgodność z kanonem kodowania)</a:t>
-            </a:r>
+              <a:t>zgodność z kanonem </a:t>
+            </a:r>
+            <a:r>
+              <a:rPr lang="pl-PL" dirty="0" smtClean="0"/>
+              <a:t>kodowania</a:t>
+            </a:r>
+            <a:endParaRPr lang="pl-PL" dirty="0" smtClean="0"/>
           </a:p>
           <a:p>
             <a:pPr lvl="1"/>
@@ -37250,7 +38539,7 @@
           <p:nvPr>
             <p:extLst>
               <p:ext uri="{D42A27DB-BD31-4B8C-83A1-F6EECF244321}">
-                <p14:modId xmlns:p14="http://schemas.microsoft.com/office/powerpoint/2010/main" val="3501678751"/>
+                <p14:modId xmlns:p14="http://schemas.microsoft.com/office/powerpoint/2010/main" val="1715077018"/>
               </p:ext>
             </p:extLst>
           </p:nvPr>
@@ -39979,15 +41268,15 @@
             <a:pPr lvl="1"/>
             <a:r>
               <a:rPr lang="pl-PL" dirty="0" smtClean="0"/>
-              <a:t>Niskie narzuty na komunikacje przy wykorzystaniu mechanizmów platformy .NET (</a:t>
-            </a:r>
-            <a:r>
-              <a:rPr lang="pl-PL" dirty="0" err="1" smtClean="0"/>
-              <a:t>Marshalling</a:t>
+              <a:t>Niskie narzuty na </a:t>
             </a:r>
             <a:r>
               <a:rPr lang="pl-PL" dirty="0" smtClean="0"/>
-              <a:t>)</a:t>
+              <a:t>komunikację </a:t>
+            </a:r>
+            <a:r>
+              <a:rPr lang="pl-PL" dirty="0" smtClean="0"/>
+              <a:t>przy wykorzystaniu mechanizmów platformy .NET (Marshalling)</a:t>
             </a:r>
           </a:p>
           <a:p>
@@ -41092,23 +42381,15 @@
             <a:pPr lvl="1"/>
             <a:r>
               <a:rPr lang="pl-PL" dirty="0" smtClean="0"/>
-              <a:t>Wymagania w zakresie ładowania / wyładowywania / </a:t>
-            </a:r>
-            <a:r>
-              <a:rPr lang="pl-PL" dirty="0" err="1" smtClean="0"/>
-              <a:t>update’u</a:t>
+              <a:t>Wymagania w zakresie ładowania / wyładowywania / update’u / </a:t>
             </a:r>
             <a:r>
               <a:rPr lang="pl-PL" dirty="0" smtClean="0"/>
-              <a:t> / </a:t>
-            </a:r>
-            <a:r>
-              <a:rPr lang="pl-PL" dirty="0" err="1" smtClean="0"/>
-              <a:t>restart’u</a:t>
+              <a:t>restartu </a:t>
             </a:r>
             <a:r>
               <a:rPr lang="pl-PL" dirty="0" smtClean="0"/>
-              <a:t> są spełnione</a:t>
+              <a:t>są spełnione</a:t>
             </a:r>
           </a:p>
           <a:p>
@@ -41207,7 +42488,11 @@
           <a:p>
             <a:r>
               <a:rPr lang="pl-PL" dirty="0" smtClean="0"/>
-              <a:t>Komunikacja inter-modułowa</a:t>
+              <a:t>Komunikacja </a:t>
+            </a:r>
+            <a:r>
+              <a:rPr lang="pl-PL" dirty="0" smtClean="0"/>
+              <a:t>międzymodułowa</a:t>
             </a:r>
             <a:endParaRPr lang="pl-PL" dirty="0"/>
           </a:p>
@@ -46359,16 +47644,16 @@
               <a:t>Umożliwia korzystanie z usług dostarczanych z </a:t>
             </a:r>
             <a:r>
-              <a:rPr lang="pl-PL" i="1" dirty="0" err="1" smtClean="0"/>
-              <a:t>Nomad</a:t>
-            </a:r>
-            <a:r>
-              <a:rPr lang="pl-PL" dirty="0" err="1" smtClean="0"/>
-              <a:t>’em</a:t>
+              <a:rPr lang="pl-PL" i="1" dirty="0" smtClean="0"/>
+              <a:t>Nomadem</a:t>
             </a:r>
             <a:r>
               <a:rPr lang="pl-PL" dirty="0" smtClean="0"/>
-              <a:t> przez moduły</a:t>
+              <a:t> </a:t>
+            </a:r>
+            <a:r>
+              <a:rPr lang="pl-PL" dirty="0" smtClean="0"/>
+              <a:t>przez moduły</a:t>
             </a:r>
           </a:p>
         </p:txBody>
@@ -48080,7 +49365,15 @@
             </a:r>
             <a:r>
               <a:rPr lang="pl-PL" sz="2200" dirty="0"/>
-              <a:t>podstawowych dodatków (plugin-ów) obejmujących współdzielone repozytorium </a:t>
+              <a:t>podstawowych dodatków (</a:t>
+            </a:r>
+            <a:r>
+              <a:rPr lang="pl-PL" sz="2200" dirty="0" smtClean="0"/>
+              <a:t>pluginów</a:t>
+            </a:r>
+            <a:r>
+              <a:rPr lang="pl-PL" sz="2200" dirty="0"/>
+              <a:t>) obejmujących współdzielone repozytorium </a:t>
             </a:r>
             <a:r>
               <a:rPr lang="pl-PL" sz="2200" dirty="0" smtClean="0"/>
@@ -50124,10 +51417,15 @@
             <p:ph idx="1"/>
           </p:nvPr>
         </p:nvSpPr>
-        <p:spPr/>
+        <p:spPr>
+          <a:xfrm>
+            <a:off x="287525" y="2675467"/>
+            <a:ext cx="8568951" cy="3921885"/>
+          </a:xfrm>
+        </p:spPr>
         <p:txBody>
           <a:bodyPr>
-            <a:normAutofit fontScale="77500" lnSpcReduction="20000"/>
+            <a:normAutofit fontScale="92500" lnSpcReduction="20000"/>
           </a:bodyPr>
           <a:lstStyle/>
           <a:p>

</xml_diff>